<commit_message>
change the table of data availability in placeholder
</commit_message>
<xml_diff>
--- a/static/placeholder.pptx
+++ b/static/placeholder.pptx
@@ -115,6 +115,8 @@
 <file path=ppt/revisionInfo.xml><?xml version="1.0" encoding="utf-8"?>
 <p1510:revInfo xmlns:a="http://schemas.openxmlformats.org/drawingml/2006/main" xmlns:r="http://schemas.openxmlformats.org/officeDocument/2006/relationships" xmlns:p1510="http://schemas.microsoft.com/office/powerpoint/2015/10/main">
   <p1510:revLst>
+    <p1510:client id="{954C6B30-C1EC-2E14-44FC-46DD14AB0CE6}" v="138" dt="2021-10-15T08:20:09.466"/>
+    <p1510:client id="{ABB433DE-8DE7-EB65-11B0-F01847659B5B}" v="170" dt="2021-10-14T11:45:39.854"/>
     <p1510:client id="{BEA3B990-66CF-4413-9382-701C0A5AD28E}" v="786" dt="2021-10-14T09:38:07.272"/>
     <p1510:client id="{E5650429-80A5-F8CC-95A1-4FFA4FA57543}" v="12" dt="2021-10-14T11:09:57.349"/>
   </p1510:revLst>
@@ -252,7 +254,7 @@
           <a:p>
             <a:fld id="{846CE7D5-CF57-46EF-B807-FDD0502418D4}" type="datetimeFigureOut">
               <a:rPr lang="en-US" smtClean="0"/>
-              <a:t>10/14/2021</a:t>
+              <a:t>10/15/2021</a:t>
             </a:fld>
             <a:endParaRPr lang="en-US"/>
           </a:p>
@@ -422,7 +424,7 @@
           <a:p>
             <a:fld id="{846CE7D5-CF57-46EF-B807-FDD0502418D4}" type="datetimeFigureOut">
               <a:rPr lang="en-US" smtClean="0"/>
-              <a:t>10/14/2021</a:t>
+              <a:t>10/15/2021</a:t>
             </a:fld>
             <a:endParaRPr lang="en-US"/>
           </a:p>
@@ -602,7 +604,7 @@
           <a:p>
             <a:fld id="{846CE7D5-CF57-46EF-B807-FDD0502418D4}" type="datetimeFigureOut">
               <a:rPr lang="en-US" smtClean="0"/>
-              <a:t>10/14/2021</a:t>
+              <a:t>10/15/2021</a:t>
             </a:fld>
             <a:endParaRPr lang="en-US"/>
           </a:p>
@@ -772,7 +774,7 @@
           <a:p>
             <a:fld id="{846CE7D5-CF57-46EF-B807-FDD0502418D4}" type="datetimeFigureOut">
               <a:rPr lang="en-US" smtClean="0"/>
-              <a:t>10/14/2021</a:t>
+              <a:t>10/15/2021</a:t>
             </a:fld>
             <a:endParaRPr lang="en-US"/>
           </a:p>
@@ -1018,7 +1020,7 @@
           <a:p>
             <a:fld id="{846CE7D5-CF57-46EF-B807-FDD0502418D4}" type="datetimeFigureOut">
               <a:rPr lang="en-US" smtClean="0"/>
-              <a:t>10/14/2021</a:t>
+              <a:t>10/15/2021</a:t>
             </a:fld>
             <a:endParaRPr lang="en-US"/>
           </a:p>
@@ -1250,7 +1252,7 @@
           <a:p>
             <a:fld id="{846CE7D5-CF57-46EF-B807-FDD0502418D4}" type="datetimeFigureOut">
               <a:rPr lang="en-US" smtClean="0"/>
-              <a:t>10/14/2021</a:t>
+              <a:t>10/15/2021</a:t>
             </a:fld>
             <a:endParaRPr lang="en-US"/>
           </a:p>
@@ -1617,7 +1619,7 @@
           <a:p>
             <a:fld id="{846CE7D5-CF57-46EF-B807-FDD0502418D4}" type="datetimeFigureOut">
               <a:rPr lang="en-US" smtClean="0"/>
-              <a:t>10/14/2021</a:t>
+              <a:t>10/15/2021</a:t>
             </a:fld>
             <a:endParaRPr lang="en-US"/>
           </a:p>
@@ -1735,7 +1737,7 @@
           <a:p>
             <a:fld id="{846CE7D5-CF57-46EF-B807-FDD0502418D4}" type="datetimeFigureOut">
               <a:rPr lang="en-US" smtClean="0"/>
-              <a:t>10/14/2021</a:t>
+              <a:t>10/15/2021</a:t>
             </a:fld>
             <a:endParaRPr lang="en-US"/>
           </a:p>
@@ -1830,7 +1832,7 @@
           <a:p>
             <a:fld id="{846CE7D5-CF57-46EF-B807-FDD0502418D4}" type="datetimeFigureOut">
               <a:rPr lang="en-US" smtClean="0"/>
-              <a:t>10/14/2021</a:t>
+              <a:t>10/15/2021</a:t>
             </a:fld>
             <a:endParaRPr lang="en-US"/>
           </a:p>
@@ -2107,7 +2109,7 @@
           <a:p>
             <a:fld id="{846CE7D5-CF57-46EF-B807-FDD0502418D4}" type="datetimeFigureOut">
               <a:rPr lang="en-US" smtClean="0"/>
-              <a:t>10/14/2021</a:t>
+              <a:t>10/15/2021</a:t>
             </a:fld>
             <a:endParaRPr lang="en-US"/>
           </a:p>
@@ -2364,7 +2366,7 @@
           <a:p>
             <a:fld id="{846CE7D5-CF57-46EF-B807-FDD0502418D4}" type="datetimeFigureOut">
               <a:rPr lang="en-US" smtClean="0"/>
-              <a:t>10/14/2021</a:t>
+              <a:t>10/15/2021</a:t>
             </a:fld>
             <a:endParaRPr lang="en-US"/>
           </a:p>
@@ -2577,7 +2579,7 @@
           <a:p>
             <a:fld id="{846CE7D5-CF57-46EF-B807-FDD0502418D4}" type="datetimeFigureOut">
               <a:rPr lang="en-US" smtClean="0"/>
-              <a:t>10/14/2021</a:t>
+              <a:t>10/15/2021</a:t>
             </a:fld>
             <a:endParaRPr lang="en-US"/>
           </a:p>
@@ -2994,7 +2996,7 @@
         </p:nvSpPr>
         <p:spPr>
           <a:xfrm>
-            <a:off x="1481667" y="486305"/>
+            <a:off x="1524000" y="977372"/>
             <a:ext cx="9144000" cy="648228"/>
           </a:xfrm>
         </p:spPr>
@@ -3072,58 +3074,58 @@
           <p:nvPr>
             <p:extLst>
               <p:ext uri="{D42A27DB-BD31-4B8C-83A1-F6EECF244321}">
-                <p14:modId xmlns:p14="http://schemas.microsoft.com/office/powerpoint/2010/main" val="1076099971"/>
+                <p14:modId xmlns:p14="http://schemas.microsoft.com/office/powerpoint/2010/main" val="4289778347"/>
               </p:ext>
             </p:extLst>
           </p:nvPr>
         </p:nvGraphicFramePr>
         <p:xfrm>
-          <a:off x="733213" y="1856909"/>
-          <a:ext cx="4775640" cy="822960"/>
+          <a:off x="1151467" y="2599266"/>
+          <a:ext cx="9851946" cy="1731920"/>
         </p:xfrm>
         <a:graphic>
           <a:graphicData uri="http://schemas.openxmlformats.org/drawingml/2006/table">
             <a:tbl>
               <a:tblPr firstRow="1" bandRow="1">
-                <a:tableStyleId>{9D7B26C5-4107-4FEC-AEDC-1716B250A1EF}</a:tableStyleId>
+                <a:tableStyleId>{2D5ABB26-0587-4C30-8999-92F81FD0307C}</a:tableStyleId>
               </a:tblPr>
               <a:tblGrid>
-                <a:gridCol w="795940">
+                <a:gridCol w="1641991">
                   <a:extLst>
                     <a:ext uri="{9D8B030D-6E8A-4147-A177-3AD203B41FA5}">
                       <a16:colId xmlns:a16="http://schemas.microsoft.com/office/drawing/2014/main" val="1786597057"/>
                     </a:ext>
                   </a:extLst>
                 </a:gridCol>
-                <a:gridCol w="795940">
+                <a:gridCol w="1641991">
                   <a:extLst>
                     <a:ext uri="{9D8B030D-6E8A-4147-A177-3AD203B41FA5}">
                       <a16:colId xmlns:a16="http://schemas.microsoft.com/office/drawing/2014/main" val="1936470344"/>
                     </a:ext>
                   </a:extLst>
                 </a:gridCol>
-                <a:gridCol w="795940">
+                <a:gridCol w="1641991">
                   <a:extLst>
                     <a:ext uri="{9D8B030D-6E8A-4147-A177-3AD203B41FA5}">
                       <a16:colId xmlns:a16="http://schemas.microsoft.com/office/drawing/2014/main" val="3147797879"/>
                     </a:ext>
                   </a:extLst>
                 </a:gridCol>
-                <a:gridCol w="795940">
+                <a:gridCol w="1641991">
                   <a:extLst>
                     <a:ext uri="{9D8B030D-6E8A-4147-A177-3AD203B41FA5}">
                       <a16:colId xmlns:a16="http://schemas.microsoft.com/office/drawing/2014/main" val="78292725"/>
                     </a:ext>
                   </a:extLst>
                 </a:gridCol>
-                <a:gridCol w="795940">
+                <a:gridCol w="1641991">
                   <a:extLst>
                     <a:ext uri="{9D8B030D-6E8A-4147-A177-3AD203B41FA5}">
                       <a16:colId xmlns:a16="http://schemas.microsoft.com/office/drawing/2014/main" val="2212457586"/>
                     </a:ext>
                   </a:extLst>
                 </a:gridCol>
-                <a:gridCol w="795940">
+                <a:gridCol w="1641991">
                   <a:extLst>
                     <a:ext uri="{9D8B030D-6E8A-4147-A177-3AD203B41FA5}">
                       <a16:colId xmlns:a16="http://schemas.microsoft.com/office/drawing/2014/main" val="1181174887"/>
@@ -3131,14 +3133,14 @@
                   </a:extLst>
                 </a:gridCol>
               </a:tblGrid>
-              <a:tr h="273149">
+              <a:tr h="583289">
                 <a:tc>
                   <a:txBody>
                     <a:bodyPr/>
                     <a:lstStyle/>
                     <a:p>
                       <a:pPr algn="ctr"/>
-                      <a:endParaRPr lang="en-US" sz="1200" dirty="0"/>
+                      <a:endParaRPr lang="en-US" sz="1400" dirty="0"/>
                     </a:p>
                   </a:txBody>
                   <a:tcPr anchor="ctr"/>
@@ -3150,7 +3152,7 @@
                     <a:p>
                       <a:pPr algn="ctr"/>
                       <a:r>
-                        <a:rPr lang="en-US" sz="1200" dirty="0"/>
+                        <a:rPr lang="en-US" sz="1400" dirty="0"/>
                         <a:t>ASK</a:t>
                       </a:r>
                     </a:p>
@@ -3166,14 +3168,14 @@
                         <a:buNone/>
                       </a:pPr>
                       <a:r>
-                        <a:rPr lang="en-US" sz="1200" u="none" strike="noStrike" noProof="0" dirty="0"/>
+                        <a:rPr lang="en-US" sz="1400" u="none" strike="noStrike" noProof="0" dirty="0"/>
                         <a:t> </a:t>
                       </a:r>
                       <a:r>
-                        <a:rPr lang="en-US" sz="1200" u="none" strike="noStrike" noProof="0" dirty="0" err="1"/>
+                        <a:rPr lang="en-US" sz="1400" u="none" strike="noStrike" noProof="0" dirty="0" err="1"/>
                         <a:t>ClimWIP</a:t>
                       </a:r>
-                      <a:endParaRPr lang="en-US" sz="1200" dirty="0"/>
+                      <a:endParaRPr lang="en-US" sz="1400" dirty="0"/>
                     </a:p>
                   </a:txBody>
                   <a:tcPr anchor="ctr"/>
@@ -3185,7 +3187,7 @@
                     <a:p>
                       <a:pPr algn="ctr"/>
                       <a:r>
-                        <a:rPr lang="en-US" sz="1200" dirty="0" err="1"/>
+                        <a:rPr lang="en-US" sz="1400" dirty="0" err="1"/>
                         <a:t>HistC</a:t>
                       </a:r>
                     </a:p>
@@ -3199,7 +3201,7 @@
                     <a:p>
                       <a:pPr algn="ctr"/>
                       <a:r>
-                        <a:rPr lang="en-US" sz="1200" dirty="0"/>
+                        <a:rPr lang="en-US" sz="1400" dirty="0"/>
                         <a:t>REA</a:t>
                       </a:r>
                     </a:p>
@@ -3213,7 +3215,7 @@
                     <a:p>
                       <a:pPr algn="ctr"/>
                       <a:r>
-                        <a:rPr lang="en-US" sz="1200" dirty="0"/>
+                        <a:rPr lang="en-US" sz="1400" dirty="0"/>
                         <a:t>UKCP</a:t>
                       </a:r>
                     </a:p>
@@ -3226,7 +3228,7 @@
                   </a:ext>
                 </a:extLst>
               </a:tr>
-              <a:tr h="273149">
+              <a:tr h="583289">
                 <a:tc>
                   <a:txBody>
                     <a:bodyPr/>
@@ -3234,7 +3236,7 @@
                     <a:p>
                       <a:pPr algn="ctr"/>
                       <a:r>
-                        <a:rPr lang="en-US" sz="1200" dirty="0"/>
+                        <a:rPr lang="en-US" sz="1400" dirty="0"/>
                         <a:t>CMIP6</a:t>
                       </a:r>
                     </a:p>
@@ -3246,14 +3248,53 @@
                     <a:bodyPr/>
                     <a:lstStyle/>
                     <a:p>
-                      <a:pPr algn="ctr"/>
+                      <a:pPr lvl="0" algn="ctr">
+                        <a:lnSpc>
+                          <a:spcPct val="100000"/>
+                        </a:lnSpc>
+                        <a:spcBef>
+                          <a:spcPts val="0"/>
+                        </a:spcBef>
+                        <a:spcAft>
+                          <a:spcPts val="0"/>
+                        </a:spcAft>
+                        <a:buNone/>
+                      </a:pPr>
                       <a:r>
-                        <a:rPr lang="en-US" sz="1200" dirty="0"/>
-                        <a:t>X</a:t>
+                        <a:rPr lang="en-US" sz="1400" u="none" strike="noStrike" noProof="0" dirty="0"/>
+                        <a:t>Temperature</a:t>
                       </a:r>
+                      <a:r>
+                        <a:rPr lang="en-US" sz="1400" dirty="0"/>
+                        <a:t>, </a:t>
+                      </a:r>
+                      <a:endParaRPr lang="en-US" sz="1400"/>
+                    </a:p>
+                    <a:p>
+                      <a:pPr lvl="0" algn="ctr">
+                        <a:lnSpc>
+                          <a:spcPct val="100000"/>
+                        </a:lnSpc>
+                        <a:spcBef>
+                          <a:spcPts val="0"/>
+                        </a:spcBef>
+                        <a:spcAft>
+                          <a:spcPts val="0"/>
+                        </a:spcAft>
+                        <a:buNone/>
+                      </a:pPr>
+                      <a:r>
+                        <a:rPr lang="en-US" sz="1400" dirty="0"/>
+                        <a:t>constrained</a:t>
+                      </a:r>
+                      <a:endParaRPr lang="en-US" sz="1400"/>
                     </a:p>
                   </a:txBody>
-                  <a:tcPr anchor="ctr"/>
+                  <a:tcPr anchor="ctr">
+                    <a:solidFill>
+                      <a:schemeClr val="accent4"/>
+                    </a:solidFill>
+                  </a:tcPr>
                 </a:tc>
                 <a:tc>
                   <a:txBody>
@@ -3261,13 +3302,67 @@
                     <a:lstStyle/>
                     <a:p>
                       <a:pPr algn="ctr"/>
-                      <a:r>
-                        <a:rPr lang="en-US" sz="1200" dirty="0"/>
-                        <a:t>X</a:t>
-                      </a:r>
+                      <a:endParaRPr lang="en-US" sz="1400" dirty="0"/>
                     </a:p>
                   </a:txBody>
-                  <a:tcPr anchor="ctr"/>
+                  <a:tcPr anchor="ctr">
+                    <a:solidFill>
+                      <a:srgbClr val="92D050"/>
+                    </a:solidFill>
+                  </a:tcPr>
+                </a:tc>
+                <a:tc>
+                  <a:txBody>
+                    <a:bodyPr/>
+                    <a:lstStyle/>
+                    <a:p>
+                      <a:pPr lvl="0" algn="ctr">
+                        <a:lnSpc>
+                          <a:spcPct val="100000"/>
+                        </a:lnSpc>
+                        <a:spcBef>
+                          <a:spcPts val="0"/>
+                        </a:spcBef>
+                        <a:spcAft>
+                          <a:spcPts val="0"/>
+                        </a:spcAft>
+                        <a:buNone/>
+                      </a:pPr>
+                      <a:r>
+                        <a:rPr lang="en-US" sz="1400" u="none" strike="noStrike" noProof="0" dirty="0"/>
+                        <a:t>Temperature</a:t>
+                      </a:r>
+                      <a:r>
+                        <a:rPr lang="en-US" sz="1400" dirty="0"/>
+                        <a:t>,</a:t>
+                      </a:r>
+                      <a:endParaRPr lang="en-US" sz="1400"/>
+                    </a:p>
+                    <a:p>
+                      <a:pPr lvl="0" algn="ctr">
+                        <a:lnSpc>
+                          <a:spcPct val="100000"/>
+                        </a:lnSpc>
+                        <a:spcBef>
+                          <a:spcPts val="0"/>
+                        </a:spcBef>
+                        <a:spcAft>
+                          <a:spcPts val="0"/>
+                        </a:spcAft>
+                        <a:buNone/>
+                      </a:pPr>
+                      <a:r>
+                        <a:rPr lang="en-US" sz="1400" dirty="0"/>
+                        <a:t> no 50-percentile</a:t>
+                      </a:r>
+                      <a:endParaRPr lang="en-US" sz="1400"/>
+                    </a:p>
+                  </a:txBody>
+                  <a:tcPr anchor="ctr">
+                    <a:solidFill>
+                      <a:schemeClr val="accent4"/>
+                    </a:solidFill>
+                  </a:tcPr>
                 </a:tc>
                 <a:tc>
                   <a:txBody>
@@ -3275,13 +3370,14 @@
                     <a:lstStyle/>
                     <a:p>
                       <a:pPr algn="ctr"/>
-                      <a:r>
-                        <a:rPr lang="en-US" sz="1200" dirty="0"/>
-                        <a:t>X</a:t>
-                      </a:r>
+                      <a:endParaRPr lang="en-US" sz="1400" dirty="0"/>
                     </a:p>
                   </a:txBody>
-                  <a:tcPr anchor="ctr"/>
+                  <a:tcPr anchor="ctr">
+                    <a:solidFill>
+                      <a:srgbClr val="92D050"/>
+                    </a:solidFill>
+                  </a:tcPr>
                 </a:tc>
                 <a:tc>
                   <a:txBody>
@@ -3289,14 +3385,22 @@
                     <a:lstStyle/>
                     <a:p>
                       <a:pPr algn="ctr"/>
-                      <a:r>
-                        <a:rPr lang="en-US" sz="1200" dirty="0"/>
-                        <a:t>X</a:t>
-                      </a:r>
+                      <a:endParaRPr lang="en-US" sz="1400" dirty="0"/>
                     </a:p>
                   </a:txBody>
-                  <a:tcPr anchor="ctr"/>
+                  <a:tcPr anchor="ctr">
+                    <a:solidFill>
+                      <a:srgbClr val="92D050"/>
+                    </a:solidFill>
+                  </a:tcPr>
                 </a:tc>
+                <a:extLst>
+                  <a:ext uri="{0D108BD9-81ED-4DB2-BD59-A6C34878D82A}">
+                    <a16:rowId xmlns:a16="http://schemas.microsoft.com/office/drawing/2014/main" val="893037035"/>
+                  </a:ext>
+                </a:extLst>
+              </a:tr>
+              <a:tr h="565342">
                 <a:tc>
                   <a:txBody>
                     <a:bodyPr/>
@@ -3304,28 +3408,7 @@
                     <a:p>
                       <a:pPr algn="ctr"/>
                       <a:r>
-                        <a:rPr lang="en-US" sz="1200" dirty="0"/>
-                        <a:t>X</a:t>
-                      </a:r>
-                    </a:p>
-                  </a:txBody>
-                  <a:tcPr anchor="ctr"/>
-                </a:tc>
-                <a:extLst>
-                  <a:ext uri="{0D108BD9-81ED-4DB2-BD59-A6C34878D82A}">
-                    <a16:rowId xmlns:a16="http://schemas.microsoft.com/office/drawing/2014/main" val="893037035"/>
-                  </a:ext>
-                </a:extLst>
-              </a:tr>
-              <a:tr h="264045">
-                <a:tc>
-                  <a:txBody>
-                    <a:bodyPr/>
-                    <a:lstStyle/>
-                    <a:p>
-                      <a:pPr algn="ctr"/>
-                      <a:r>
-                        <a:rPr lang="en-US" sz="1200" dirty="0"/>
+                        <a:rPr lang="en-US" sz="1400" dirty="0"/>
                         <a:t>CMIP5</a:t>
                       </a:r>
                     </a:p>
@@ -3337,14 +3420,50 @@
                     <a:bodyPr/>
                     <a:lstStyle/>
                     <a:p>
-                      <a:pPr algn="ctr"/>
+                      <a:pPr lvl="0" algn="ctr">
+                        <a:lnSpc>
+                          <a:spcPct val="100000"/>
+                        </a:lnSpc>
+                        <a:spcBef>
+                          <a:spcPts val="0"/>
+                        </a:spcBef>
+                        <a:spcAft>
+                          <a:spcPts val="0"/>
+                        </a:spcAft>
+                        <a:buNone/>
+                      </a:pPr>
                       <a:r>
-                        <a:rPr lang="en-US" sz="1200" dirty="0"/>
-                        <a:t>-</a:t>
+                        <a:rPr lang="en-US" sz="1400" u="none" strike="noStrike" noProof="0" dirty="0"/>
+                        <a:t>Temperature, </a:t>
+                      </a:r>
+                      <a:endParaRPr lang="en-US" sz="1400" b="0" i="0" u="none" strike="noStrike" noProof="0">
+                        <a:latin typeface="Calibri"/>
+                      </a:endParaRPr>
+                    </a:p>
+                    <a:p>
+                      <a:pPr lvl="0" algn="ctr">
+                        <a:lnSpc>
+                          <a:spcPct val="100000"/>
+                        </a:lnSpc>
+                        <a:spcBef>
+                          <a:spcPts val="0"/>
+                        </a:spcBef>
+                        <a:spcAft>
+                          <a:spcPts val="0"/>
+                        </a:spcAft>
+                        <a:buNone/>
+                      </a:pPr>
+                      <a:r>
+                        <a:rPr lang="en-US" sz="1400" u="none" strike="noStrike" noProof="0" dirty="0"/>
+                        <a:t>constrained</a:t>
                       </a:r>
                     </a:p>
                   </a:txBody>
-                  <a:tcPr anchor="ctr"/>
+                  <a:tcPr anchor="ctr">
+                    <a:solidFill>
+                      <a:schemeClr val="accent4"/>
+                    </a:solidFill>
+                  </a:tcPr>
                 </a:tc>
                 <a:tc>
                   <a:txBody>
@@ -3353,12 +3472,36 @@
                     <a:p>
                       <a:pPr algn="ctr"/>
                       <a:r>
-                        <a:rPr lang="en-US" sz="1200" dirty="0"/>
-                        <a:t>-</a:t>
+                        <a:rPr lang="en-US" sz="1400" dirty="0"/>
+                        <a:t>X</a:t>
                       </a:r>
                     </a:p>
                   </a:txBody>
-                  <a:tcPr anchor="ctr"/>
+                  <a:tcPr anchor="ctr">
+                    <a:solidFill>
+                      <a:srgbClr val="FF0000"/>
+                    </a:solidFill>
+                  </a:tcPr>
+                </a:tc>
+                <a:tc>
+                  <a:txBody>
+                    <a:bodyPr/>
+                    <a:lstStyle/>
+                    <a:p>
+                      <a:pPr lvl="0" algn="ctr">
+                        <a:buNone/>
+                      </a:pPr>
+                      <a:r>
+                        <a:rPr lang="en-US" sz="1400" dirty="0"/>
+                        <a:t>X</a:t>
+                      </a:r>
+                    </a:p>
+                  </a:txBody>
+                  <a:tcPr anchor="ctr">
+                    <a:solidFill>
+                      <a:srgbClr val="FF0000"/>
+                    </a:solidFill>
+                  </a:tcPr>
                 </a:tc>
                 <a:tc>
                   <a:txBody>
@@ -3366,41 +3509,34 @@
                     <a:lstStyle/>
                     <a:p>
                       <a:pPr algn="ctr"/>
-                      <a:r>
-                        <a:rPr lang="en-US" sz="1200" dirty="0"/>
-                        <a:t>-</a:t>
-                      </a:r>
+                      <a:endParaRPr lang="en-US" sz="1400" dirty="0"/>
                     </a:p>
                   </a:txBody>
-                  <a:tcPr anchor="ctr"/>
+                  <a:tcPr anchor="ctr">
+                    <a:solidFill>
+                      <a:srgbClr val="92D050"/>
+                    </a:solidFill>
+                  </a:tcPr>
                 </a:tc>
                 <a:tc>
                   <a:txBody>
                     <a:bodyPr/>
                     <a:lstStyle/>
                     <a:p>
-                      <a:pPr algn="ctr"/>
+                      <a:pPr lvl="0" algn="ctr">
+                        <a:buNone/>
+                      </a:pPr>
                       <a:r>
-                        <a:rPr lang="en-US" sz="1200" dirty="0"/>
+                        <a:rPr lang="en-US" sz="1400" dirty="0"/>
                         <a:t>X</a:t>
                       </a:r>
                     </a:p>
                   </a:txBody>
-                  <a:tcPr anchor="ctr"/>
-                </a:tc>
-                <a:tc>
-                  <a:txBody>
-                    <a:bodyPr/>
-                    <a:lstStyle/>
-                    <a:p>
-                      <a:pPr algn="ctr"/>
-                      <a:r>
-                        <a:rPr lang="en-US" sz="1200" dirty="0"/>
-                        <a:t>-</a:t>
-                      </a:r>
-                    </a:p>
-                  </a:txBody>
-                  <a:tcPr anchor="ctr"/>
+                  <a:tcPr anchor="ctr">
+                    <a:solidFill>
+                      <a:srgbClr val="FF0000"/>
+                    </a:solidFill>
+                  </a:tcPr>
                 </a:tc>
                 <a:extLst>
                   <a:ext uri="{0D108BD9-81ED-4DB2-BD59-A6C34878D82A}">
@@ -3412,2285 +3548,150 @@
           </a:graphicData>
         </a:graphic>
       </p:graphicFrame>
-      <p:graphicFrame>
-        <p:nvGraphicFramePr>
-          <p:cNvPr id="5" name="Table 4">
+      <p:pic>
+        <p:nvPicPr>
+          <p:cNvPr id="8" name="Graphic 12" descr="Checkmark with solid fill">
             <a:extLst>
               <a:ext uri="{FF2B5EF4-FFF2-40B4-BE49-F238E27FC236}">
-                <a16:creationId xmlns:a16="http://schemas.microsoft.com/office/drawing/2014/main" id="{223A56CE-AE5C-4715-BACA-D94E50537AF4}"/>
+                <a16:creationId xmlns:a16="http://schemas.microsoft.com/office/drawing/2014/main" id="{47224B9B-D54D-4557-9662-998025CD5722}"/>
               </a:ext>
             </a:extLst>
           </p:cNvPr>
-          <p:cNvGraphicFramePr>
-            <a:graphicFrameLocks noGrp="1"/>
-          </p:cNvGraphicFramePr>
-          <p:nvPr>
-            <p:extLst>
-              <p:ext uri="{D42A27DB-BD31-4B8C-83A1-F6EECF244321}">
-                <p14:modId xmlns:p14="http://schemas.microsoft.com/office/powerpoint/2010/main" val="1028620051"/>
-              </p:ext>
-            </p:extLst>
-          </p:nvPr>
-        </p:nvGraphicFramePr>
-        <p:xfrm>
-          <a:off x="750147" y="4134443"/>
-          <a:ext cx="4831548" cy="1645920"/>
-        </p:xfrm>
-        <a:graphic>
-          <a:graphicData uri="http://schemas.openxmlformats.org/drawingml/2006/table">
-            <a:tbl>
-              <a:tblPr firstRow="1" bandRow="1">
-                <a:tableStyleId>{9D7B26C5-4107-4FEC-AEDC-1716B250A1EF}</a:tableStyleId>
-              </a:tblPr>
-              <a:tblGrid>
-                <a:gridCol w="805258">
-                  <a:extLst>
-                    <a:ext uri="{9D8B030D-6E8A-4147-A177-3AD203B41FA5}">
-                      <a16:colId xmlns:a16="http://schemas.microsoft.com/office/drawing/2014/main" val="1786597057"/>
-                    </a:ext>
-                  </a:extLst>
-                </a:gridCol>
-                <a:gridCol w="805258">
-                  <a:extLst>
-                    <a:ext uri="{9D8B030D-6E8A-4147-A177-3AD203B41FA5}">
-                      <a16:colId xmlns:a16="http://schemas.microsoft.com/office/drawing/2014/main" val="1936470344"/>
-                    </a:ext>
-                  </a:extLst>
-                </a:gridCol>
-                <a:gridCol w="805258">
-                  <a:extLst>
-                    <a:ext uri="{9D8B030D-6E8A-4147-A177-3AD203B41FA5}">
-                      <a16:colId xmlns:a16="http://schemas.microsoft.com/office/drawing/2014/main" val="3147797879"/>
-                    </a:ext>
-                  </a:extLst>
-                </a:gridCol>
-                <a:gridCol w="805258">
-                  <a:extLst>
-                    <a:ext uri="{9D8B030D-6E8A-4147-A177-3AD203B41FA5}">
-                      <a16:colId xmlns:a16="http://schemas.microsoft.com/office/drawing/2014/main" val="78292725"/>
-                    </a:ext>
-                  </a:extLst>
-                </a:gridCol>
-                <a:gridCol w="805258">
-                  <a:extLst>
-                    <a:ext uri="{9D8B030D-6E8A-4147-A177-3AD203B41FA5}">
-                      <a16:colId xmlns:a16="http://schemas.microsoft.com/office/drawing/2014/main" val="2212457586"/>
-                    </a:ext>
-                  </a:extLst>
-                </a:gridCol>
-                <a:gridCol w="805258">
-                  <a:extLst>
-                    <a:ext uri="{9D8B030D-6E8A-4147-A177-3AD203B41FA5}">
-                      <a16:colId xmlns:a16="http://schemas.microsoft.com/office/drawing/2014/main" val="1181174887"/>
-                    </a:ext>
-                  </a:extLst>
-                </a:gridCol>
-              </a:tblGrid>
-              <a:tr h="265336">
-                <a:tc>
-                  <a:txBody>
-                    <a:bodyPr/>
-                    <a:lstStyle/>
-                    <a:p>
-                      <a:pPr algn="ctr"/>
-                      <a:endParaRPr lang="en-US" sz="1200" dirty="0"/>
-                    </a:p>
-                  </a:txBody>
-                  <a:tcPr anchor="ctr"/>
-                </a:tc>
-                <a:tc>
-                  <a:txBody>
-                    <a:bodyPr/>
-                    <a:lstStyle/>
-                    <a:p>
-                      <a:pPr algn="ctr"/>
-                      <a:r>
-                        <a:rPr lang="en-US" sz="1200" dirty="0"/>
-                        <a:t>ASK</a:t>
-                      </a:r>
-                    </a:p>
-                  </a:txBody>
-                  <a:tcPr anchor="ctr"/>
-                </a:tc>
-                <a:tc>
-                  <a:txBody>
-                    <a:bodyPr/>
-                    <a:lstStyle/>
-                    <a:p>
-                      <a:pPr lvl="0" algn="ctr">
-                        <a:buNone/>
-                      </a:pPr>
-                      <a:r>
-                        <a:rPr lang="en-US" sz="1200" u="none" strike="noStrike" noProof="0" dirty="0"/>
-                        <a:t> </a:t>
-                      </a:r>
-                      <a:r>
-                        <a:rPr lang="en-US" sz="1200" u="none" strike="noStrike" noProof="0" dirty="0" err="1"/>
-                        <a:t>ClimWIP</a:t>
-                      </a:r>
-                      <a:endParaRPr lang="en-US" sz="1200" dirty="0"/>
-                    </a:p>
-                  </a:txBody>
-                  <a:tcPr anchor="ctr"/>
-                </a:tc>
-                <a:tc>
-                  <a:txBody>
-                    <a:bodyPr/>
-                    <a:lstStyle/>
-                    <a:p>
-                      <a:pPr algn="ctr"/>
-                      <a:r>
-                        <a:rPr lang="en-US" sz="1200" dirty="0" err="1"/>
-                        <a:t>HistC</a:t>
-                      </a:r>
-                      <a:endParaRPr lang="en-US" sz="1200" dirty="0"/>
-                    </a:p>
-                  </a:txBody>
-                  <a:tcPr anchor="ctr"/>
-                </a:tc>
-                <a:tc>
-                  <a:txBody>
-                    <a:bodyPr/>
-                    <a:lstStyle/>
-                    <a:p>
-                      <a:pPr algn="ctr"/>
-                      <a:r>
-                        <a:rPr lang="en-US" sz="1200" dirty="0"/>
-                        <a:t>REA</a:t>
-                      </a:r>
-                    </a:p>
-                  </a:txBody>
-                  <a:tcPr anchor="ctr"/>
-                </a:tc>
-                <a:tc>
-                  <a:txBody>
-                    <a:bodyPr/>
-                    <a:lstStyle/>
-                    <a:p>
-                      <a:pPr algn="ctr"/>
-                      <a:r>
-                        <a:rPr lang="en-US" sz="1200" dirty="0"/>
-                        <a:t>UKCP</a:t>
-                      </a:r>
-                    </a:p>
-                  </a:txBody>
-                  <a:tcPr anchor="ctr"/>
-                </a:tc>
-                <a:extLst>
-                  <a:ext uri="{0D108BD9-81ED-4DB2-BD59-A6C34878D82A}">
-                    <a16:rowId xmlns:a16="http://schemas.microsoft.com/office/drawing/2014/main" val="3791754860"/>
-                  </a:ext>
-                </a:extLst>
-              </a:tr>
-              <a:tr h="265336">
-                <a:tc>
-                  <a:txBody>
-                    <a:bodyPr/>
-                    <a:lstStyle/>
-                    <a:p>
-                      <a:pPr lvl="0" algn="ctr">
-                        <a:buNone/>
-                      </a:pPr>
-                      <a:r>
-                        <a:rPr lang="en-US" sz="1200" dirty="0"/>
-                        <a:t>10</a:t>
-                      </a:r>
-                    </a:p>
-                  </a:txBody>
-                  <a:tcPr anchor="ctr"/>
-                </a:tc>
-                <a:tc>
-                  <a:txBody>
-                    <a:bodyPr/>
-                    <a:lstStyle/>
-                    <a:p>
-                      <a:pPr algn="ctr"/>
-                      <a:r>
-                        <a:rPr lang="en-US" sz="1200" dirty="0"/>
-                        <a:t>X</a:t>
-                      </a:r>
-                    </a:p>
-                  </a:txBody>
-                  <a:tcPr anchor="ctr"/>
-                </a:tc>
-                <a:tc>
-                  <a:txBody>
-                    <a:bodyPr/>
-                    <a:lstStyle/>
-                    <a:p>
-                      <a:pPr algn="ctr"/>
-                      <a:r>
-                        <a:rPr lang="en-US" sz="1200" dirty="0"/>
-                        <a:t>X</a:t>
-                      </a:r>
-                    </a:p>
-                  </a:txBody>
-                  <a:tcPr anchor="ctr"/>
-                </a:tc>
-                <a:tc>
-                  <a:txBody>
-                    <a:bodyPr/>
-                    <a:lstStyle/>
-                    <a:p>
-                      <a:pPr algn="ctr"/>
-                      <a:r>
-                        <a:rPr lang="en-US" sz="1200" dirty="0"/>
-                        <a:t>X</a:t>
-                      </a:r>
-                    </a:p>
-                  </a:txBody>
-                  <a:tcPr anchor="ctr"/>
-                </a:tc>
-                <a:tc>
-                  <a:txBody>
-                    <a:bodyPr/>
-                    <a:lstStyle/>
-                    <a:p>
-                      <a:pPr algn="ctr"/>
-                      <a:r>
-                        <a:rPr lang="en-US" sz="1200" dirty="0"/>
-                        <a:t>X</a:t>
-                      </a:r>
-                    </a:p>
-                  </a:txBody>
-                  <a:tcPr anchor="ctr"/>
-                </a:tc>
-                <a:tc>
-                  <a:txBody>
-                    <a:bodyPr/>
-                    <a:lstStyle/>
-                    <a:p>
-                      <a:pPr algn="ctr"/>
-                      <a:r>
-                        <a:rPr lang="en-US" sz="1200" dirty="0"/>
-                        <a:t>X</a:t>
-                      </a:r>
-                    </a:p>
-                  </a:txBody>
-                  <a:tcPr anchor="ctr"/>
-                </a:tc>
-                <a:extLst>
-                  <a:ext uri="{0D108BD9-81ED-4DB2-BD59-A6C34878D82A}">
-                    <a16:rowId xmlns:a16="http://schemas.microsoft.com/office/drawing/2014/main" val="893037035"/>
-                  </a:ext>
-                </a:extLst>
-              </a:tr>
-              <a:tr h="256491">
-                <a:tc>
-                  <a:txBody>
-                    <a:bodyPr/>
-                    <a:lstStyle/>
-                    <a:p>
-                      <a:pPr algn="ctr"/>
-                      <a:r>
-                        <a:rPr lang="en-US" sz="1200" dirty="0"/>
-                        <a:t>25</a:t>
-                      </a:r>
-                    </a:p>
-                  </a:txBody>
-                  <a:tcPr anchor="ctr"/>
-                </a:tc>
-                <a:tc>
-                  <a:txBody>
-                    <a:bodyPr/>
-                    <a:lstStyle/>
-                    <a:p>
-                      <a:pPr algn="ctr"/>
-                      <a:r>
-                        <a:rPr lang="en-US" sz="1200" dirty="0"/>
-                        <a:t>X</a:t>
-                      </a:r>
-                    </a:p>
-                  </a:txBody>
-                  <a:tcPr anchor="ctr"/>
-                </a:tc>
-                <a:tc>
-                  <a:txBody>
-                    <a:bodyPr/>
-                    <a:lstStyle/>
-                    <a:p>
-                      <a:pPr algn="ctr"/>
-                      <a:r>
-                        <a:rPr lang="en-US" sz="1200" dirty="0"/>
-                        <a:t>X</a:t>
-                      </a:r>
-                    </a:p>
-                  </a:txBody>
-                  <a:tcPr anchor="ctr"/>
-                </a:tc>
-                <a:tc>
-                  <a:txBody>
-                    <a:bodyPr/>
-                    <a:lstStyle/>
-                    <a:p>
-                      <a:pPr algn="ctr"/>
-                      <a:r>
-                        <a:rPr lang="en-US" sz="1200" dirty="0"/>
-                        <a:t>X</a:t>
-                      </a:r>
-                    </a:p>
-                  </a:txBody>
-                  <a:tcPr anchor="ctr"/>
-                </a:tc>
-                <a:tc>
-                  <a:txBody>
-                    <a:bodyPr/>
-                    <a:lstStyle/>
-                    <a:p>
-                      <a:pPr algn="ctr"/>
-                      <a:r>
-                        <a:rPr lang="en-US" sz="1200" dirty="0"/>
-                        <a:t>X</a:t>
-                      </a:r>
-                    </a:p>
-                  </a:txBody>
-                  <a:tcPr anchor="ctr"/>
-                </a:tc>
-                <a:tc>
-                  <a:txBody>
-                    <a:bodyPr/>
-                    <a:lstStyle/>
-                    <a:p>
-                      <a:pPr algn="ctr"/>
-                      <a:r>
-                        <a:rPr lang="en-US" sz="1200" dirty="0"/>
-                        <a:t>X</a:t>
-                      </a:r>
-                    </a:p>
-                  </a:txBody>
-                  <a:tcPr anchor="ctr"/>
-                </a:tc>
-                <a:extLst>
-                  <a:ext uri="{0D108BD9-81ED-4DB2-BD59-A6C34878D82A}">
-                    <a16:rowId xmlns:a16="http://schemas.microsoft.com/office/drawing/2014/main" val="3052349962"/>
-                  </a:ext>
-                </a:extLst>
-              </a:tr>
-              <a:tr h="265336">
-                <a:tc>
-                  <a:txBody>
-                    <a:bodyPr/>
-                    <a:lstStyle/>
-                    <a:p>
-                      <a:pPr lvl="0" algn="ctr">
-                        <a:buNone/>
-                      </a:pPr>
-                      <a:r>
-                        <a:rPr lang="en-US" sz="1200" dirty="0"/>
-                        <a:t>50</a:t>
-                      </a:r>
-                    </a:p>
-                  </a:txBody>
-                  <a:tcPr/>
-                </a:tc>
-                <a:tc>
-                  <a:txBody>
-                    <a:bodyPr/>
-                    <a:lstStyle/>
-                    <a:p>
-                      <a:pPr lvl="0" algn="ctr">
-                        <a:buNone/>
-                      </a:pPr>
-                      <a:r>
-                        <a:rPr lang="en-US" sz="1200" dirty="0"/>
-                        <a:t>X</a:t>
-                      </a:r>
-                    </a:p>
-                  </a:txBody>
-                  <a:tcPr/>
-                </a:tc>
-                <a:tc>
-                  <a:txBody>
-                    <a:bodyPr/>
-                    <a:lstStyle/>
-                    <a:p>
-                      <a:pPr lvl="0" algn="ctr">
-                        <a:buNone/>
-                      </a:pPr>
-                      <a:r>
-                        <a:rPr lang="en-US" sz="1200" dirty="0"/>
-                        <a:t>X</a:t>
-                      </a:r>
-                    </a:p>
-                  </a:txBody>
-                  <a:tcPr/>
-                </a:tc>
-                <a:tc>
-                  <a:txBody>
-                    <a:bodyPr/>
-                    <a:lstStyle/>
-                    <a:p>
-                      <a:pPr lvl="0" algn="ctr">
-                        <a:buNone/>
-                      </a:pPr>
-                      <a:r>
-                        <a:rPr lang="en-US" sz="1200" dirty="0"/>
-                        <a:t>-</a:t>
-                      </a:r>
-                    </a:p>
-                  </a:txBody>
-                  <a:tcPr/>
-                </a:tc>
-                <a:tc>
-                  <a:txBody>
-                    <a:bodyPr/>
-                    <a:lstStyle/>
-                    <a:p>
-                      <a:pPr lvl="0" algn="ctr">
-                        <a:buNone/>
-                      </a:pPr>
-                      <a:r>
-                        <a:rPr lang="en-US" sz="1200" dirty="0"/>
-                        <a:t>X</a:t>
-                      </a:r>
-                    </a:p>
-                  </a:txBody>
-                  <a:tcPr/>
-                </a:tc>
-                <a:tc>
-                  <a:txBody>
-                    <a:bodyPr/>
-                    <a:lstStyle/>
-                    <a:p>
-                      <a:pPr lvl="0" algn="ctr">
-                        <a:buNone/>
-                      </a:pPr>
-                      <a:r>
-                        <a:rPr lang="en-US" sz="1200" dirty="0"/>
-                        <a:t>X</a:t>
-                      </a:r>
-                    </a:p>
-                  </a:txBody>
-                  <a:tcPr/>
-                </a:tc>
-                <a:extLst>
-                  <a:ext uri="{0D108BD9-81ED-4DB2-BD59-A6C34878D82A}">
-                    <a16:rowId xmlns:a16="http://schemas.microsoft.com/office/drawing/2014/main" val="3579138993"/>
-                  </a:ext>
-                </a:extLst>
-              </a:tr>
-              <a:tr h="265336">
-                <a:tc>
-                  <a:txBody>
-                    <a:bodyPr/>
-                    <a:lstStyle/>
-                    <a:p>
-                      <a:pPr lvl="0" algn="ctr">
-                        <a:buNone/>
-                      </a:pPr>
-                      <a:r>
-                        <a:rPr lang="en-US" sz="1200" dirty="0"/>
-                        <a:t>75</a:t>
-                      </a:r>
-                    </a:p>
-                  </a:txBody>
-                  <a:tcPr/>
-                </a:tc>
-                <a:tc>
-                  <a:txBody>
-                    <a:bodyPr/>
-                    <a:lstStyle/>
-                    <a:p>
-                      <a:pPr lvl="0" algn="ctr">
-                        <a:buNone/>
-                      </a:pPr>
-                      <a:r>
-                        <a:rPr lang="en-US" sz="1200" dirty="0"/>
-                        <a:t>X</a:t>
-                      </a:r>
-                    </a:p>
-                  </a:txBody>
-                  <a:tcPr/>
-                </a:tc>
-                <a:tc>
-                  <a:txBody>
-                    <a:bodyPr/>
-                    <a:lstStyle/>
-                    <a:p>
-                      <a:pPr lvl="0" algn="ctr">
-                        <a:buNone/>
-                      </a:pPr>
-                      <a:r>
-                        <a:rPr lang="en-US" sz="1200" dirty="0"/>
-                        <a:t>X</a:t>
-                      </a:r>
-                    </a:p>
-                  </a:txBody>
-                  <a:tcPr/>
-                </a:tc>
-                <a:tc>
-                  <a:txBody>
-                    <a:bodyPr/>
-                    <a:lstStyle/>
-                    <a:p>
-                      <a:pPr lvl="0" algn="ctr">
-                        <a:buNone/>
-                      </a:pPr>
-                      <a:r>
-                        <a:rPr lang="en-US" sz="1200" dirty="0"/>
-                        <a:t>X</a:t>
-                      </a:r>
-                    </a:p>
-                  </a:txBody>
-                  <a:tcPr/>
-                </a:tc>
-                <a:tc>
-                  <a:txBody>
-                    <a:bodyPr/>
-                    <a:lstStyle/>
-                    <a:p>
-                      <a:pPr lvl="0" algn="ctr">
-                        <a:buNone/>
-                      </a:pPr>
-                      <a:r>
-                        <a:rPr lang="en-US" sz="1200" dirty="0"/>
-                        <a:t>X</a:t>
-                      </a:r>
-                    </a:p>
-                  </a:txBody>
-                  <a:tcPr/>
-                </a:tc>
-                <a:tc>
-                  <a:txBody>
-                    <a:bodyPr/>
-                    <a:lstStyle/>
-                    <a:p>
-                      <a:pPr lvl="0" algn="ctr">
-                        <a:buNone/>
-                      </a:pPr>
-                      <a:r>
-                        <a:rPr lang="en-US" sz="1200" dirty="0"/>
-                        <a:t>X</a:t>
-                      </a:r>
-                    </a:p>
-                  </a:txBody>
-                  <a:tcPr/>
-                </a:tc>
-                <a:extLst>
-                  <a:ext uri="{0D108BD9-81ED-4DB2-BD59-A6C34878D82A}">
-                    <a16:rowId xmlns:a16="http://schemas.microsoft.com/office/drawing/2014/main" val="213842842"/>
-                  </a:ext>
-                </a:extLst>
-              </a:tr>
-              <a:tr h="265336">
-                <a:tc>
-                  <a:txBody>
-                    <a:bodyPr/>
-                    <a:lstStyle/>
-                    <a:p>
-                      <a:pPr lvl="0" algn="ctr">
-                        <a:buNone/>
-                      </a:pPr>
-                      <a:r>
-                        <a:rPr lang="en-US" sz="1200" dirty="0"/>
-                        <a:t>90</a:t>
-                      </a:r>
-                    </a:p>
-                  </a:txBody>
-                  <a:tcPr/>
-                </a:tc>
-                <a:tc>
-                  <a:txBody>
-                    <a:bodyPr/>
-                    <a:lstStyle/>
-                    <a:p>
-                      <a:pPr lvl="0" algn="ctr">
-                        <a:buNone/>
-                      </a:pPr>
-                      <a:r>
-                        <a:rPr lang="en-US" sz="1200" dirty="0"/>
-                        <a:t>X</a:t>
-                      </a:r>
-                    </a:p>
-                  </a:txBody>
-                  <a:tcPr/>
-                </a:tc>
-                <a:tc>
-                  <a:txBody>
-                    <a:bodyPr/>
-                    <a:lstStyle/>
-                    <a:p>
-                      <a:pPr lvl="0" algn="ctr">
-                        <a:buNone/>
-                      </a:pPr>
-                      <a:r>
-                        <a:rPr lang="en-US" sz="1200" dirty="0"/>
-                        <a:t>X</a:t>
-                      </a:r>
-                    </a:p>
-                  </a:txBody>
-                  <a:tcPr/>
-                </a:tc>
-                <a:tc>
-                  <a:txBody>
-                    <a:bodyPr/>
-                    <a:lstStyle/>
-                    <a:p>
-                      <a:pPr lvl="0" algn="ctr">
-                        <a:buNone/>
-                      </a:pPr>
-                      <a:r>
-                        <a:rPr lang="en-US" sz="1200" dirty="0"/>
-                        <a:t>X</a:t>
-                      </a:r>
-                    </a:p>
-                  </a:txBody>
-                  <a:tcPr/>
-                </a:tc>
-                <a:tc>
-                  <a:txBody>
-                    <a:bodyPr/>
-                    <a:lstStyle/>
-                    <a:p>
-                      <a:pPr lvl="0" algn="ctr">
-                        <a:buNone/>
-                      </a:pPr>
-                      <a:r>
-                        <a:rPr lang="en-US" sz="1200" dirty="0"/>
-                        <a:t>X</a:t>
-                      </a:r>
-                    </a:p>
-                  </a:txBody>
-                  <a:tcPr/>
-                </a:tc>
-                <a:tc>
-                  <a:txBody>
-                    <a:bodyPr/>
-                    <a:lstStyle/>
-                    <a:p>
-                      <a:pPr lvl="0" algn="ctr">
-                        <a:buNone/>
-                      </a:pPr>
-                      <a:r>
-                        <a:rPr lang="en-US" sz="1200" dirty="0"/>
-                        <a:t>X</a:t>
-                      </a:r>
-                    </a:p>
-                  </a:txBody>
-                  <a:tcPr/>
-                </a:tc>
-                <a:extLst>
-                  <a:ext uri="{0D108BD9-81ED-4DB2-BD59-A6C34878D82A}">
-                    <a16:rowId xmlns:a16="http://schemas.microsoft.com/office/drawing/2014/main" val="2786404602"/>
-                  </a:ext>
-                </a:extLst>
-              </a:tr>
-            </a:tbl>
-          </a:graphicData>
-        </a:graphic>
-      </p:graphicFrame>
-      <p:graphicFrame>
-        <p:nvGraphicFramePr>
-          <p:cNvPr id="6" name="Table 4">
+          <p:cNvPicPr>
+            <a:picLocks noChangeAspect="1"/>
+          </p:cNvPicPr>
+          <p:nvPr/>
+        </p:nvPicPr>
+        <p:blipFill>
+          <a:blip r:embed="rId2">
             <a:extLst>
-              <a:ext uri="{FF2B5EF4-FFF2-40B4-BE49-F238E27FC236}">
-                <a16:creationId xmlns:a16="http://schemas.microsoft.com/office/drawing/2014/main" id="{42FAA1F4-583F-439D-BE4D-B29C049EE6A1}"/>
+              <a:ext uri="{96DAC541-7B7A-43D3-8B79-37D633B846F1}">
+                <asvg:svgBlip xmlns:asvg="http://schemas.microsoft.com/office/drawing/2016/SVG/main" r:embed="rId3"/>
               </a:ext>
             </a:extLst>
-          </p:cNvPr>
-          <p:cNvGraphicFramePr>
-            <a:graphicFrameLocks noGrp="1"/>
-          </p:cNvGraphicFramePr>
-          <p:nvPr>
-            <p:extLst>
-              <p:ext uri="{D42A27DB-BD31-4B8C-83A1-F6EECF244321}">
-                <p14:modId xmlns:p14="http://schemas.microsoft.com/office/powerpoint/2010/main" val="2127362224"/>
-              </p:ext>
-            </p:extLst>
-          </p:nvPr>
-        </p:nvGraphicFramePr>
-        <p:xfrm>
-          <a:off x="6312746" y="1873842"/>
-          <a:ext cx="5148209" cy="822960"/>
-        </p:xfrm>
-        <a:graphic>
-          <a:graphicData uri="http://schemas.openxmlformats.org/drawingml/2006/table">
-            <a:tbl>
-              <a:tblPr firstRow="1" bandRow="1">
-                <a:tableStyleId>{9D7B26C5-4107-4FEC-AEDC-1716B250A1EF}</a:tableStyleId>
-              </a:tblPr>
-              <a:tblGrid>
-                <a:gridCol w="1084643">
-                  <a:extLst>
-                    <a:ext uri="{9D8B030D-6E8A-4147-A177-3AD203B41FA5}">
-                      <a16:colId xmlns:a16="http://schemas.microsoft.com/office/drawing/2014/main" val="1786597057"/>
-                    </a:ext>
-                  </a:extLst>
-                </a:gridCol>
-                <a:gridCol w="788851">
-                  <a:extLst>
-                    <a:ext uri="{9D8B030D-6E8A-4147-A177-3AD203B41FA5}">
-                      <a16:colId xmlns:a16="http://schemas.microsoft.com/office/drawing/2014/main" val="1936470344"/>
-                    </a:ext>
-                  </a:extLst>
-                </a:gridCol>
-                <a:gridCol w="810422">
-                  <a:extLst>
-                    <a:ext uri="{9D8B030D-6E8A-4147-A177-3AD203B41FA5}">
-                      <a16:colId xmlns:a16="http://schemas.microsoft.com/office/drawing/2014/main" val="3147797879"/>
-                    </a:ext>
-                  </a:extLst>
-                </a:gridCol>
-                <a:gridCol w="748223">
-                  <a:extLst>
-                    <a:ext uri="{9D8B030D-6E8A-4147-A177-3AD203B41FA5}">
-                      <a16:colId xmlns:a16="http://schemas.microsoft.com/office/drawing/2014/main" val="78292725"/>
-                    </a:ext>
-                  </a:extLst>
-                </a:gridCol>
-                <a:gridCol w="858035">
-                  <a:extLst>
-                    <a:ext uri="{9D8B030D-6E8A-4147-A177-3AD203B41FA5}">
-                      <a16:colId xmlns:a16="http://schemas.microsoft.com/office/drawing/2014/main" val="2212457586"/>
-                    </a:ext>
-                  </a:extLst>
-                </a:gridCol>
-                <a:gridCol w="858035">
-                  <a:extLst>
-                    <a:ext uri="{9D8B030D-6E8A-4147-A177-3AD203B41FA5}">
-                      <a16:colId xmlns:a16="http://schemas.microsoft.com/office/drawing/2014/main" val="1181174887"/>
-                    </a:ext>
-                  </a:extLst>
-                </a:gridCol>
-              </a:tblGrid>
-              <a:tr h="260649">
-                <a:tc>
-                  <a:txBody>
-                    <a:bodyPr/>
-                    <a:lstStyle/>
-                    <a:p>
-                      <a:pPr algn="ctr"/>
-                      <a:endParaRPr lang="en-US" sz="1200" dirty="0"/>
-                    </a:p>
-                  </a:txBody>
-                  <a:tcPr anchor="ctr"/>
-                </a:tc>
-                <a:tc>
-                  <a:txBody>
-                    <a:bodyPr/>
-                    <a:lstStyle/>
-                    <a:p>
-                      <a:pPr algn="ctr"/>
-                      <a:r>
-                        <a:rPr lang="en-US" sz="1200" dirty="0"/>
-                        <a:t>ASK</a:t>
-                      </a:r>
-                    </a:p>
-                  </a:txBody>
-                  <a:tcPr anchor="ctr"/>
-                </a:tc>
-                <a:tc>
-                  <a:txBody>
-                    <a:bodyPr/>
-                    <a:lstStyle/>
-                    <a:p>
-                      <a:pPr lvl="0" algn="ctr">
-                        <a:buNone/>
-                      </a:pPr>
-                      <a:r>
-                        <a:rPr lang="en-US" sz="1200" u="none" strike="noStrike" noProof="0" dirty="0"/>
-                        <a:t> </a:t>
-                      </a:r>
-                      <a:r>
-                        <a:rPr lang="en-US" sz="1200" u="none" strike="noStrike" noProof="0" dirty="0" err="1"/>
-                        <a:t>ClimWIP</a:t>
-                      </a:r>
-                      <a:endParaRPr lang="en-US" sz="1200" dirty="0"/>
-                    </a:p>
-                  </a:txBody>
-                  <a:tcPr anchor="ctr"/>
-                </a:tc>
-                <a:tc>
-                  <a:txBody>
-                    <a:bodyPr/>
-                    <a:lstStyle/>
-                    <a:p>
-                      <a:pPr algn="ctr"/>
-                      <a:r>
-                        <a:rPr lang="en-US" sz="1200" dirty="0" err="1"/>
-                        <a:t>HistC</a:t>
-                      </a:r>
-                      <a:endParaRPr lang="en-US" sz="1200" dirty="0"/>
-                    </a:p>
-                  </a:txBody>
-                  <a:tcPr anchor="ctr"/>
-                </a:tc>
-                <a:tc>
-                  <a:txBody>
-                    <a:bodyPr/>
-                    <a:lstStyle/>
-                    <a:p>
-                      <a:pPr algn="ctr"/>
-                      <a:r>
-                        <a:rPr lang="en-US" sz="1200" dirty="0"/>
-                        <a:t>REA</a:t>
-                      </a:r>
-                    </a:p>
-                  </a:txBody>
-                  <a:tcPr anchor="ctr"/>
-                </a:tc>
-                <a:tc>
-                  <a:txBody>
-                    <a:bodyPr/>
-                    <a:lstStyle/>
-                    <a:p>
-                      <a:pPr algn="ctr"/>
-                      <a:r>
-                        <a:rPr lang="en-US" sz="1200" dirty="0"/>
-                        <a:t>UKCP</a:t>
-                      </a:r>
-                    </a:p>
-                  </a:txBody>
-                  <a:tcPr anchor="ctr"/>
-                </a:tc>
-                <a:extLst>
-                  <a:ext uri="{0D108BD9-81ED-4DB2-BD59-A6C34878D82A}">
-                    <a16:rowId xmlns:a16="http://schemas.microsoft.com/office/drawing/2014/main" val="3791754860"/>
-                  </a:ext>
-                </a:extLst>
-              </a:tr>
-              <a:tr h="260649">
-                <a:tc>
-                  <a:txBody>
-                    <a:bodyPr/>
-                    <a:lstStyle/>
-                    <a:p>
-                      <a:pPr algn="ctr"/>
-                      <a:r>
-                        <a:rPr lang="en-US" sz="1200" dirty="0"/>
-                        <a:t>Temperature</a:t>
-                      </a:r>
-                    </a:p>
-                  </a:txBody>
-                  <a:tcPr anchor="ctr"/>
-                </a:tc>
-                <a:tc>
-                  <a:txBody>
-                    <a:bodyPr/>
-                    <a:lstStyle/>
-                    <a:p>
-                      <a:pPr algn="ctr"/>
-                      <a:r>
-                        <a:rPr lang="en-US" sz="1200" dirty="0"/>
-                        <a:t>X</a:t>
-                      </a:r>
-                    </a:p>
-                  </a:txBody>
-                  <a:tcPr anchor="ctr"/>
-                </a:tc>
-                <a:tc>
-                  <a:txBody>
-                    <a:bodyPr/>
-                    <a:lstStyle/>
-                    <a:p>
-                      <a:pPr algn="ctr"/>
-                      <a:r>
-                        <a:rPr lang="en-US" sz="1200" dirty="0"/>
-                        <a:t>X</a:t>
-                      </a:r>
-                    </a:p>
-                  </a:txBody>
-                  <a:tcPr anchor="ctr"/>
-                </a:tc>
-                <a:tc>
-                  <a:txBody>
-                    <a:bodyPr/>
-                    <a:lstStyle/>
-                    <a:p>
-                      <a:pPr algn="ctr"/>
-                      <a:r>
-                        <a:rPr lang="en-US" sz="1200" dirty="0"/>
-                        <a:t>X</a:t>
-                      </a:r>
-                    </a:p>
-                  </a:txBody>
-                  <a:tcPr anchor="ctr"/>
-                </a:tc>
-                <a:tc>
-                  <a:txBody>
-                    <a:bodyPr/>
-                    <a:lstStyle/>
-                    <a:p>
-                      <a:pPr algn="ctr"/>
-                      <a:r>
-                        <a:rPr lang="en-US" sz="1200" dirty="0"/>
-                        <a:t>X</a:t>
-                      </a:r>
-                    </a:p>
-                  </a:txBody>
-                  <a:tcPr anchor="ctr"/>
-                </a:tc>
-                <a:tc>
-                  <a:txBody>
-                    <a:bodyPr/>
-                    <a:lstStyle/>
-                    <a:p>
-                      <a:pPr algn="ctr"/>
-                      <a:r>
-                        <a:rPr lang="en-US" sz="1200" dirty="0"/>
-                        <a:t>X</a:t>
-                      </a:r>
-                    </a:p>
-                  </a:txBody>
-                  <a:tcPr anchor="ctr"/>
-                </a:tc>
-                <a:extLst>
-                  <a:ext uri="{0D108BD9-81ED-4DB2-BD59-A6C34878D82A}">
-                    <a16:rowId xmlns:a16="http://schemas.microsoft.com/office/drawing/2014/main" val="893037035"/>
-                  </a:ext>
-                </a:extLst>
-              </a:tr>
-              <a:tr h="251961">
-                <a:tc>
-                  <a:txBody>
-                    <a:bodyPr/>
-                    <a:lstStyle/>
-                    <a:p>
-                      <a:pPr algn="ctr"/>
-                      <a:r>
-                        <a:rPr lang="en-US" sz="1200" dirty="0"/>
-                        <a:t>Precipitation</a:t>
-                      </a:r>
-                    </a:p>
-                  </a:txBody>
-                  <a:tcPr anchor="ctr"/>
-                </a:tc>
-                <a:tc>
-                  <a:txBody>
-                    <a:bodyPr/>
-                    <a:lstStyle/>
-                    <a:p>
-                      <a:pPr algn="ctr"/>
-                      <a:r>
-                        <a:rPr lang="en-US" sz="1200" dirty="0"/>
-                        <a:t>-</a:t>
-                      </a:r>
-                    </a:p>
-                  </a:txBody>
-                  <a:tcPr anchor="ctr"/>
-                </a:tc>
-                <a:tc>
-                  <a:txBody>
-                    <a:bodyPr/>
-                    <a:lstStyle/>
-                    <a:p>
-                      <a:pPr algn="ctr"/>
-                      <a:r>
-                        <a:rPr lang="en-US" sz="1200" dirty="0"/>
-                        <a:t>X</a:t>
-                      </a:r>
-                    </a:p>
-                  </a:txBody>
-                  <a:tcPr anchor="ctr"/>
-                </a:tc>
-                <a:tc>
-                  <a:txBody>
-                    <a:bodyPr/>
-                    <a:lstStyle/>
-                    <a:p>
-                      <a:pPr algn="ctr"/>
-                      <a:r>
-                        <a:rPr lang="en-US" sz="1200" dirty="0"/>
-                        <a:t>-</a:t>
-                      </a:r>
-                    </a:p>
-                  </a:txBody>
-                  <a:tcPr anchor="ctr"/>
-                </a:tc>
-                <a:tc>
-                  <a:txBody>
-                    <a:bodyPr/>
-                    <a:lstStyle/>
-                    <a:p>
-                      <a:pPr algn="ctr"/>
-                      <a:r>
-                        <a:rPr lang="en-US" sz="1200" dirty="0"/>
-                        <a:t>X</a:t>
-                      </a:r>
-                    </a:p>
-                  </a:txBody>
-                  <a:tcPr anchor="ctr"/>
-                </a:tc>
-                <a:tc>
-                  <a:txBody>
-                    <a:bodyPr/>
-                    <a:lstStyle/>
-                    <a:p>
-                      <a:pPr algn="ctr"/>
-                      <a:r>
-                        <a:rPr lang="en-US" sz="1200" dirty="0"/>
-                        <a:t>X</a:t>
-                      </a:r>
-                    </a:p>
-                  </a:txBody>
-                  <a:tcPr anchor="ctr"/>
-                </a:tc>
-                <a:extLst>
-                  <a:ext uri="{0D108BD9-81ED-4DB2-BD59-A6C34878D82A}">
-                    <a16:rowId xmlns:a16="http://schemas.microsoft.com/office/drawing/2014/main" val="3052349962"/>
-                  </a:ext>
-                </a:extLst>
-              </a:tr>
-            </a:tbl>
-          </a:graphicData>
-        </a:graphic>
-      </p:graphicFrame>
-      <p:graphicFrame>
-        <p:nvGraphicFramePr>
-          <p:cNvPr id="7" name="Table 4">
-            <a:extLst>
-              <a:ext uri="{FF2B5EF4-FFF2-40B4-BE49-F238E27FC236}">
-                <a16:creationId xmlns:a16="http://schemas.microsoft.com/office/drawing/2014/main" id="{9773C354-B055-43E8-B33F-87D86B343428}"/>
-              </a:ext>
-            </a:extLst>
-          </p:cNvPr>
-          <p:cNvGraphicFramePr>
-            <a:graphicFrameLocks noGrp="1"/>
-          </p:cNvGraphicFramePr>
-          <p:nvPr>
-            <p:extLst>
-              <p:ext uri="{D42A27DB-BD31-4B8C-83A1-F6EECF244321}">
-                <p14:modId xmlns:p14="http://schemas.microsoft.com/office/powerpoint/2010/main" val="568546121"/>
-              </p:ext>
-            </p:extLst>
-          </p:nvPr>
-        </p:nvGraphicFramePr>
-        <p:xfrm>
-          <a:off x="6346614" y="4117508"/>
-          <a:ext cx="5228559" cy="847575"/>
-        </p:xfrm>
-        <a:graphic>
-          <a:graphicData uri="http://schemas.openxmlformats.org/drawingml/2006/table">
-            <a:tbl>
-              <a:tblPr firstRow="1" bandRow="1">
-                <a:tableStyleId>{9D7B26C5-4107-4FEC-AEDC-1716B250A1EF}</a:tableStyleId>
-              </a:tblPr>
-              <a:tblGrid>
-                <a:gridCol w="1284312">
-                  <a:extLst>
-                    <a:ext uri="{9D8B030D-6E8A-4147-A177-3AD203B41FA5}">
-                      <a16:colId xmlns:a16="http://schemas.microsoft.com/office/drawing/2014/main" val="1786597057"/>
-                    </a:ext>
-                  </a:extLst>
-                </a:gridCol>
-                <a:gridCol w="737956">
-                  <a:extLst>
-                    <a:ext uri="{9D8B030D-6E8A-4147-A177-3AD203B41FA5}">
-                      <a16:colId xmlns:a16="http://schemas.microsoft.com/office/drawing/2014/main" val="1936470344"/>
-                    </a:ext>
-                  </a:extLst>
-                </a:gridCol>
-                <a:gridCol w="788848">
-                  <a:extLst>
-                    <a:ext uri="{9D8B030D-6E8A-4147-A177-3AD203B41FA5}">
-                      <a16:colId xmlns:a16="http://schemas.microsoft.com/office/drawing/2014/main" val="3147797879"/>
-                    </a:ext>
-                  </a:extLst>
-                </a:gridCol>
-                <a:gridCol w="763403">
-                  <a:extLst>
-                    <a:ext uri="{9D8B030D-6E8A-4147-A177-3AD203B41FA5}">
-                      <a16:colId xmlns:a16="http://schemas.microsoft.com/office/drawing/2014/main" val="78292725"/>
-                    </a:ext>
-                  </a:extLst>
-                </a:gridCol>
-                <a:gridCol w="805814">
-                  <a:extLst>
-                    <a:ext uri="{9D8B030D-6E8A-4147-A177-3AD203B41FA5}">
-                      <a16:colId xmlns:a16="http://schemas.microsoft.com/office/drawing/2014/main" val="2212457586"/>
-                    </a:ext>
-                  </a:extLst>
-                </a:gridCol>
-                <a:gridCol w="848226">
-                  <a:extLst>
-                    <a:ext uri="{9D8B030D-6E8A-4147-A177-3AD203B41FA5}">
-                      <a16:colId xmlns:a16="http://schemas.microsoft.com/office/drawing/2014/main" val="1181174887"/>
-                    </a:ext>
-                  </a:extLst>
-                </a:gridCol>
-              </a:tblGrid>
-              <a:tr h="282525">
-                <a:tc>
-                  <a:txBody>
-                    <a:bodyPr/>
-                    <a:lstStyle/>
-                    <a:p>
-                      <a:pPr algn="ctr"/>
-                      <a:endParaRPr lang="en-US" sz="1200" dirty="0"/>
-                    </a:p>
-                  </a:txBody>
-                  <a:tcPr anchor="ctr"/>
-                </a:tc>
-                <a:tc>
-                  <a:txBody>
-                    <a:bodyPr/>
-                    <a:lstStyle/>
-                    <a:p>
-                      <a:pPr algn="ctr"/>
-                      <a:r>
-                        <a:rPr lang="en-US" sz="1200" dirty="0"/>
-                        <a:t>ASK</a:t>
-                      </a:r>
-                    </a:p>
-                  </a:txBody>
-                  <a:tcPr anchor="ctr"/>
-                </a:tc>
-                <a:tc>
-                  <a:txBody>
-                    <a:bodyPr/>
-                    <a:lstStyle/>
-                    <a:p>
-                      <a:pPr lvl="0" algn="ctr">
-                        <a:buNone/>
-                      </a:pPr>
-                      <a:r>
-                        <a:rPr lang="en-US" sz="1200" u="none" strike="noStrike" noProof="0" dirty="0"/>
-                        <a:t> </a:t>
-                      </a:r>
-                      <a:r>
-                        <a:rPr lang="en-US" sz="1200" u="none" strike="noStrike" noProof="0" dirty="0" err="1"/>
-                        <a:t>ClimWIP</a:t>
-                      </a:r>
-                      <a:endParaRPr lang="en-US" sz="1200" dirty="0"/>
-                    </a:p>
-                  </a:txBody>
-                  <a:tcPr anchor="ctr"/>
-                </a:tc>
-                <a:tc>
-                  <a:txBody>
-                    <a:bodyPr/>
-                    <a:lstStyle/>
-                    <a:p>
-                      <a:pPr algn="ctr"/>
-                      <a:r>
-                        <a:rPr lang="en-US" sz="1200" dirty="0" err="1"/>
-                        <a:t>HistC</a:t>
-                      </a:r>
-                      <a:endParaRPr lang="en-US" sz="1200" dirty="0"/>
-                    </a:p>
-                  </a:txBody>
-                  <a:tcPr anchor="ctr"/>
-                </a:tc>
-                <a:tc>
-                  <a:txBody>
-                    <a:bodyPr/>
-                    <a:lstStyle/>
-                    <a:p>
-                      <a:pPr algn="ctr"/>
-                      <a:r>
-                        <a:rPr lang="en-US" sz="1200" dirty="0"/>
-                        <a:t>REA</a:t>
-                      </a:r>
-                    </a:p>
-                  </a:txBody>
-                  <a:tcPr anchor="ctr"/>
-                </a:tc>
-                <a:tc>
-                  <a:txBody>
-                    <a:bodyPr/>
-                    <a:lstStyle/>
-                    <a:p>
-                      <a:pPr algn="ctr"/>
-                      <a:r>
-                        <a:rPr lang="en-US" sz="1200" dirty="0"/>
-                        <a:t>UKCP</a:t>
-                      </a:r>
-                    </a:p>
-                  </a:txBody>
-                  <a:tcPr anchor="ctr"/>
-                </a:tc>
-                <a:extLst>
-                  <a:ext uri="{0D108BD9-81ED-4DB2-BD59-A6C34878D82A}">
-                    <a16:rowId xmlns:a16="http://schemas.microsoft.com/office/drawing/2014/main" val="3791754860"/>
-                  </a:ext>
-                </a:extLst>
-              </a:tr>
-              <a:tr h="282525">
-                <a:tc>
-                  <a:txBody>
-                    <a:bodyPr/>
-                    <a:lstStyle/>
-                    <a:p>
-                      <a:pPr algn="ctr"/>
-                      <a:r>
-                        <a:rPr lang="en-US" sz="1200" dirty="0"/>
-                        <a:t>Constrained</a:t>
-                      </a:r>
-                    </a:p>
-                  </a:txBody>
-                  <a:tcPr anchor="ctr"/>
-                </a:tc>
-                <a:tc>
-                  <a:txBody>
-                    <a:bodyPr/>
-                    <a:lstStyle/>
-                    <a:p>
-                      <a:pPr algn="ctr"/>
-                      <a:r>
-                        <a:rPr lang="en-US" sz="1200" dirty="0"/>
-                        <a:t>X</a:t>
-                      </a:r>
-                    </a:p>
-                  </a:txBody>
-                  <a:tcPr anchor="ctr"/>
-                </a:tc>
-                <a:tc>
-                  <a:txBody>
-                    <a:bodyPr/>
-                    <a:lstStyle/>
-                    <a:p>
-                      <a:pPr algn="ctr"/>
-                      <a:r>
-                        <a:rPr lang="en-US" sz="1200" dirty="0"/>
-                        <a:t>X</a:t>
-                      </a:r>
-                    </a:p>
-                  </a:txBody>
-                  <a:tcPr anchor="ctr"/>
-                </a:tc>
-                <a:tc>
-                  <a:txBody>
-                    <a:bodyPr/>
-                    <a:lstStyle/>
-                    <a:p>
-                      <a:pPr algn="ctr"/>
-                      <a:r>
-                        <a:rPr lang="en-US" sz="1200" dirty="0"/>
-                        <a:t>X</a:t>
-                      </a:r>
-                    </a:p>
-                  </a:txBody>
-                  <a:tcPr anchor="ctr"/>
-                </a:tc>
-                <a:tc>
-                  <a:txBody>
-                    <a:bodyPr/>
-                    <a:lstStyle/>
-                    <a:p>
-                      <a:pPr algn="ctr"/>
-                      <a:r>
-                        <a:rPr lang="en-US" sz="1200" dirty="0"/>
-                        <a:t>X</a:t>
-                      </a:r>
-                    </a:p>
-                  </a:txBody>
-                  <a:tcPr anchor="ctr"/>
-                </a:tc>
-                <a:tc>
-                  <a:txBody>
-                    <a:bodyPr/>
-                    <a:lstStyle/>
-                    <a:p>
-                      <a:pPr algn="ctr"/>
-                      <a:r>
-                        <a:rPr lang="en-US" sz="1200" dirty="0"/>
-                        <a:t>X</a:t>
-                      </a:r>
-                    </a:p>
-                  </a:txBody>
-                  <a:tcPr anchor="ctr"/>
-                </a:tc>
-                <a:extLst>
-                  <a:ext uri="{0D108BD9-81ED-4DB2-BD59-A6C34878D82A}">
-                    <a16:rowId xmlns:a16="http://schemas.microsoft.com/office/drawing/2014/main" val="893037035"/>
-                  </a:ext>
-                </a:extLst>
-              </a:tr>
-              <a:tr h="282525">
-                <a:tc>
-                  <a:txBody>
-                    <a:bodyPr/>
-                    <a:lstStyle/>
-                    <a:p>
-                      <a:pPr algn="ctr"/>
-                      <a:r>
-                        <a:rPr lang="en-US" sz="1200" dirty="0"/>
-                        <a:t>unconstrained</a:t>
-                      </a:r>
-                    </a:p>
-                  </a:txBody>
-                  <a:tcPr anchor="ctr"/>
-                </a:tc>
-                <a:tc>
-                  <a:txBody>
-                    <a:bodyPr/>
-                    <a:lstStyle/>
-                    <a:p>
-                      <a:pPr algn="ctr"/>
-                      <a:r>
-                        <a:rPr lang="en-US" sz="1200" dirty="0"/>
-                        <a:t>-</a:t>
-                      </a:r>
-                    </a:p>
-                  </a:txBody>
-                  <a:tcPr anchor="ctr"/>
-                </a:tc>
-                <a:tc>
-                  <a:txBody>
-                    <a:bodyPr/>
-                    <a:lstStyle/>
-                    <a:p>
-                      <a:pPr algn="ctr"/>
-                      <a:r>
-                        <a:rPr lang="en-US" sz="1200" dirty="0"/>
-                        <a:t>X</a:t>
-                      </a:r>
-                    </a:p>
-                  </a:txBody>
-                  <a:tcPr anchor="ctr"/>
-                </a:tc>
-                <a:tc>
-                  <a:txBody>
-                    <a:bodyPr/>
-                    <a:lstStyle/>
-                    <a:p>
-                      <a:pPr algn="ctr"/>
-                      <a:r>
-                        <a:rPr lang="en-US" sz="1200" dirty="0"/>
-                        <a:t>X</a:t>
-                      </a:r>
-                    </a:p>
-                  </a:txBody>
-                  <a:tcPr anchor="ctr"/>
-                </a:tc>
-                <a:tc>
-                  <a:txBody>
-                    <a:bodyPr/>
-                    <a:lstStyle/>
-                    <a:p>
-                      <a:pPr algn="ctr"/>
-                      <a:r>
-                        <a:rPr lang="en-US" sz="1200" dirty="0"/>
-                        <a:t>X</a:t>
-                      </a:r>
-                    </a:p>
-                  </a:txBody>
-                  <a:tcPr anchor="ctr"/>
-                </a:tc>
-                <a:tc>
-                  <a:txBody>
-                    <a:bodyPr/>
-                    <a:lstStyle/>
-                    <a:p>
-                      <a:pPr algn="ctr"/>
-                      <a:r>
-                        <a:rPr lang="en-US" sz="1200" dirty="0"/>
-                        <a:t>X</a:t>
-                      </a:r>
-                    </a:p>
-                  </a:txBody>
-                  <a:tcPr anchor="ctr"/>
-                </a:tc>
-                <a:extLst>
-                  <a:ext uri="{0D108BD9-81ED-4DB2-BD59-A6C34878D82A}">
-                    <a16:rowId xmlns:a16="http://schemas.microsoft.com/office/drawing/2014/main" val="3052349962"/>
-                  </a:ext>
-                </a:extLst>
-              </a:tr>
-            </a:tbl>
-          </a:graphicData>
-        </a:graphic>
-      </p:graphicFrame>
-      <p:sp>
-        <p:nvSpPr>
-          <p:cNvPr id="9" name="Subtitle 2">
-            <a:extLst>
-              <a:ext uri="{FF2B5EF4-FFF2-40B4-BE49-F238E27FC236}">
-                <a16:creationId xmlns:a16="http://schemas.microsoft.com/office/drawing/2014/main" id="{BC2DE4F4-0676-47E8-81A3-AFA53F44BBEB}"/>
-              </a:ext>
-            </a:extLst>
-          </p:cNvPr>
-          <p:cNvSpPr txBox="1">
-            <a:spLocks/>
-          </p:cNvSpPr>
-          <p:nvPr/>
-        </p:nvSpPr>
+          </a:blip>
+          <a:stretch>
+            <a:fillRect/>
+          </a:stretch>
+        </p:blipFill>
         <p:spPr>
           <a:xfrm>
-            <a:off x="270934" y="1485371"/>
-            <a:ext cx="2734734" cy="351895"/>
+            <a:off x="5173133" y="3293533"/>
+            <a:ext cx="262467" cy="262467"/>
           </a:xfrm>
           <a:prstGeom prst="rect">
             <a:avLst/>
           </a:prstGeom>
         </p:spPr>
-        <p:txBody>
-          <a:bodyPr vert="horz" lIns="91440" tIns="45720" rIns="91440" bIns="45720" rtlCol="0" anchor="t">
-            <a:noAutofit/>
-          </a:bodyPr>
-          <a:lstStyle>
-            <a:lvl1pPr marL="0" indent="0" algn="ctr" defTabSz="914400" rtl="0" eaLnBrk="1" latinLnBrk="0" hangingPunct="1">
-              <a:lnSpc>
-                <a:spcPct val="90000"/>
-              </a:lnSpc>
-              <a:spcBef>
-                <a:spcPts val="1000"/>
-              </a:spcBef>
-              <a:buFont typeface="Arial" panose="020B0604020202020204" pitchFamily="34" charset="0"/>
-              <a:buNone/>
-              <a:defRPr sz="2400" kern="1200">
-                <a:solidFill>
-                  <a:schemeClr val="tx1"/>
-                </a:solidFill>
-                <a:latin typeface="+mn-lt"/>
-                <a:ea typeface="+mn-ea"/>
-                <a:cs typeface="+mn-cs"/>
-              </a:defRPr>
-            </a:lvl1pPr>
-            <a:lvl2pPr marL="457200" indent="0" algn="ctr" defTabSz="914400" rtl="0" eaLnBrk="1" latinLnBrk="0" hangingPunct="1">
-              <a:lnSpc>
-                <a:spcPct val="90000"/>
-              </a:lnSpc>
-              <a:spcBef>
-                <a:spcPts val="500"/>
-              </a:spcBef>
-              <a:buFont typeface="Arial" panose="020B0604020202020204" pitchFamily="34" charset="0"/>
-              <a:buNone/>
-              <a:defRPr sz="2000" kern="1200">
-                <a:solidFill>
-                  <a:schemeClr val="tx1"/>
-                </a:solidFill>
-                <a:latin typeface="+mn-lt"/>
-                <a:ea typeface="+mn-ea"/>
-                <a:cs typeface="+mn-cs"/>
-              </a:defRPr>
-            </a:lvl2pPr>
-            <a:lvl3pPr marL="914400" indent="0" algn="ctr" defTabSz="914400" rtl="0" eaLnBrk="1" latinLnBrk="0" hangingPunct="1">
-              <a:lnSpc>
-                <a:spcPct val="90000"/>
-              </a:lnSpc>
-              <a:spcBef>
-                <a:spcPts val="500"/>
-              </a:spcBef>
-              <a:buFont typeface="Arial" panose="020B0604020202020204" pitchFamily="34" charset="0"/>
-              <a:buNone/>
-              <a:defRPr sz="1800" kern="1200">
-                <a:solidFill>
-                  <a:schemeClr val="tx1"/>
-                </a:solidFill>
-                <a:latin typeface="+mn-lt"/>
-                <a:ea typeface="+mn-ea"/>
-                <a:cs typeface="+mn-cs"/>
-              </a:defRPr>
-            </a:lvl3pPr>
-            <a:lvl4pPr marL="1371600" indent="0" algn="ctr" defTabSz="914400" rtl="0" eaLnBrk="1" latinLnBrk="0" hangingPunct="1">
-              <a:lnSpc>
-                <a:spcPct val="90000"/>
-              </a:lnSpc>
-              <a:spcBef>
-                <a:spcPts val="500"/>
-              </a:spcBef>
-              <a:buFont typeface="Arial" panose="020B0604020202020204" pitchFamily="34" charset="0"/>
-              <a:buNone/>
-              <a:defRPr sz="1600" kern="1200">
-                <a:solidFill>
-                  <a:schemeClr val="tx1"/>
-                </a:solidFill>
-                <a:latin typeface="+mn-lt"/>
-                <a:ea typeface="+mn-ea"/>
-                <a:cs typeface="+mn-cs"/>
-              </a:defRPr>
-            </a:lvl4pPr>
-            <a:lvl5pPr marL="1828800" indent="0" algn="ctr" defTabSz="914400" rtl="0" eaLnBrk="1" latinLnBrk="0" hangingPunct="1">
-              <a:lnSpc>
-                <a:spcPct val="90000"/>
-              </a:lnSpc>
-              <a:spcBef>
-                <a:spcPts val="500"/>
-              </a:spcBef>
-              <a:buFont typeface="Arial" panose="020B0604020202020204" pitchFamily="34" charset="0"/>
-              <a:buNone/>
-              <a:defRPr sz="1600" kern="1200">
-                <a:solidFill>
-                  <a:schemeClr val="tx1"/>
-                </a:solidFill>
-                <a:latin typeface="+mn-lt"/>
-                <a:ea typeface="+mn-ea"/>
-                <a:cs typeface="+mn-cs"/>
-              </a:defRPr>
-            </a:lvl5pPr>
-            <a:lvl6pPr marL="2286000" indent="0" algn="ctr" defTabSz="914400" rtl="0" eaLnBrk="1" latinLnBrk="0" hangingPunct="1">
-              <a:lnSpc>
-                <a:spcPct val="90000"/>
-              </a:lnSpc>
-              <a:spcBef>
-                <a:spcPts val="500"/>
-              </a:spcBef>
-              <a:buFont typeface="Arial" panose="020B0604020202020204" pitchFamily="34" charset="0"/>
-              <a:buNone/>
-              <a:defRPr sz="1600" kern="1200">
-                <a:solidFill>
-                  <a:schemeClr val="tx1"/>
-                </a:solidFill>
-                <a:latin typeface="+mn-lt"/>
-                <a:ea typeface="+mn-ea"/>
-                <a:cs typeface="+mn-cs"/>
-              </a:defRPr>
-            </a:lvl6pPr>
-            <a:lvl7pPr marL="2743200" indent="0" algn="ctr" defTabSz="914400" rtl="0" eaLnBrk="1" latinLnBrk="0" hangingPunct="1">
-              <a:lnSpc>
-                <a:spcPct val="90000"/>
-              </a:lnSpc>
-              <a:spcBef>
-                <a:spcPts val="500"/>
-              </a:spcBef>
-              <a:buFont typeface="Arial" panose="020B0604020202020204" pitchFamily="34" charset="0"/>
-              <a:buNone/>
-              <a:defRPr sz="1600" kern="1200">
-                <a:solidFill>
-                  <a:schemeClr val="tx1"/>
-                </a:solidFill>
-                <a:latin typeface="+mn-lt"/>
-                <a:ea typeface="+mn-ea"/>
-                <a:cs typeface="+mn-cs"/>
-              </a:defRPr>
-            </a:lvl7pPr>
-            <a:lvl8pPr marL="3200400" indent="0" algn="ctr" defTabSz="914400" rtl="0" eaLnBrk="1" latinLnBrk="0" hangingPunct="1">
-              <a:lnSpc>
-                <a:spcPct val="90000"/>
-              </a:lnSpc>
-              <a:spcBef>
-                <a:spcPts val="500"/>
-              </a:spcBef>
-              <a:buFont typeface="Arial" panose="020B0604020202020204" pitchFamily="34" charset="0"/>
-              <a:buNone/>
-              <a:defRPr sz="1600" kern="1200">
-                <a:solidFill>
-                  <a:schemeClr val="tx1"/>
-                </a:solidFill>
-                <a:latin typeface="+mn-lt"/>
-                <a:ea typeface="+mn-ea"/>
-                <a:cs typeface="+mn-cs"/>
-              </a:defRPr>
-            </a:lvl8pPr>
-            <a:lvl9pPr marL="3657600" indent="0" algn="ctr" defTabSz="914400" rtl="0" eaLnBrk="1" latinLnBrk="0" hangingPunct="1">
-              <a:lnSpc>
-                <a:spcPct val="90000"/>
-              </a:lnSpc>
-              <a:spcBef>
-                <a:spcPts val="500"/>
-              </a:spcBef>
-              <a:buFont typeface="Arial" panose="020B0604020202020204" pitchFamily="34" charset="0"/>
-              <a:buNone/>
-              <a:defRPr sz="1600" kern="1200">
-                <a:solidFill>
-                  <a:schemeClr val="tx1"/>
-                </a:solidFill>
-                <a:latin typeface="+mn-lt"/>
-                <a:ea typeface="+mn-ea"/>
-                <a:cs typeface="+mn-cs"/>
-              </a:defRPr>
-            </a:lvl9pPr>
-          </a:lstStyle>
-          <a:p>
-            <a:r>
-              <a:rPr lang="en-US" sz="1600" dirty="0">
-                <a:cs typeface="Calibri"/>
-              </a:rPr>
-              <a:t>Datasets and methods</a:t>
-            </a:r>
-            <a:endParaRPr lang="en-US" dirty="0"/>
-          </a:p>
-          <a:p>
-            <a:endParaRPr lang="en-US" sz="1200" dirty="0">
-              <a:cs typeface="Calibri"/>
-            </a:endParaRPr>
-          </a:p>
-          <a:p>
-            <a:endParaRPr lang="en-US" sz="1200" dirty="0">
-              <a:ea typeface="+mn-lt"/>
-              <a:cs typeface="+mn-lt"/>
-            </a:endParaRPr>
-          </a:p>
-          <a:p>
-            <a:endParaRPr lang="en-US" sz="1200" dirty="0">
-              <a:ea typeface="+mn-lt"/>
-              <a:cs typeface="+mn-lt"/>
-            </a:endParaRPr>
-          </a:p>
-          <a:p>
-            <a:endParaRPr lang="en-US" sz="1200" dirty="0">
-              <a:ea typeface="+mn-lt"/>
-              <a:cs typeface="+mn-lt"/>
-            </a:endParaRPr>
-          </a:p>
-        </p:txBody>
-      </p:sp>
-      <p:sp>
-        <p:nvSpPr>
-          <p:cNvPr id="10" name="Subtitle 2">
+      </p:pic>
+      <p:pic>
+        <p:nvPicPr>
+          <p:cNvPr id="13" name="Graphic 12" descr="Checkmark with solid fill">
             <a:extLst>
               <a:ext uri="{FF2B5EF4-FFF2-40B4-BE49-F238E27FC236}">
-                <a16:creationId xmlns:a16="http://schemas.microsoft.com/office/drawing/2014/main" id="{D3D8CAFC-1ADE-4400-95D3-E00B23CD0518}"/>
+                <a16:creationId xmlns:a16="http://schemas.microsoft.com/office/drawing/2014/main" id="{340C8421-1A34-40DC-929E-1D1A9EC3AE66}"/>
               </a:ext>
             </a:extLst>
           </p:cNvPr>
-          <p:cNvSpPr txBox="1">
-            <a:spLocks/>
-          </p:cNvSpPr>
+          <p:cNvPicPr>
+            <a:picLocks noChangeAspect="1"/>
+          </p:cNvPicPr>
           <p:nvPr/>
-        </p:nvSpPr>
+        </p:nvPicPr>
+        <p:blipFill>
+          <a:blip r:embed="rId2">
+            <a:extLst>
+              <a:ext uri="{96DAC541-7B7A-43D3-8B79-37D633B846F1}">
+                <asvg:svgBlip xmlns:asvg="http://schemas.microsoft.com/office/drawing/2016/SVG/main" r:embed="rId3"/>
+              </a:ext>
+            </a:extLst>
+          </a:blip>
+          <a:stretch>
+            <a:fillRect/>
+          </a:stretch>
+        </p:blipFill>
         <p:spPr>
           <a:xfrm>
-            <a:off x="5858934" y="1476904"/>
-            <a:ext cx="2734734" cy="351895"/>
+            <a:off x="8466666" y="3877733"/>
+            <a:ext cx="262467" cy="262467"/>
           </a:xfrm>
           <a:prstGeom prst="rect">
             <a:avLst/>
           </a:prstGeom>
         </p:spPr>
-        <p:txBody>
-          <a:bodyPr vert="horz" lIns="91440" tIns="45720" rIns="91440" bIns="45720" rtlCol="0" anchor="t">
-            <a:noAutofit/>
-          </a:bodyPr>
-          <a:lstStyle>
-            <a:lvl1pPr marL="0" indent="0" algn="ctr" defTabSz="914400" rtl="0" eaLnBrk="1" latinLnBrk="0" hangingPunct="1">
-              <a:lnSpc>
-                <a:spcPct val="90000"/>
-              </a:lnSpc>
-              <a:spcBef>
-                <a:spcPts val="1000"/>
-              </a:spcBef>
-              <a:buFont typeface="Arial" panose="020B0604020202020204" pitchFamily="34" charset="0"/>
-              <a:buNone/>
-              <a:defRPr sz="2400" kern="1200">
-                <a:solidFill>
-                  <a:schemeClr val="tx1"/>
-                </a:solidFill>
-                <a:latin typeface="+mn-lt"/>
-                <a:ea typeface="+mn-ea"/>
-                <a:cs typeface="+mn-cs"/>
-              </a:defRPr>
-            </a:lvl1pPr>
-            <a:lvl2pPr marL="457200" indent="0" algn="ctr" defTabSz="914400" rtl="0" eaLnBrk="1" latinLnBrk="0" hangingPunct="1">
-              <a:lnSpc>
-                <a:spcPct val="90000"/>
-              </a:lnSpc>
-              <a:spcBef>
-                <a:spcPts val="500"/>
-              </a:spcBef>
-              <a:buFont typeface="Arial" panose="020B0604020202020204" pitchFamily="34" charset="0"/>
-              <a:buNone/>
-              <a:defRPr sz="2000" kern="1200">
-                <a:solidFill>
-                  <a:schemeClr val="tx1"/>
-                </a:solidFill>
-                <a:latin typeface="+mn-lt"/>
-                <a:ea typeface="+mn-ea"/>
-                <a:cs typeface="+mn-cs"/>
-              </a:defRPr>
-            </a:lvl2pPr>
-            <a:lvl3pPr marL="914400" indent="0" algn="ctr" defTabSz="914400" rtl="0" eaLnBrk="1" latinLnBrk="0" hangingPunct="1">
-              <a:lnSpc>
-                <a:spcPct val="90000"/>
-              </a:lnSpc>
-              <a:spcBef>
-                <a:spcPts val="500"/>
-              </a:spcBef>
-              <a:buFont typeface="Arial" panose="020B0604020202020204" pitchFamily="34" charset="0"/>
-              <a:buNone/>
-              <a:defRPr sz="1800" kern="1200">
-                <a:solidFill>
-                  <a:schemeClr val="tx1"/>
-                </a:solidFill>
-                <a:latin typeface="+mn-lt"/>
-                <a:ea typeface="+mn-ea"/>
-                <a:cs typeface="+mn-cs"/>
-              </a:defRPr>
-            </a:lvl3pPr>
-            <a:lvl4pPr marL="1371600" indent="0" algn="ctr" defTabSz="914400" rtl="0" eaLnBrk="1" latinLnBrk="0" hangingPunct="1">
-              <a:lnSpc>
-                <a:spcPct val="90000"/>
-              </a:lnSpc>
-              <a:spcBef>
-                <a:spcPts val="500"/>
-              </a:spcBef>
-              <a:buFont typeface="Arial" panose="020B0604020202020204" pitchFamily="34" charset="0"/>
-              <a:buNone/>
-              <a:defRPr sz="1600" kern="1200">
-                <a:solidFill>
-                  <a:schemeClr val="tx1"/>
-                </a:solidFill>
-                <a:latin typeface="+mn-lt"/>
-                <a:ea typeface="+mn-ea"/>
-                <a:cs typeface="+mn-cs"/>
-              </a:defRPr>
-            </a:lvl4pPr>
-            <a:lvl5pPr marL="1828800" indent="0" algn="ctr" defTabSz="914400" rtl="0" eaLnBrk="1" latinLnBrk="0" hangingPunct="1">
-              <a:lnSpc>
-                <a:spcPct val="90000"/>
-              </a:lnSpc>
-              <a:spcBef>
-                <a:spcPts val="500"/>
-              </a:spcBef>
-              <a:buFont typeface="Arial" panose="020B0604020202020204" pitchFamily="34" charset="0"/>
-              <a:buNone/>
-              <a:defRPr sz="1600" kern="1200">
-                <a:solidFill>
-                  <a:schemeClr val="tx1"/>
-                </a:solidFill>
-                <a:latin typeface="+mn-lt"/>
-                <a:ea typeface="+mn-ea"/>
-                <a:cs typeface="+mn-cs"/>
-              </a:defRPr>
-            </a:lvl5pPr>
-            <a:lvl6pPr marL="2286000" indent="0" algn="ctr" defTabSz="914400" rtl="0" eaLnBrk="1" latinLnBrk="0" hangingPunct="1">
-              <a:lnSpc>
-                <a:spcPct val="90000"/>
-              </a:lnSpc>
-              <a:spcBef>
-                <a:spcPts val="500"/>
-              </a:spcBef>
-              <a:buFont typeface="Arial" panose="020B0604020202020204" pitchFamily="34" charset="0"/>
-              <a:buNone/>
-              <a:defRPr sz="1600" kern="1200">
-                <a:solidFill>
-                  <a:schemeClr val="tx1"/>
-                </a:solidFill>
-                <a:latin typeface="+mn-lt"/>
-                <a:ea typeface="+mn-ea"/>
-                <a:cs typeface="+mn-cs"/>
-              </a:defRPr>
-            </a:lvl6pPr>
-            <a:lvl7pPr marL="2743200" indent="0" algn="ctr" defTabSz="914400" rtl="0" eaLnBrk="1" latinLnBrk="0" hangingPunct="1">
-              <a:lnSpc>
-                <a:spcPct val="90000"/>
-              </a:lnSpc>
-              <a:spcBef>
-                <a:spcPts val="500"/>
-              </a:spcBef>
-              <a:buFont typeface="Arial" panose="020B0604020202020204" pitchFamily="34" charset="0"/>
-              <a:buNone/>
-              <a:defRPr sz="1600" kern="1200">
-                <a:solidFill>
-                  <a:schemeClr val="tx1"/>
-                </a:solidFill>
-                <a:latin typeface="+mn-lt"/>
-                <a:ea typeface="+mn-ea"/>
-                <a:cs typeface="+mn-cs"/>
-              </a:defRPr>
-            </a:lvl7pPr>
-            <a:lvl8pPr marL="3200400" indent="0" algn="ctr" defTabSz="914400" rtl="0" eaLnBrk="1" latinLnBrk="0" hangingPunct="1">
-              <a:lnSpc>
-                <a:spcPct val="90000"/>
-              </a:lnSpc>
-              <a:spcBef>
-                <a:spcPts val="500"/>
-              </a:spcBef>
-              <a:buFont typeface="Arial" panose="020B0604020202020204" pitchFamily="34" charset="0"/>
-              <a:buNone/>
-              <a:defRPr sz="1600" kern="1200">
-                <a:solidFill>
-                  <a:schemeClr val="tx1"/>
-                </a:solidFill>
-                <a:latin typeface="+mn-lt"/>
-                <a:ea typeface="+mn-ea"/>
-                <a:cs typeface="+mn-cs"/>
-              </a:defRPr>
-            </a:lvl8pPr>
-            <a:lvl9pPr marL="3657600" indent="0" algn="ctr" defTabSz="914400" rtl="0" eaLnBrk="1" latinLnBrk="0" hangingPunct="1">
-              <a:lnSpc>
-                <a:spcPct val="90000"/>
-              </a:lnSpc>
-              <a:spcBef>
-                <a:spcPts val="500"/>
-              </a:spcBef>
-              <a:buFont typeface="Arial" panose="020B0604020202020204" pitchFamily="34" charset="0"/>
-              <a:buNone/>
-              <a:defRPr sz="1600" kern="1200">
-                <a:solidFill>
-                  <a:schemeClr val="tx1"/>
-                </a:solidFill>
-                <a:latin typeface="+mn-lt"/>
-                <a:ea typeface="+mn-ea"/>
-                <a:cs typeface="+mn-cs"/>
-              </a:defRPr>
-            </a:lvl9pPr>
-          </a:lstStyle>
-          <a:p>
-            <a:r>
-              <a:rPr lang="en-US" sz="1600" dirty="0">
-                <a:cs typeface="Calibri"/>
-              </a:rPr>
-              <a:t>Variables and methods</a:t>
-            </a:r>
-            <a:endParaRPr lang="en-US" dirty="0"/>
-          </a:p>
-          <a:p>
-            <a:endParaRPr lang="en-US" sz="1200" dirty="0">
-              <a:cs typeface="Calibri"/>
-            </a:endParaRPr>
-          </a:p>
-          <a:p>
-            <a:endParaRPr lang="en-US" sz="1200" dirty="0">
-              <a:ea typeface="+mn-lt"/>
-              <a:cs typeface="+mn-lt"/>
-            </a:endParaRPr>
-          </a:p>
-          <a:p>
-            <a:endParaRPr lang="en-US" sz="1200" dirty="0">
-              <a:ea typeface="+mn-lt"/>
-              <a:cs typeface="+mn-lt"/>
-            </a:endParaRPr>
-          </a:p>
-          <a:p>
-            <a:endParaRPr lang="en-US" sz="1200" dirty="0">
-              <a:ea typeface="+mn-lt"/>
-              <a:cs typeface="+mn-lt"/>
-            </a:endParaRPr>
-          </a:p>
-        </p:txBody>
-      </p:sp>
-      <p:sp>
-        <p:nvSpPr>
-          <p:cNvPr id="11" name="Subtitle 2">
+      </p:pic>
+      <p:pic>
+        <p:nvPicPr>
+          <p:cNvPr id="9" name="Graphic 8" descr="Checkmark with solid fill">
             <a:extLst>
               <a:ext uri="{FF2B5EF4-FFF2-40B4-BE49-F238E27FC236}">
-                <a16:creationId xmlns:a16="http://schemas.microsoft.com/office/drawing/2014/main" id="{CDC49E10-9D25-4133-8193-34726A5377F0}"/>
+                <a16:creationId xmlns:a16="http://schemas.microsoft.com/office/drawing/2014/main" id="{DCA81B2E-3CA9-4892-AEC3-452FD0D2CDF3}"/>
               </a:ext>
             </a:extLst>
           </p:cNvPr>
-          <p:cNvSpPr txBox="1">
-            <a:spLocks/>
-          </p:cNvSpPr>
+          <p:cNvPicPr>
+            <a:picLocks noChangeAspect="1"/>
+          </p:cNvPicPr>
           <p:nvPr/>
-        </p:nvSpPr>
+        </p:nvPicPr>
+        <p:blipFill>
+          <a:blip r:embed="rId2">
+            <a:extLst>
+              <a:ext uri="{96DAC541-7B7A-43D3-8B79-37D633B846F1}">
+                <asvg:svgBlip xmlns:asvg="http://schemas.microsoft.com/office/drawing/2016/SVG/main" r:embed="rId3"/>
+              </a:ext>
+            </a:extLst>
+          </a:blip>
+          <a:stretch>
+            <a:fillRect/>
+          </a:stretch>
+        </p:blipFill>
         <p:spPr>
           <a:xfrm>
-            <a:off x="406400" y="3729038"/>
-            <a:ext cx="2734734" cy="351895"/>
+            <a:off x="8466666" y="3302000"/>
+            <a:ext cx="262467" cy="262467"/>
           </a:xfrm>
           <a:prstGeom prst="rect">
             <a:avLst/>
           </a:prstGeom>
         </p:spPr>
-        <p:txBody>
-          <a:bodyPr vert="horz" lIns="91440" tIns="45720" rIns="91440" bIns="45720" rtlCol="0" anchor="t">
-            <a:noAutofit/>
-          </a:bodyPr>
-          <a:lstStyle>
-            <a:lvl1pPr marL="0" indent="0" algn="ctr" defTabSz="914400" rtl="0" eaLnBrk="1" latinLnBrk="0" hangingPunct="1">
-              <a:lnSpc>
-                <a:spcPct val="90000"/>
-              </a:lnSpc>
-              <a:spcBef>
-                <a:spcPts val="1000"/>
-              </a:spcBef>
-              <a:buFont typeface="Arial" panose="020B0604020202020204" pitchFamily="34" charset="0"/>
-              <a:buNone/>
-              <a:defRPr sz="2400" kern="1200">
-                <a:solidFill>
-                  <a:schemeClr val="tx1"/>
-                </a:solidFill>
-                <a:latin typeface="+mn-lt"/>
-                <a:ea typeface="+mn-ea"/>
-                <a:cs typeface="+mn-cs"/>
-              </a:defRPr>
-            </a:lvl1pPr>
-            <a:lvl2pPr marL="457200" indent="0" algn="ctr" defTabSz="914400" rtl="0" eaLnBrk="1" latinLnBrk="0" hangingPunct="1">
-              <a:lnSpc>
-                <a:spcPct val="90000"/>
-              </a:lnSpc>
-              <a:spcBef>
-                <a:spcPts val="500"/>
-              </a:spcBef>
-              <a:buFont typeface="Arial" panose="020B0604020202020204" pitchFamily="34" charset="0"/>
-              <a:buNone/>
-              <a:defRPr sz="2000" kern="1200">
-                <a:solidFill>
-                  <a:schemeClr val="tx1"/>
-                </a:solidFill>
-                <a:latin typeface="+mn-lt"/>
-                <a:ea typeface="+mn-ea"/>
-                <a:cs typeface="+mn-cs"/>
-              </a:defRPr>
-            </a:lvl2pPr>
-            <a:lvl3pPr marL="914400" indent="0" algn="ctr" defTabSz="914400" rtl="0" eaLnBrk="1" latinLnBrk="0" hangingPunct="1">
-              <a:lnSpc>
-                <a:spcPct val="90000"/>
-              </a:lnSpc>
-              <a:spcBef>
-                <a:spcPts val="500"/>
-              </a:spcBef>
-              <a:buFont typeface="Arial" panose="020B0604020202020204" pitchFamily="34" charset="0"/>
-              <a:buNone/>
-              <a:defRPr sz="1800" kern="1200">
-                <a:solidFill>
-                  <a:schemeClr val="tx1"/>
-                </a:solidFill>
-                <a:latin typeface="+mn-lt"/>
-                <a:ea typeface="+mn-ea"/>
-                <a:cs typeface="+mn-cs"/>
-              </a:defRPr>
-            </a:lvl3pPr>
-            <a:lvl4pPr marL="1371600" indent="0" algn="ctr" defTabSz="914400" rtl="0" eaLnBrk="1" latinLnBrk="0" hangingPunct="1">
-              <a:lnSpc>
-                <a:spcPct val="90000"/>
-              </a:lnSpc>
-              <a:spcBef>
-                <a:spcPts val="500"/>
-              </a:spcBef>
-              <a:buFont typeface="Arial" panose="020B0604020202020204" pitchFamily="34" charset="0"/>
-              <a:buNone/>
-              <a:defRPr sz="1600" kern="1200">
-                <a:solidFill>
-                  <a:schemeClr val="tx1"/>
-                </a:solidFill>
-                <a:latin typeface="+mn-lt"/>
-                <a:ea typeface="+mn-ea"/>
-                <a:cs typeface="+mn-cs"/>
-              </a:defRPr>
-            </a:lvl4pPr>
-            <a:lvl5pPr marL="1828800" indent="0" algn="ctr" defTabSz="914400" rtl="0" eaLnBrk="1" latinLnBrk="0" hangingPunct="1">
-              <a:lnSpc>
-                <a:spcPct val="90000"/>
-              </a:lnSpc>
-              <a:spcBef>
-                <a:spcPts val="500"/>
-              </a:spcBef>
-              <a:buFont typeface="Arial" panose="020B0604020202020204" pitchFamily="34" charset="0"/>
-              <a:buNone/>
-              <a:defRPr sz="1600" kern="1200">
-                <a:solidFill>
-                  <a:schemeClr val="tx1"/>
-                </a:solidFill>
-                <a:latin typeface="+mn-lt"/>
-                <a:ea typeface="+mn-ea"/>
-                <a:cs typeface="+mn-cs"/>
-              </a:defRPr>
-            </a:lvl5pPr>
-            <a:lvl6pPr marL="2286000" indent="0" algn="ctr" defTabSz="914400" rtl="0" eaLnBrk="1" latinLnBrk="0" hangingPunct="1">
-              <a:lnSpc>
-                <a:spcPct val="90000"/>
-              </a:lnSpc>
-              <a:spcBef>
-                <a:spcPts val="500"/>
-              </a:spcBef>
-              <a:buFont typeface="Arial" panose="020B0604020202020204" pitchFamily="34" charset="0"/>
-              <a:buNone/>
-              <a:defRPr sz="1600" kern="1200">
-                <a:solidFill>
-                  <a:schemeClr val="tx1"/>
-                </a:solidFill>
-                <a:latin typeface="+mn-lt"/>
-                <a:ea typeface="+mn-ea"/>
-                <a:cs typeface="+mn-cs"/>
-              </a:defRPr>
-            </a:lvl6pPr>
-            <a:lvl7pPr marL="2743200" indent="0" algn="ctr" defTabSz="914400" rtl="0" eaLnBrk="1" latinLnBrk="0" hangingPunct="1">
-              <a:lnSpc>
-                <a:spcPct val="90000"/>
-              </a:lnSpc>
-              <a:spcBef>
-                <a:spcPts val="500"/>
-              </a:spcBef>
-              <a:buFont typeface="Arial" panose="020B0604020202020204" pitchFamily="34" charset="0"/>
-              <a:buNone/>
-              <a:defRPr sz="1600" kern="1200">
-                <a:solidFill>
-                  <a:schemeClr val="tx1"/>
-                </a:solidFill>
-                <a:latin typeface="+mn-lt"/>
-                <a:ea typeface="+mn-ea"/>
-                <a:cs typeface="+mn-cs"/>
-              </a:defRPr>
-            </a:lvl7pPr>
-            <a:lvl8pPr marL="3200400" indent="0" algn="ctr" defTabSz="914400" rtl="0" eaLnBrk="1" latinLnBrk="0" hangingPunct="1">
-              <a:lnSpc>
-                <a:spcPct val="90000"/>
-              </a:lnSpc>
-              <a:spcBef>
-                <a:spcPts val="500"/>
-              </a:spcBef>
-              <a:buFont typeface="Arial" panose="020B0604020202020204" pitchFamily="34" charset="0"/>
-              <a:buNone/>
-              <a:defRPr sz="1600" kern="1200">
-                <a:solidFill>
-                  <a:schemeClr val="tx1"/>
-                </a:solidFill>
-                <a:latin typeface="+mn-lt"/>
-                <a:ea typeface="+mn-ea"/>
-                <a:cs typeface="+mn-cs"/>
-              </a:defRPr>
-            </a:lvl8pPr>
-            <a:lvl9pPr marL="3657600" indent="0" algn="ctr" defTabSz="914400" rtl="0" eaLnBrk="1" latinLnBrk="0" hangingPunct="1">
-              <a:lnSpc>
-                <a:spcPct val="90000"/>
-              </a:lnSpc>
-              <a:spcBef>
-                <a:spcPts val="500"/>
-              </a:spcBef>
-              <a:buFont typeface="Arial" panose="020B0604020202020204" pitchFamily="34" charset="0"/>
-              <a:buNone/>
-              <a:defRPr sz="1600" kern="1200">
-                <a:solidFill>
-                  <a:schemeClr val="tx1"/>
-                </a:solidFill>
-                <a:latin typeface="+mn-lt"/>
-                <a:ea typeface="+mn-ea"/>
-                <a:cs typeface="+mn-cs"/>
-              </a:defRPr>
-            </a:lvl9pPr>
-          </a:lstStyle>
-          <a:p>
-            <a:r>
-              <a:rPr lang="en-US" sz="1600" dirty="0">
-                <a:cs typeface="Calibri"/>
-              </a:rPr>
-              <a:t>Percentiles and methods</a:t>
-            </a:r>
-            <a:endParaRPr lang="en-US" dirty="0"/>
-          </a:p>
-          <a:p>
-            <a:endParaRPr lang="en-US" sz="1200" dirty="0">
-              <a:cs typeface="Calibri"/>
-            </a:endParaRPr>
-          </a:p>
-          <a:p>
-            <a:endParaRPr lang="en-US" sz="1200" dirty="0">
-              <a:ea typeface="+mn-lt"/>
-              <a:cs typeface="+mn-lt"/>
-            </a:endParaRPr>
-          </a:p>
-          <a:p>
-            <a:endParaRPr lang="en-US" sz="1200" dirty="0">
-              <a:ea typeface="+mn-lt"/>
-              <a:cs typeface="+mn-lt"/>
-            </a:endParaRPr>
-          </a:p>
-          <a:p>
-            <a:endParaRPr lang="en-US" sz="1200" dirty="0">
-              <a:ea typeface="+mn-lt"/>
-              <a:cs typeface="+mn-lt"/>
-            </a:endParaRPr>
-          </a:p>
-        </p:txBody>
-      </p:sp>
-      <p:sp>
-        <p:nvSpPr>
-          <p:cNvPr id="12" name="Subtitle 2">
+      </p:pic>
+      <p:pic>
+        <p:nvPicPr>
+          <p:cNvPr id="11" name="Graphic 10" descr="Checkmark with solid fill">
             <a:extLst>
               <a:ext uri="{FF2B5EF4-FFF2-40B4-BE49-F238E27FC236}">
-                <a16:creationId xmlns:a16="http://schemas.microsoft.com/office/drawing/2014/main" id="{903E4CB8-F9F3-491C-803C-A77910DAA769}"/>
+                <a16:creationId xmlns:a16="http://schemas.microsoft.com/office/drawing/2014/main" id="{63570489-2948-48DE-92BC-478EC7A12352}"/>
               </a:ext>
             </a:extLst>
           </p:cNvPr>
-          <p:cNvSpPr txBox="1">
-            <a:spLocks/>
-          </p:cNvSpPr>
+          <p:cNvPicPr>
+            <a:picLocks noChangeAspect="1"/>
+          </p:cNvPicPr>
           <p:nvPr/>
-        </p:nvSpPr>
+        </p:nvPicPr>
+        <p:blipFill>
+          <a:blip r:embed="rId2">
+            <a:extLst>
+              <a:ext uri="{96DAC541-7B7A-43D3-8B79-37D633B846F1}">
+                <asvg:svgBlip xmlns:asvg="http://schemas.microsoft.com/office/drawing/2016/SVG/main" r:embed="rId3"/>
+              </a:ext>
+            </a:extLst>
+          </a:blip>
+          <a:stretch>
+            <a:fillRect/>
+          </a:stretch>
+        </p:blipFill>
         <p:spPr>
           <a:xfrm>
-            <a:off x="6053666" y="3720570"/>
-            <a:ext cx="2734734" cy="351895"/>
+            <a:off x="10109198" y="3301999"/>
+            <a:ext cx="262467" cy="262467"/>
           </a:xfrm>
           <a:prstGeom prst="rect">
             <a:avLst/>
           </a:prstGeom>
         </p:spPr>
-        <p:txBody>
-          <a:bodyPr vert="horz" lIns="91440" tIns="45720" rIns="91440" bIns="45720" rtlCol="0" anchor="t">
-            <a:noAutofit/>
-          </a:bodyPr>
-          <a:lstStyle>
-            <a:lvl1pPr marL="0" indent="0" algn="ctr" defTabSz="914400" rtl="0" eaLnBrk="1" latinLnBrk="0" hangingPunct="1">
-              <a:lnSpc>
-                <a:spcPct val="90000"/>
-              </a:lnSpc>
-              <a:spcBef>
-                <a:spcPts val="1000"/>
-              </a:spcBef>
-              <a:buFont typeface="Arial" panose="020B0604020202020204" pitchFamily="34" charset="0"/>
-              <a:buNone/>
-              <a:defRPr sz="2400" kern="1200">
-                <a:solidFill>
-                  <a:schemeClr val="tx1"/>
-                </a:solidFill>
-                <a:latin typeface="+mn-lt"/>
-                <a:ea typeface="+mn-ea"/>
-                <a:cs typeface="+mn-cs"/>
-              </a:defRPr>
-            </a:lvl1pPr>
-            <a:lvl2pPr marL="457200" indent="0" algn="ctr" defTabSz="914400" rtl="0" eaLnBrk="1" latinLnBrk="0" hangingPunct="1">
-              <a:lnSpc>
-                <a:spcPct val="90000"/>
-              </a:lnSpc>
-              <a:spcBef>
-                <a:spcPts val="500"/>
-              </a:spcBef>
-              <a:buFont typeface="Arial" panose="020B0604020202020204" pitchFamily="34" charset="0"/>
-              <a:buNone/>
-              <a:defRPr sz="2000" kern="1200">
-                <a:solidFill>
-                  <a:schemeClr val="tx1"/>
-                </a:solidFill>
-                <a:latin typeface="+mn-lt"/>
-                <a:ea typeface="+mn-ea"/>
-                <a:cs typeface="+mn-cs"/>
-              </a:defRPr>
-            </a:lvl2pPr>
-            <a:lvl3pPr marL="914400" indent="0" algn="ctr" defTabSz="914400" rtl="0" eaLnBrk="1" latinLnBrk="0" hangingPunct="1">
-              <a:lnSpc>
-                <a:spcPct val="90000"/>
-              </a:lnSpc>
-              <a:spcBef>
-                <a:spcPts val="500"/>
-              </a:spcBef>
-              <a:buFont typeface="Arial" panose="020B0604020202020204" pitchFamily="34" charset="0"/>
-              <a:buNone/>
-              <a:defRPr sz="1800" kern="1200">
-                <a:solidFill>
-                  <a:schemeClr val="tx1"/>
-                </a:solidFill>
-                <a:latin typeface="+mn-lt"/>
-                <a:ea typeface="+mn-ea"/>
-                <a:cs typeface="+mn-cs"/>
-              </a:defRPr>
-            </a:lvl3pPr>
-            <a:lvl4pPr marL="1371600" indent="0" algn="ctr" defTabSz="914400" rtl="0" eaLnBrk="1" latinLnBrk="0" hangingPunct="1">
-              <a:lnSpc>
-                <a:spcPct val="90000"/>
-              </a:lnSpc>
-              <a:spcBef>
-                <a:spcPts val="500"/>
-              </a:spcBef>
-              <a:buFont typeface="Arial" panose="020B0604020202020204" pitchFamily="34" charset="0"/>
-              <a:buNone/>
-              <a:defRPr sz="1600" kern="1200">
-                <a:solidFill>
-                  <a:schemeClr val="tx1"/>
-                </a:solidFill>
-                <a:latin typeface="+mn-lt"/>
-                <a:ea typeface="+mn-ea"/>
-                <a:cs typeface="+mn-cs"/>
-              </a:defRPr>
-            </a:lvl4pPr>
-            <a:lvl5pPr marL="1828800" indent="0" algn="ctr" defTabSz="914400" rtl="0" eaLnBrk="1" latinLnBrk="0" hangingPunct="1">
-              <a:lnSpc>
-                <a:spcPct val="90000"/>
-              </a:lnSpc>
-              <a:spcBef>
-                <a:spcPts val="500"/>
-              </a:spcBef>
-              <a:buFont typeface="Arial" panose="020B0604020202020204" pitchFamily="34" charset="0"/>
-              <a:buNone/>
-              <a:defRPr sz="1600" kern="1200">
-                <a:solidFill>
-                  <a:schemeClr val="tx1"/>
-                </a:solidFill>
-                <a:latin typeface="+mn-lt"/>
-                <a:ea typeface="+mn-ea"/>
-                <a:cs typeface="+mn-cs"/>
-              </a:defRPr>
-            </a:lvl5pPr>
-            <a:lvl6pPr marL="2286000" indent="0" algn="ctr" defTabSz="914400" rtl="0" eaLnBrk="1" latinLnBrk="0" hangingPunct="1">
-              <a:lnSpc>
-                <a:spcPct val="90000"/>
-              </a:lnSpc>
-              <a:spcBef>
-                <a:spcPts val="500"/>
-              </a:spcBef>
-              <a:buFont typeface="Arial" panose="020B0604020202020204" pitchFamily="34" charset="0"/>
-              <a:buNone/>
-              <a:defRPr sz="1600" kern="1200">
-                <a:solidFill>
-                  <a:schemeClr val="tx1"/>
-                </a:solidFill>
-                <a:latin typeface="+mn-lt"/>
-                <a:ea typeface="+mn-ea"/>
-                <a:cs typeface="+mn-cs"/>
-              </a:defRPr>
-            </a:lvl6pPr>
-            <a:lvl7pPr marL="2743200" indent="0" algn="ctr" defTabSz="914400" rtl="0" eaLnBrk="1" latinLnBrk="0" hangingPunct="1">
-              <a:lnSpc>
-                <a:spcPct val="90000"/>
-              </a:lnSpc>
-              <a:spcBef>
-                <a:spcPts val="500"/>
-              </a:spcBef>
-              <a:buFont typeface="Arial" panose="020B0604020202020204" pitchFamily="34" charset="0"/>
-              <a:buNone/>
-              <a:defRPr sz="1600" kern="1200">
-                <a:solidFill>
-                  <a:schemeClr val="tx1"/>
-                </a:solidFill>
-                <a:latin typeface="+mn-lt"/>
-                <a:ea typeface="+mn-ea"/>
-                <a:cs typeface="+mn-cs"/>
-              </a:defRPr>
-            </a:lvl7pPr>
-            <a:lvl8pPr marL="3200400" indent="0" algn="ctr" defTabSz="914400" rtl="0" eaLnBrk="1" latinLnBrk="0" hangingPunct="1">
-              <a:lnSpc>
-                <a:spcPct val="90000"/>
-              </a:lnSpc>
-              <a:spcBef>
-                <a:spcPts val="500"/>
-              </a:spcBef>
-              <a:buFont typeface="Arial" panose="020B0604020202020204" pitchFamily="34" charset="0"/>
-              <a:buNone/>
-              <a:defRPr sz="1600" kern="1200">
-                <a:solidFill>
-                  <a:schemeClr val="tx1"/>
-                </a:solidFill>
-                <a:latin typeface="+mn-lt"/>
-                <a:ea typeface="+mn-ea"/>
-                <a:cs typeface="+mn-cs"/>
-              </a:defRPr>
-            </a:lvl8pPr>
-            <a:lvl9pPr marL="3657600" indent="0" algn="ctr" defTabSz="914400" rtl="0" eaLnBrk="1" latinLnBrk="0" hangingPunct="1">
-              <a:lnSpc>
-                <a:spcPct val="90000"/>
-              </a:lnSpc>
-              <a:spcBef>
-                <a:spcPts val="500"/>
-              </a:spcBef>
-              <a:buFont typeface="Arial" panose="020B0604020202020204" pitchFamily="34" charset="0"/>
-              <a:buNone/>
-              <a:defRPr sz="1600" kern="1200">
-                <a:solidFill>
-                  <a:schemeClr val="tx1"/>
-                </a:solidFill>
-                <a:latin typeface="+mn-lt"/>
-                <a:ea typeface="+mn-ea"/>
-                <a:cs typeface="+mn-cs"/>
-              </a:defRPr>
-            </a:lvl9pPr>
-          </a:lstStyle>
-          <a:p>
-            <a:r>
-              <a:rPr lang="en-US" sz="1600" dirty="0">
-                <a:cs typeface="Calibri"/>
-              </a:rPr>
-              <a:t>Projections and methods</a:t>
-            </a:r>
-            <a:endParaRPr lang="en-US" dirty="0"/>
-          </a:p>
-          <a:p>
-            <a:endParaRPr lang="en-US" sz="1200" dirty="0">
-              <a:cs typeface="Calibri"/>
-            </a:endParaRPr>
-          </a:p>
-          <a:p>
-            <a:endParaRPr lang="en-US" sz="1200" dirty="0">
-              <a:ea typeface="+mn-lt"/>
-              <a:cs typeface="+mn-lt"/>
-            </a:endParaRPr>
-          </a:p>
-          <a:p>
-            <a:endParaRPr lang="en-US" sz="1200" dirty="0">
-              <a:ea typeface="+mn-lt"/>
-              <a:cs typeface="+mn-lt"/>
-            </a:endParaRPr>
-          </a:p>
-          <a:p>
-            <a:endParaRPr lang="en-US" sz="1200" dirty="0">
-              <a:ea typeface="+mn-lt"/>
-              <a:cs typeface="+mn-lt"/>
-            </a:endParaRPr>
-          </a:p>
-        </p:txBody>
-      </p:sp>
+      </p:pic>
     </p:spTree>
     <p:extLst>
       <p:ext uri="{BB962C8B-B14F-4D97-AF65-F5344CB8AC3E}">

</xml_diff>

<commit_message>
add cordex availabilty to the table, change table design
</commit_message>
<xml_diff>
--- a/static/placeholder.pptx
+++ b/static/placeholder.pptx
@@ -116,6 +116,7 @@
 <p1510:revInfo xmlns:a="http://schemas.openxmlformats.org/drawingml/2006/main" xmlns:r="http://schemas.openxmlformats.org/officeDocument/2006/relationships" xmlns:p1510="http://schemas.microsoft.com/office/powerpoint/2015/10/main">
   <p1510:revLst>
     <p1510:client id="{954C6B30-C1EC-2E14-44FC-46DD14AB0CE6}" v="138" dt="2021-10-15T08:20:09.466"/>
+    <p1510:client id="{AAA7A4B8-9221-52B9-7667-888169978280}" v="161" dt="2021-10-18T10:03:05.093"/>
     <p1510:client id="{ABB433DE-8DE7-EB65-11B0-F01847659B5B}" v="170" dt="2021-10-14T11:45:39.854"/>
     <p1510:client id="{BEA3B990-66CF-4413-9382-701C0A5AD28E}" v="786" dt="2021-10-14T09:38:07.272"/>
     <p1510:client id="{E5650429-80A5-F8CC-95A1-4FFA4FA57543}" v="12" dt="2021-10-14T11:09:57.349"/>
@@ -254,7 +255,7 @@
           <a:p>
             <a:fld id="{846CE7D5-CF57-46EF-B807-FDD0502418D4}" type="datetimeFigureOut">
               <a:rPr lang="en-US" smtClean="0"/>
-              <a:t>10/15/2021</a:t>
+              <a:t>10/18/2021</a:t>
             </a:fld>
             <a:endParaRPr lang="en-US"/>
           </a:p>
@@ -424,7 +425,7 @@
           <a:p>
             <a:fld id="{846CE7D5-CF57-46EF-B807-FDD0502418D4}" type="datetimeFigureOut">
               <a:rPr lang="en-US" smtClean="0"/>
-              <a:t>10/15/2021</a:t>
+              <a:t>10/18/2021</a:t>
             </a:fld>
             <a:endParaRPr lang="en-US"/>
           </a:p>
@@ -604,7 +605,7 @@
           <a:p>
             <a:fld id="{846CE7D5-CF57-46EF-B807-FDD0502418D4}" type="datetimeFigureOut">
               <a:rPr lang="en-US" smtClean="0"/>
-              <a:t>10/15/2021</a:t>
+              <a:t>10/18/2021</a:t>
             </a:fld>
             <a:endParaRPr lang="en-US"/>
           </a:p>
@@ -774,7 +775,7 @@
           <a:p>
             <a:fld id="{846CE7D5-CF57-46EF-B807-FDD0502418D4}" type="datetimeFigureOut">
               <a:rPr lang="en-US" smtClean="0"/>
-              <a:t>10/15/2021</a:t>
+              <a:t>10/18/2021</a:t>
             </a:fld>
             <a:endParaRPr lang="en-US"/>
           </a:p>
@@ -1020,7 +1021,7 @@
           <a:p>
             <a:fld id="{846CE7D5-CF57-46EF-B807-FDD0502418D4}" type="datetimeFigureOut">
               <a:rPr lang="en-US" smtClean="0"/>
-              <a:t>10/15/2021</a:t>
+              <a:t>10/18/2021</a:t>
             </a:fld>
             <a:endParaRPr lang="en-US"/>
           </a:p>
@@ -1252,7 +1253,7 @@
           <a:p>
             <a:fld id="{846CE7D5-CF57-46EF-B807-FDD0502418D4}" type="datetimeFigureOut">
               <a:rPr lang="en-US" smtClean="0"/>
-              <a:t>10/15/2021</a:t>
+              <a:t>10/18/2021</a:t>
             </a:fld>
             <a:endParaRPr lang="en-US"/>
           </a:p>
@@ -1619,7 +1620,7 @@
           <a:p>
             <a:fld id="{846CE7D5-CF57-46EF-B807-FDD0502418D4}" type="datetimeFigureOut">
               <a:rPr lang="en-US" smtClean="0"/>
-              <a:t>10/15/2021</a:t>
+              <a:t>10/18/2021</a:t>
             </a:fld>
             <a:endParaRPr lang="en-US"/>
           </a:p>
@@ -1737,7 +1738,7 @@
           <a:p>
             <a:fld id="{846CE7D5-CF57-46EF-B807-FDD0502418D4}" type="datetimeFigureOut">
               <a:rPr lang="en-US" smtClean="0"/>
-              <a:t>10/15/2021</a:t>
+              <a:t>10/18/2021</a:t>
             </a:fld>
             <a:endParaRPr lang="en-US"/>
           </a:p>
@@ -1832,7 +1833,7 @@
           <a:p>
             <a:fld id="{846CE7D5-CF57-46EF-B807-FDD0502418D4}" type="datetimeFigureOut">
               <a:rPr lang="en-US" smtClean="0"/>
-              <a:t>10/15/2021</a:t>
+              <a:t>10/18/2021</a:t>
             </a:fld>
             <a:endParaRPr lang="en-US"/>
           </a:p>
@@ -2109,7 +2110,7 @@
           <a:p>
             <a:fld id="{846CE7D5-CF57-46EF-B807-FDD0502418D4}" type="datetimeFigureOut">
               <a:rPr lang="en-US" smtClean="0"/>
-              <a:t>10/15/2021</a:t>
+              <a:t>10/18/2021</a:t>
             </a:fld>
             <a:endParaRPr lang="en-US"/>
           </a:p>
@@ -2366,7 +2367,7 @@
           <a:p>
             <a:fld id="{846CE7D5-CF57-46EF-B807-FDD0502418D4}" type="datetimeFigureOut">
               <a:rPr lang="en-US" smtClean="0"/>
-              <a:t>10/15/2021</a:t>
+              <a:t>10/18/2021</a:t>
             </a:fld>
             <a:endParaRPr lang="en-US"/>
           </a:p>
@@ -2579,7 +2580,7 @@
           <a:p>
             <a:fld id="{846CE7D5-CF57-46EF-B807-FDD0502418D4}" type="datetimeFigureOut">
               <a:rPr lang="en-US" smtClean="0"/>
-              <a:t>10/15/2021</a:t>
+              <a:t>10/18/2021</a:t>
             </a:fld>
             <a:endParaRPr lang="en-US"/>
           </a:p>
@@ -3074,14 +3075,14 @@
           <p:nvPr>
             <p:extLst>
               <p:ext uri="{D42A27DB-BD31-4B8C-83A1-F6EECF244321}">
-                <p14:modId xmlns:p14="http://schemas.microsoft.com/office/powerpoint/2010/main" val="4289778347"/>
+                <p14:modId xmlns:p14="http://schemas.microsoft.com/office/powerpoint/2010/main" val="1711372386"/>
               </p:ext>
             </p:extLst>
           </p:nvPr>
         </p:nvGraphicFramePr>
         <p:xfrm>
-          <a:off x="1151467" y="2599266"/>
-          <a:ext cx="9851946" cy="1731920"/>
+          <a:off x="499533" y="2683933"/>
+          <a:ext cx="11314078" cy="1326647"/>
         </p:xfrm>
         <a:graphic>
           <a:graphicData uri="http://schemas.openxmlformats.org/drawingml/2006/table">
@@ -3090,42 +3091,42 @@
                 <a:tableStyleId>{2D5ABB26-0587-4C30-8999-92F81FD0307C}</a:tableStyleId>
               </a:tblPr>
               <a:tblGrid>
-                <a:gridCol w="1641991">
+                <a:gridCol w="953667">
                   <a:extLst>
                     <a:ext uri="{9D8B030D-6E8A-4147-A177-3AD203B41FA5}">
                       <a16:colId xmlns:a16="http://schemas.microsoft.com/office/drawing/2014/main" val="1786597057"/>
                     </a:ext>
                   </a:extLst>
                 </a:gridCol>
-                <a:gridCol w="1641991">
+                <a:gridCol w="2063228">
                   <a:extLst>
                     <a:ext uri="{9D8B030D-6E8A-4147-A177-3AD203B41FA5}">
                       <a16:colId xmlns:a16="http://schemas.microsoft.com/office/drawing/2014/main" val="1936470344"/>
                     </a:ext>
                   </a:extLst>
                 </a:gridCol>
-                <a:gridCol w="1641991">
+                <a:gridCol w="2044887">
                   <a:extLst>
                     <a:ext uri="{9D8B030D-6E8A-4147-A177-3AD203B41FA5}">
                       <a16:colId xmlns:a16="http://schemas.microsoft.com/office/drawing/2014/main" val="3147797879"/>
                     </a:ext>
                   </a:extLst>
                 </a:gridCol>
-                <a:gridCol w="1641991">
+                <a:gridCol w="2439194">
                   <a:extLst>
                     <a:ext uri="{9D8B030D-6E8A-4147-A177-3AD203B41FA5}">
                       <a16:colId xmlns:a16="http://schemas.microsoft.com/office/drawing/2014/main" val="78292725"/>
                     </a:ext>
                   </a:extLst>
                 </a:gridCol>
-                <a:gridCol w="1641991">
+                <a:gridCol w="1927421">
                   <a:extLst>
                     <a:ext uri="{9D8B030D-6E8A-4147-A177-3AD203B41FA5}">
                       <a16:colId xmlns:a16="http://schemas.microsoft.com/office/drawing/2014/main" val="2212457586"/>
                     </a:ext>
                   </a:extLst>
                 </a:gridCol>
-                <a:gridCol w="1641991">
+                <a:gridCol w="1885681">
                   <a:extLst>
                     <a:ext uri="{9D8B030D-6E8A-4147-A177-3AD203B41FA5}">
                       <a16:colId xmlns:a16="http://schemas.microsoft.com/office/drawing/2014/main" val="1181174887"/>
@@ -3133,7 +3134,7 @@
                   </a:extLst>
                 </a:gridCol>
               </a:tblGrid>
-              <a:tr h="583289">
+              <a:tr h="290698">
                 <a:tc>
                   <a:txBody>
                     <a:bodyPr/>
@@ -3143,7 +3144,24 @@
                       <a:endParaRPr lang="en-US" sz="1400" dirty="0"/>
                     </a:p>
                   </a:txBody>
-                  <a:tcPr anchor="ctr"/>
+                  <a:tcPr anchor="ctr">
+                    <a:lnL w="0">
+                      <a:noFill/>
+                    </a:lnL>
+                    <a:lnR w="3175">
+                      <a:solidFill>
+                        <a:schemeClr val="bg1"/>
+                      </a:solidFill>
+                    </a:lnR>
+                    <a:lnT w="0">
+                      <a:noFill/>
+                    </a:lnT>
+                    <a:lnB w="3175">
+                      <a:solidFill>
+                        <a:schemeClr val="bg1"/>
+                      </a:solidFill>
+                    </a:lnB>
+                  </a:tcPr>
                 </a:tc>
                 <a:tc>
                   <a:txBody>
@@ -3157,7 +3175,26 @@
                       </a:r>
                     </a:p>
                   </a:txBody>
-                  <a:tcPr anchor="ctr"/>
+                  <a:tcPr anchor="ctr">
+                    <a:lnL w="3175">
+                      <a:solidFill>
+                        <a:schemeClr val="bg1"/>
+                      </a:solidFill>
+                    </a:lnL>
+                    <a:lnR w="3175">
+                      <a:solidFill>
+                        <a:schemeClr val="bg1"/>
+                      </a:solidFill>
+                    </a:lnR>
+                    <a:lnT w="0">
+                      <a:noFill/>
+                    </a:lnT>
+                    <a:lnB w="3175">
+                      <a:solidFill>
+                        <a:schemeClr val="bg1"/>
+                      </a:solidFill>
+                    </a:lnB>
+                  </a:tcPr>
                 </a:tc>
                 <a:tc>
                   <a:txBody>
@@ -3178,7 +3215,26 @@
                       <a:endParaRPr lang="en-US" sz="1400" dirty="0"/>
                     </a:p>
                   </a:txBody>
-                  <a:tcPr anchor="ctr"/>
+                  <a:tcPr anchor="ctr">
+                    <a:lnL w="3175">
+                      <a:solidFill>
+                        <a:schemeClr val="bg1"/>
+                      </a:solidFill>
+                    </a:lnL>
+                    <a:lnR w="3175">
+                      <a:solidFill>
+                        <a:schemeClr val="bg1"/>
+                      </a:solidFill>
+                    </a:lnR>
+                    <a:lnT w="0">
+                      <a:noFill/>
+                    </a:lnT>
+                    <a:lnB w="3175">
+                      <a:solidFill>
+                        <a:schemeClr val="bg1"/>
+                      </a:solidFill>
+                    </a:lnB>
+                  </a:tcPr>
                 </a:tc>
                 <a:tc>
                   <a:txBody>
@@ -3192,7 +3248,26 @@
                       </a:r>
                     </a:p>
                   </a:txBody>
-                  <a:tcPr anchor="ctr"/>
+                  <a:tcPr anchor="ctr">
+                    <a:lnL w="3175">
+                      <a:solidFill>
+                        <a:schemeClr val="bg1"/>
+                      </a:solidFill>
+                    </a:lnL>
+                    <a:lnR w="3175">
+                      <a:solidFill>
+                        <a:schemeClr val="bg1"/>
+                      </a:solidFill>
+                    </a:lnR>
+                    <a:lnT w="0">
+                      <a:noFill/>
+                    </a:lnT>
+                    <a:lnB w="3175">
+                      <a:solidFill>
+                        <a:schemeClr val="bg1"/>
+                      </a:solidFill>
+                    </a:lnB>
+                  </a:tcPr>
                 </a:tc>
                 <a:tc>
                   <a:txBody>
@@ -3206,7 +3281,26 @@
                       </a:r>
                     </a:p>
                   </a:txBody>
-                  <a:tcPr anchor="ctr"/>
+                  <a:tcPr anchor="ctr">
+                    <a:lnL w="3175">
+                      <a:solidFill>
+                        <a:schemeClr val="bg1"/>
+                      </a:solidFill>
+                    </a:lnL>
+                    <a:lnR w="3175">
+                      <a:solidFill>
+                        <a:schemeClr val="bg1"/>
+                      </a:solidFill>
+                    </a:lnR>
+                    <a:lnT w="0">
+                      <a:noFill/>
+                    </a:lnT>
+                    <a:lnB w="3175">
+                      <a:solidFill>
+                        <a:schemeClr val="bg1"/>
+                      </a:solidFill>
+                    </a:lnB>
+                  </a:tcPr>
                 </a:tc>
                 <a:tc>
                   <a:txBody>
@@ -3220,7 +3314,24 @@
                       </a:r>
                     </a:p>
                   </a:txBody>
-                  <a:tcPr anchor="ctr"/>
+                  <a:tcPr anchor="ctr">
+                    <a:lnL w="3175">
+                      <a:solidFill>
+                        <a:schemeClr val="bg1"/>
+                      </a:solidFill>
+                    </a:lnL>
+                    <a:lnR w="0">
+                      <a:noFill/>
+                    </a:lnR>
+                    <a:lnT w="0">
+                      <a:noFill/>
+                    </a:lnT>
+                    <a:lnB w="3175">
+                      <a:solidFill>
+                        <a:schemeClr val="bg1"/>
+                      </a:solidFill>
+                    </a:lnB>
+                  </a:tcPr>
                 </a:tc>
                 <a:extLst>
                   <a:ext uri="{0D108BD9-81ED-4DB2-BD59-A6C34878D82A}">
@@ -3228,7 +3339,7 @@
                   </a:ext>
                 </a:extLst>
               </a:tr>
-              <a:tr h="583289">
+              <a:tr h="369979">
                 <a:tc>
                   <a:txBody>
                     <a:bodyPr/>
@@ -3241,7 +3352,26 @@
                       </a:r>
                     </a:p>
                   </a:txBody>
-                  <a:tcPr anchor="ctr"/>
+                  <a:tcPr anchor="ctr">
+                    <a:lnL w="0">
+                      <a:noFill/>
+                    </a:lnL>
+                    <a:lnR w="3175">
+                      <a:solidFill>
+                        <a:schemeClr val="bg1"/>
+                      </a:solidFill>
+                    </a:lnR>
+                    <a:lnT w="3175">
+                      <a:solidFill>
+                        <a:schemeClr val="bg1"/>
+                      </a:solidFill>
+                    </a:lnT>
+                    <a:lnB w="3175">
+                      <a:solidFill>
+                        <a:schemeClr val="bg1"/>
+                      </a:solidFill>
+                    </a:lnB>
+                  </a:tcPr>
                 </a:tc>
                 <a:tc>
                   <a:txBody>
@@ -3266,33 +3396,36 @@
                       </a:r>
                       <a:r>
                         <a:rPr lang="en-US" sz="1400" dirty="0"/>
-                        <a:t>, </a:t>
+                        <a:t>, constrained</a:t>
                       </a:r>
-                      <a:endParaRPr lang="en-US" sz="1400"/>
-                    </a:p>
-                    <a:p>
-                      <a:pPr lvl="0" algn="ctr">
-                        <a:lnSpc>
-                          <a:spcPct val="100000"/>
-                        </a:lnSpc>
-                        <a:spcBef>
-                          <a:spcPts val="0"/>
-                        </a:spcBef>
-                        <a:spcAft>
-                          <a:spcPts val="0"/>
-                        </a:spcAft>
-                        <a:buNone/>
-                      </a:pPr>
-                      <a:r>
-                        <a:rPr lang="en-US" sz="1400" dirty="0"/>
-                        <a:t>constrained</a:t>
-                      </a:r>
-                      <a:endParaRPr lang="en-US" sz="1400"/>
                     </a:p>
                   </a:txBody>
                   <a:tcPr anchor="ctr">
+                    <a:lnL w="3175">
+                      <a:solidFill>
+                        <a:schemeClr val="bg1"/>
+                      </a:solidFill>
+                    </a:lnL>
+                    <a:lnR w="3175">
+                      <a:solidFill>
+                        <a:schemeClr val="bg1"/>
+                      </a:solidFill>
+                    </a:lnR>
+                    <a:lnT w="3175">
+                      <a:solidFill>
+                        <a:schemeClr val="bg1"/>
+                      </a:solidFill>
+                    </a:lnT>
+                    <a:lnB w="3175">
+                      <a:solidFill>
+                        <a:schemeClr val="bg1"/>
+                      </a:solidFill>
+                    </a:lnB>
                     <a:solidFill>
-                      <a:schemeClr val="accent4"/>
+                      <a:schemeClr val="accent4">
+                        <a:lumMod val="60000"/>
+                        <a:lumOff val="40000"/>
+                      </a:schemeClr>
                     </a:solidFill>
                   </a:tcPr>
                 </a:tc>
@@ -3306,8 +3439,28 @@
                     </a:p>
                   </a:txBody>
                   <a:tcPr anchor="ctr">
+                    <a:lnL w="3175">
+                      <a:solidFill>
+                        <a:schemeClr val="bg1"/>
+                      </a:solidFill>
+                    </a:lnL>
+                    <a:lnR w="3175">
+                      <a:solidFill>
+                        <a:schemeClr val="bg1"/>
+                      </a:solidFill>
+                    </a:lnR>
+                    <a:lnT w="3175">
+                      <a:solidFill>
+                        <a:schemeClr val="bg1"/>
+                      </a:solidFill>
+                    </a:lnT>
+                    <a:lnB w="3175">
+                      <a:solidFill>
+                        <a:schemeClr val="bg1"/>
+                      </a:solidFill>
+                    </a:lnB>
                     <a:solidFill>
-                      <a:srgbClr val="92D050"/>
+                      <a:schemeClr val="accent6"/>
                     </a:solidFill>
                   </a:tcPr>
                 </a:tc>
@@ -3334,33 +3487,36 @@
                       </a:r>
                       <a:r>
                         <a:rPr lang="en-US" sz="1400" dirty="0"/>
-                        <a:t>,</a:t>
+                        <a:t>, no 50-percentile</a:t>
                       </a:r>
-                      <a:endParaRPr lang="en-US" sz="1400"/>
-                    </a:p>
-                    <a:p>
-                      <a:pPr lvl="0" algn="ctr">
-                        <a:lnSpc>
-                          <a:spcPct val="100000"/>
-                        </a:lnSpc>
-                        <a:spcBef>
-                          <a:spcPts val="0"/>
-                        </a:spcBef>
-                        <a:spcAft>
-                          <a:spcPts val="0"/>
-                        </a:spcAft>
-                        <a:buNone/>
-                      </a:pPr>
-                      <a:r>
-                        <a:rPr lang="en-US" sz="1400" dirty="0"/>
-                        <a:t> no 50-percentile</a:t>
-                      </a:r>
-                      <a:endParaRPr lang="en-US" sz="1400"/>
                     </a:p>
                   </a:txBody>
                   <a:tcPr anchor="ctr">
+                    <a:lnL w="3175">
+                      <a:solidFill>
+                        <a:schemeClr val="bg1"/>
+                      </a:solidFill>
+                    </a:lnL>
+                    <a:lnR w="3175">
+                      <a:solidFill>
+                        <a:schemeClr val="bg1"/>
+                      </a:solidFill>
+                    </a:lnR>
+                    <a:lnT w="3175">
+                      <a:solidFill>
+                        <a:schemeClr val="bg1"/>
+                      </a:solidFill>
+                    </a:lnT>
+                    <a:lnB w="3175">
+                      <a:solidFill>
+                        <a:schemeClr val="bg1"/>
+                      </a:solidFill>
+                    </a:lnB>
                     <a:solidFill>
-                      <a:schemeClr val="accent4"/>
+                      <a:schemeClr val="accent4">
+                        <a:lumMod val="60000"/>
+                        <a:lumOff val="40000"/>
+                      </a:schemeClr>
                     </a:solidFill>
                   </a:tcPr>
                 </a:tc>
@@ -3374,8 +3530,28 @@
                     </a:p>
                   </a:txBody>
                   <a:tcPr anchor="ctr">
+                    <a:lnL w="3175">
+                      <a:solidFill>
+                        <a:schemeClr val="bg1"/>
+                      </a:solidFill>
+                    </a:lnL>
+                    <a:lnR w="3175">
+                      <a:solidFill>
+                        <a:schemeClr val="bg1"/>
+                      </a:solidFill>
+                    </a:lnR>
+                    <a:lnT w="3175">
+                      <a:solidFill>
+                        <a:schemeClr val="bg1"/>
+                      </a:solidFill>
+                    </a:lnT>
+                    <a:lnB w="3175">
+                      <a:solidFill>
+                        <a:schemeClr val="bg1"/>
+                      </a:solidFill>
+                    </a:lnB>
                     <a:solidFill>
-                      <a:srgbClr val="92D050"/>
+                      <a:schemeClr val="accent6"/>
                     </a:solidFill>
                   </a:tcPr>
                 </a:tc>
@@ -3389,8 +3565,26 @@
                     </a:p>
                   </a:txBody>
                   <a:tcPr anchor="ctr">
+                    <a:lnL w="3175">
+                      <a:solidFill>
+                        <a:schemeClr val="bg1"/>
+                      </a:solidFill>
+                    </a:lnL>
+                    <a:lnR w="0">
+                      <a:noFill/>
+                    </a:lnR>
+                    <a:lnT w="3175">
+                      <a:solidFill>
+                        <a:schemeClr val="bg1"/>
+                      </a:solidFill>
+                    </a:lnT>
+                    <a:lnB w="3175">
+                      <a:solidFill>
+                        <a:schemeClr val="bg1"/>
+                      </a:solidFill>
+                    </a:lnB>
                     <a:solidFill>
-                      <a:srgbClr val="92D050"/>
+                      <a:schemeClr val="accent6"/>
                     </a:solidFill>
                   </a:tcPr>
                 </a:tc>
@@ -3400,7 +3594,7 @@
                   </a:ext>
                 </a:extLst>
               </a:tr>
-              <a:tr h="565342">
+              <a:tr h="343552">
                 <a:tc>
                   <a:txBody>
                     <a:bodyPr/>
@@ -3413,7 +3607,26 @@
                       </a:r>
                     </a:p>
                   </a:txBody>
-                  <a:tcPr anchor="ctr"/>
+                  <a:tcPr anchor="ctr">
+                    <a:lnL w="0">
+                      <a:noFill/>
+                    </a:lnL>
+                    <a:lnR w="3175">
+                      <a:solidFill>
+                        <a:schemeClr val="bg1"/>
+                      </a:solidFill>
+                    </a:lnR>
+                    <a:lnT w="3175">
+                      <a:solidFill>
+                        <a:schemeClr val="bg1"/>
+                      </a:solidFill>
+                    </a:lnT>
+                    <a:lnB w="3175">
+                      <a:solidFill>
+                        <a:schemeClr val="bg1"/>
+                      </a:solidFill>
+                    </a:lnB>
+                  </a:tcPr>
                 </a:tc>
                 <a:tc>
                   <a:txBody>
@@ -3434,12 +3647,237 @@
                       </a:pPr>
                       <a:r>
                         <a:rPr lang="en-US" sz="1400" u="none" strike="noStrike" noProof="0" dirty="0"/>
-                        <a:t>Temperature, </a:t>
+                        <a:t>Temperature, constrained</a:t>
                       </a:r>
-                      <a:endParaRPr lang="en-US" sz="1400" b="0" i="0" u="none" strike="noStrike" noProof="0">
+                      <a:endParaRPr lang="en-US" sz="1400" b="0" i="0" u="none" strike="noStrike" noProof="0" dirty="0">
                         <a:latin typeface="Calibri"/>
                       </a:endParaRPr>
                     </a:p>
+                  </a:txBody>
+                  <a:tcPr anchor="ctr">
+                    <a:lnL w="3175">
+                      <a:solidFill>
+                        <a:schemeClr val="bg1"/>
+                      </a:solidFill>
+                    </a:lnL>
+                    <a:lnR w="3175">
+                      <a:solidFill>
+                        <a:schemeClr val="bg1"/>
+                      </a:solidFill>
+                    </a:lnR>
+                    <a:lnT w="3175">
+                      <a:solidFill>
+                        <a:schemeClr val="bg1"/>
+                      </a:solidFill>
+                    </a:lnT>
+                    <a:lnB w="3175">
+                      <a:solidFill>
+                        <a:schemeClr val="bg1"/>
+                      </a:solidFill>
+                    </a:lnB>
+                    <a:solidFill>
+                      <a:schemeClr val="accent4">
+                        <a:lumMod val="60000"/>
+                        <a:lumOff val="40000"/>
+                      </a:schemeClr>
+                    </a:solidFill>
+                  </a:tcPr>
+                </a:tc>
+                <a:tc>
+                  <a:txBody>
+                    <a:bodyPr/>
+                    <a:lstStyle/>
+                    <a:p>
+                      <a:pPr algn="ctr"/>
+                      <a:r>
+                        <a:rPr lang="en-US" sz="1400" b="1" dirty="0"/>
+                        <a:t>X</a:t>
+                      </a:r>
+                    </a:p>
+                  </a:txBody>
+                  <a:tcPr anchor="ctr">
+                    <a:lnL w="3175">
+                      <a:solidFill>
+                        <a:schemeClr val="bg1"/>
+                      </a:solidFill>
+                    </a:lnL>
+                    <a:lnR w="3175">
+                      <a:solidFill>
+                        <a:schemeClr val="bg1"/>
+                      </a:solidFill>
+                    </a:lnR>
+                    <a:lnT w="3175">
+                      <a:solidFill>
+                        <a:schemeClr val="bg1"/>
+                      </a:solidFill>
+                    </a:lnT>
+                    <a:lnB w="3175">
+                      <a:solidFill>
+                        <a:schemeClr val="bg1"/>
+                      </a:solidFill>
+                    </a:lnB>
+                    <a:solidFill>
+                      <a:srgbClr val="F54747"/>
+                    </a:solidFill>
+                  </a:tcPr>
+                </a:tc>
+                <a:tc>
+                  <a:txBody>
+                    <a:bodyPr/>
+                    <a:lstStyle/>
+                    <a:p>
+                      <a:pPr lvl="0" algn="ctr">
+                        <a:buNone/>
+                      </a:pPr>
+                      <a:r>
+                        <a:rPr lang="en-US" sz="1400" b="1" dirty="0"/>
+                        <a:t>X</a:t>
+                      </a:r>
+                    </a:p>
+                  </a:txBody>
+                  <a:tcPr anchor="ctr">
+                    <a:lnL w="3175">
+                      <a:solidFill>
+                        <a:schemeClr val="bg1"/>
+                      </a:solidFill>
+                    </a:lnL>
+                    <a:lnR w="3175">
+                      <a:solidFill>
+                        <a:schemeClr val="bg1"/>
+                      </a:solidFill>
+                    </a:lnR>
+                    <a:lnT w="3175">
+                      <a:solidFill>
+                        <a:schemeClr val="bg1"/>
+                      </a:solidFill>
+                    </a:lnT>
+                    <a:lnB w="3175">
+                      <a:solidFill>
+                        <a:schemeClr val="bg1"/>
+                      </a:solidFill>
+                    </a:lnB>
+                    <a:solidFill>
+                      <a:srgbClr val="F54747"/>
+                    </a:solidFill>
+                  </a:tcPr>
+                </a:tc>
+                <a:tc>
+                  <a:txBody>
+                    <a:bodyPr/>
+                    <a:lstStyle/>
+                    <a:p>
+                      <a:pPr algn="ctr"/>
+                      <a:endParaRPr lang="en-US" sz="1400" dirty="0"/>
+                    </a:p>
+                  </a:txBody>
+                  <a:tcPr anchor="ctr">
+                    <a:lnL w="3175">
+                      <a:solidFill>
+                        <a:schemeClr val="bg1"/>
+                      </a:solidFill>
+                    </a:lnL>
+                    <a:lnR w="3175">
+                      <a:solidFill>
+                        <a:schemeClr val="bg1"/>
+                      </a:solidFill>
+                    </a:lnR>
+                    <a:lnT w="3175">
+                      <a:solidFill>
+                        <a:schemeClr val="bg1"/>
+                      </a:solidFill>
+                    </a:lnT>
+                    <a:lnB w="3175">
+                      <a:solidFill>
+                        <a:schemeClr val="bg1"/>
+                      </a:solidFill>
+                    </a:lnB>
+                    <a:solidFill>
+                      <a:schemeClr val="accent6"/>
+                    </a:solidFill>
+                  </a:tcPr>
+                </a:tc>
+                <a:tc>
+                  <a:txBody>
+                    <a:bodyPr/>
+                    <a:lstStyle/>
+                    <a:p>
+                      <a:pPr lvl="0" algn="ctr">
+                        <a:buNone/>
+                      </a:pPr>
+                      <a:r>
+                        <a:rPr lang="en-US" sz="1400" b="1" dirty="0"/>
+                        <a:t>X</a:t>
+                      </a:r>
+                    </a:p>
+                  </a:txBody>
+                  <a:tcPr anchor="ctr">
+                    <a:lnL w="3175">
+                      <a:solidFill>
+                        <a:schemeClr val="bg1"/>
+                      </a:solidFill>
+                    </a:lnL>
+                    <a:lnR w="0">
+                      <a:noFill/>
+                    </a:lnR>
+                    <a:lnT w="3175">
+                      <a:solidFill>
+                        <a:schemeClr val="bg1"/>
+                      </a:solidFill>
+                    </a:lnT>
+                    <a:lnB w="3175">
+                      <a:solidFill>
+                        <a:schemeClr val="bg1"/>
+                      </a:solidFill>
+                    </a:lnB>
+                    <a:solidFill>
+                      <a:srgbClr val="F54747"/>
+                    </a:solidFill>
+                  </a:tcPr>
+                </a:tc>
+                <a:extLst>
+                  <a:ext uri="{0D108BD9-81ED-4DB2-BD59-A6C34878D82A}">
+                    <a16:rowId xmlns:a16="http://schemas.microsoft.com/office/drawing/2014/main" val="3052349962"/>
+                  </a:ext>
+                </a:extLst>
+              </a:tr>
+              <a:tr h="308316">
+                <a:tc>
+                  <a:txBody>
+                    <a:bodyPr/>
+                    <a:lstStyle/>
+                    <a:p>
+                      <a:pPr lvl="0" algn="ctr">
+                        <a:buNone/>
+                      </a:pPr>
+                      <a:r>
+                        <a:rPr lang="en-US" sz="1400" dirty="0"/>
+                        <a:t>CORDEX</a:t>
+                      </a:r>
+                    </a:p>
+                  </a:txBody>
+                  <a:tcPr anchor="ctr">
+                    <a:lnL w="0">
+                      <a:noFill/>
+                    </a:lnL>
+                    <a:lnR w="3175">
+                      <a:solidFill>
+                        <a:schemeClr val="bg1"/>
+                      </a:solidFill>
+                    </a:lnR>
+                    <a:lnT w="3175">
+                      <a:solidFill>
+                        <a:schemeClr val="bg1"/>
+                      </a:solidFill>
+                    </a:lnT>
+                    <a:lnB w="0">
+                      <a:noFill/>
+                    </a:lnB>
+                  </a:tcPr>
+                </a:tc>
+                <a:tc>
+                  <a:txBody>
+                    <a:bodyPr/>
+                    <a:lstStyle/>
                     <a:p>
                       <a:pPr lvl="0" algn="ctr">
                         <a:lnSpc>
@@ -3454,32 +3892,35 @@
                         <a:buNone/>
                       </a:pPr>
                       <a:r>
-                        <a:rPr lang="en-US" sz="1400" u="none" strike="noStrike" noProof="0" dirty="0"/>
-                        <a:t>constrained</a:t>
+                        <a:rPr lang="en-US" sz="1400" b="1" i="0" u="none" strike="noStrike" noProof="0" dirty="0">
+                          <a:latin typeface="Calibri"/>
+                        </a:rPr>
+                        <a:t>X</a:t>
                       </a:r>
+                      <a:endParaRPr lang="en-US" b="1" dirty="0"/>
                     </a:p>
                   </a:txBody>
                   <a:tcPr anchor="ctr">
+                    <a:lnL w="3175">
+                      <a:solidFill>
+                        <a:schemeClr val="bg1"/>
+                      </a:solidFill>
+                    </a:lnL>
+                    <a:lnR w="3175">
+                      <a:solidFill>
+                        <a:schemeClr val="bg1"/>
+                      </a:solidFill>
+                    </a:lnR>
+                    <a:lnT w="3175">
+                      <a:solidFill>
+                        <a:schemeClr val="bg1"/>
+                      </a:solidFill>
+                    </a:lnT>
+                    <a:lnB w="0">
+                      <a:noFill/>
+                    </a:lnB>
                     <a:solidFill>
-                      <a:schemeClr val="accent4"/>
-                    </a:solidFill>
-                  </a:tcPr>
-                </a:tc>
-                <a:tc>
-                  <a:txBody>
-                    <a:bodyPr/>
-                    <a:lstStyle/>
-                    <a:p>
-                      <a:pPr algn="ctr"/>
-                      <a:r>
-                        <a:rPr lang="en-US" sz="1400" dirty="0"/>
-                        <a:t>X</a:t>
-                      </a:r>
-                    </a:p>
-                  </a:txBody>
-                  <a:tcPr anchor="ctr">
-                    <a:solidFill>
-                      <a:srgbClr val="FF0000"/>
+                      <a:srgbClr val="F54747"/>
                     </a:solidFill>
                   </a:tcPr>
                 </a:tc>
@@ -3492,29 +3933,35 @@
                         <a:buNone/>
                       </a:pPr>
                       <a:r>
-                        <a:rPr lang="en-US" sz="1400" dirty="0"/>
+                        <a:rPr lang="en-US" sz="1400" b="1" i="0" u="none" strike="noStrike" noProof="0" dirty="0">
+                          <a:latin typeface="Calibri"/>
+                        </a:rPr>
                         <a:t>X</a:t>
                       </a:r>
+                      <a:endParaRPr lang="en-US" b="1"/>
                     </a:p>
                   </a:txBody>
                   <a:tcPr anchor="ctr">
+                    <a:lnL w="3175">
+                      <a:solidFill>
+                        <a:schemeClr val="bg1"/>
+                      </a:solidFill>
+                    </a:lnL>
+                    <a:lnR w="3175">
+                      <a:solidFill>
+                        <a:schemeClr val="bg1"/>
+                      </a:solidFill>
+                    </a:lnR>
+                    <a:lnT w="3175">
+                      <a:solidFill>
+                        <a:schemeClr val="bg1"/>
+                      </a:solidFill>
+                    </a:lnT>
+                    <a:lnB w="0">
+                      <a:noFill/>
+                    </a:lnB>
                     <a:solidFill>
-                      <a:srgbClr val="FF0000"/>
-                    </a:solidFill>
-                  </a:tcPr>
-                </a:tc>
-                <a:tc>
-                  <a:txBody>
-                    <a:bodyPr/>
-                    <a:lstStyle/>
-                    <a:p>
-                      <a:pPr algn="ctr"/>
-                      <a:endParaRPr lang="en-US" sz="1400" dirty="0"/>
-                    </a:p>
-                  </a:txBody>
-                  <a:tcPr anchor="ctr">
-                    <a:solidFill>
-                      <a:srgbClr val="92D050"/>
+                      <a:srgbClr val="F54747"/>
                     </a:solidFill>
                   </a:tcPr>
                 </a:tc>
@@ -3527,20 +3974,115 @@
                         <a:buNone/>
                       </a:pPr>
                       <a:r>
-                        <a:rPr lang="en-US" sz="1400" dirty="0"/>
+                        <a:rPr lang="en-US" sz="1400" b="1" i="0" u="none" strike="noStrike" noProof="0" dirty="0">
+                          <a:latin typeface="Calibri"/>
+                        </a:rPr>
                         <a:t>X</a:t>
                       </a:r>
+                      <a:endParaRPr lang="en-US" b="1"/>
                     </a:p>
                   </a:txBody>
                   <a:tcPr anchor="ctr">
+                    <a:lnL w="3175">
+                      <a:solidFill>
+                        <a:schemeClr val="bg1"/>
+                      </a:solidFill>
+                    </a:lnL>
+                    <a:lnR w="3175">
+                      <a:solidFill>
+                        <a:schemeClr val="bg1"/>
+                      </a:solidFill>
+                    </a:lnR>
+                    <a:lnT w="3175">
+                      <a:solidFill>
+                        <a:schemeClr val="bg1"/>
+                      </a:solidFill>
+                    </a:lnT>
+                    <a:lnB w="0">
+                      <a:noFill/>
+                    </a:lnB>
                     <a:solidFill>
-                      <a:srgbClr val="FF0000"/>
+                      <a:srgbClr val="F54747"/>
+                    </a:solidFill>
+                  </a:tcPr>
+                </a:tc>
+                <a:tc>
+                  <a:txBody>
+                    <a:bodyPr/>
+                    <a:lstStyle/>
+                    <a:p>
+                      <a:pPr lvl="0" algn="ctr">
+                        <a:buNone/>
+                      </a:pPr>
+                      <a:endParaRPr lang="en-US" sz="1400" dirty="0"/>
+                    </a:p>
+                  </a:txBody>
+                  <a:tcPr anchor="ctr">
+                    <a:lnL w="3175">
+                      <a:solidFill>
+                        <a:schemeClr val="bg1"/>
+                      </a:solidFill>
+                    </a:lnL>
+                    <a:lnR w="3175">
+                      <a:solidFill>
+                        <a:schemeClr val="bg1"/>
+                      </a:solidFill>
+                    </a:lnR>
+                    <a:lnT w="3175">
+                      <a:solidFill>
+                        <a:schemeClr val="bg1"/>
+                      </a:solidFill>
+                    </a:lnT>
+                    <a:lnB w="0">
+                      <a:noFill/>
+                    </a:lnB>
+                    <a:solidFill>
+                      <a:schemeClr val="accent6"/>
+                    </a:solidFill>
+                  </a:tcPr>
+                </a:tc>
+                <a:tc>
+                  <a:txBody>
+                    <a:bodyPr/>
+                    <a:lstStyle/>
+                    <a:p>
+                      <a:pPr lvl="0" algn="ctr">
+                        <a:buNone/>
+                      </a:pPr>
+                      <a:r>
+                        <a:rPr lang="en-US" sz="1400" b="1" i="0" u="none" strike="noStrike" noProof="0" dirty="0">
+                          <a:latin typeface="Calibri"/>
+                        </a:rPr>
+                        <a:t>X</a:t>
+                      </a:r>
+                      <a:endParaRPr lang="en-US" b="1"/>
+                    </a:p>
+                  </a:txBody>
+                  <a:tcPr anchor="ctr">
+                    <a:lnL w="3175">
+                      <a:solidFill>
+                        <a:schemeClr val="bg1"/>
+                      </a:solidFill>
+                    </a:lnL>
+                    <a:lnR w="0">
+                      <a:noFill/>
+                    </a:lnR>
+                    <a:lnT w="3175">
+                      <a:solidFill>
+                        <a:schemeClr val="bg1"/>
+                      </a:solidFill>
+                    </a:lnT>
+                    <a:lnB w="0">
+                      <a:noFill/>
+                    </a:lnB>
+                    <a:solidFill>
+                      <a:srgbClr val="F54747"/>
                     </a:solidFill>
                   </a:tcPr>
                 </a:tc>
                 <a:extLst>
                   <a:ext uri="{0D108BD9-81ED-4DB2-BD59-A6C34878D82A}">
-                    <a16:rowId xmlns:a16="http://schemas.microsoft.com/office/drawing/2014/main" val="3052349962"/>
+                    <a16:rowId xmlns:a16="http://schemas.microsoft.com/office/drawing/2014/main" val="1361472980"/>
                   </a:ext>
                 </a:extLst>
               </a:tr>
@@ -3576,7 +4118,7 @@
         </p:blipFill>
         <p:spPr>
           <a:xfrm>
-            <a:off x="5173133" y="3293533"/>
+            <a:off x="4411133" y="3022600"/>
             <a:ext cx="262467" cy="262467"/>
           </a:xfrm>
           <a:prstGeom prst="rect">
@@ -3586,10 +4128,10 @@
       </p:pic>
       <p:pic>
         <p:nvPicPr>
-          <p:cNvPr id="13" name="Graphic 12" descr="Checkmark with solid fill">
+          <p:cNvPr id="12" name="Graphic 12" descr="Checkmark with solid fill">
             <a:extLst>
               <a:ext uri="{FF2B5EF4-FFF2-40B4-BE49-F238E27FC236}">
-                <a16:creationId xmlns:a16="http://schemas.microsoft.com/office/drawing/2014/main" id="{340C8421-1A34-40DC-929E-1D1A9EC3AE66}"/>
+                <a16:creationId xmlns:a16="http://schemas.microsoft.com/office/drawing/2014/main" id="{7F8B24C1-583A-47FC-8A45-A80B98EDCBA9}"/>
               </a:ext>
             </a:extLst>
           </p:cNvPr>
@@ -3612,7 +4154,7 @@
         </p:blipFill>
         <p:spPr>
           <a:xfrm>
-            <a:off x="8466666" y="3877733"/>
+            <a:off x="8915399" y="3022599"/>
             <a:ext cx="262467" cy="262467"/>
           </a:xfrm>
           <a:prstGeom prst="rect">
@@ -3622,10 +4164,10 @@
       </p:pic>
       <p:pic>
         <p:nvPicPr>
-          <p:cNvPr id="9" name="Graphic 8" descr="Checkmark with solid fill">
+          <p:cNvPr id="14" name="Graphic 12" descr="Checkmark with solid fill">
             <a:extLst>
               <a:ext uri="{FF2B5EF4-FFF2-40B4-BE49-F238E27FC236}">
-                <a16:creationId xmlns:a16="http://schemas.microsoft.com/office/drawing/2014/main" id="{DCA81B2E-3CA9-4892-AEC3-452FD0D2CDF3}"/>
+                <a16:creationId xmlns:a16="http://schemas.microsoft.com/office/drawing/2014/main" id="{D6D99E6A-0C8A-4811-9E23-9D8DC962F1C3}"/>
               </a:ext>
             </a:extLst>
           </p:cNvPr>
@@ -3648,7 +4190,7 @@
         </p:blipFill>
         <p:spPr>
           <a:xfrm>
-            <a:off x="8466666" y="3302000"/>
+            <a:off x="8889998" y="3742266"/>
             <a:ext cx="262467" cy="262467"/>
           </a:xfrm>
           <a:prstGeom prst="rect">
@@ -3658,10 +4200,10 @@
       </p:pic>
       <p:pic>
         <p:nvPicPr>
-          <p:cNvPr id="11" name="Graphic 10" descr="Checkmark with solid fill">
+          <p:cNvPr id="15" name="Graphic 12" descr="Checkmark with solid fill">
             <a:extLst>
               <a:ext uri="{FF2B5EF4-FFF2-40B4-BE49-F238E27FC236}">
-                <a16:creationId xmlns:a16="http://schemas.microsoft.com/office/drawing/2014/main" id="{63570489-2948-48DE-92BC-478EC7A12352}"/>
+                <a16:creationId xmlns:a16="http://schemas.microsoft.com/office/drawing/2014/main" id="{3D9CA0F6-5295-49AD-B11E-ACE641F33429}"/>
               </a:ext>
             </a:extLst>
           </p:cNvPr>
@@ -3684,7 +4226,43 @@
         </p:blipFill>
         <p:spPr>
           <a:xfrm>
-            <a:off x="10109198" y="3301999"/>
+            <a:off x="8889998" y="3369732"/>
+            <a:ext cx="262467" cy="262467"/>
+          </a:xfrm>
+          <a:prstGeom prst="rect">
+            <a:avLst/>
+          </a:prstGeom>
+        </p:spPr>
+      </p:pic>
+      <p:pic>
+        <p:nvPicPr>
+          <p:cNvPr id="16" name="Graphic 12" descr="Checkmark with solid fill">
+            <a:extLst>
+              <a:ext uri="{FF2B5EF4-FFF2-40B4-BE49-F238E27FC236}">
+                <a16:creationId xmlns:a16="http://schemas.microsoft.com/office/drawing/2014/main" id="{0419596F-5F63-4F78-ADA5-7ADF59CD878F}"/>
+              </a:ext>
+            </a:extLst>
+          </p:cNvPr>
+          <p:cNvPicPr>
+            <a:picLocks noChangeAspect="1"/>
+          </p:cNvPicPr>
+          <p:nvPr/>
+        </p:nvPicPr>
+        <p:blipFill>
+          <a:blip r:embed="rId2">
+            <a:extLst>
+              <a:ext uri="{96DAC541-7B7A-43D3-8B79-37D633B846F1}">
+                <asvg:svgBlip xmlns:asvg="http://schemas.microsoft.com/office/drawing/2016/SVG/main" r:embed="rId3"/>
+              </a:ext>
+            </a:extLst>
+          </a:blip>
+          <a:stretch>
+            <a:fillRect/>
+          </a:stretch>
+        </p:blipFill>
+        <p:spPr>
+          <a:xfrm>
+            <a:off x="10735733" y="3022600"/>
             <a:ext cx="262467" cy="262467"/>
           </a:xfrm>
           <a:prstGeom prst="rect">

</xml_diff>

<commit_message>
add CALL method to placeholder
</commit_message>
<xml_diff>
--- a/static/placeholder.pptx
+++ b/static/placeholder.pptx
@@ -120,6 +120,7 @@
     <p1510:client id="{ABB433DE-8DE7-EB65-11B0-F01847659B5B}" v="170" dt="2021-10-14T11:45:39.854"/>
     <p1510:client id="{BEA3B990-66CF-4413-9382-701C0A5AD28E}" v="786" dt="2021-10-14T09:38:07.272"/>
     <p1510:client id="{E5650429-80A5-F8CC-95A1-4FFA4FA57543}" v="12" dt="2021-10-14T11:09:57.349"/>
+    <p1510:client id="{ECD9D8D5-90C7-FD99-DC50-4167921AACEE}" v="39" dt="2021-10-26T11:39:49.058"/>
   </p1510:revLst>
 </p1510:revInfo>
 </file>
@@ -255,7 +256,7 @@
           <a:p>
             <a:fld id="{846CE7D5-CF57-46EF-B807-FDD0502418D4}" type="datetimeFigureOut">
               <a:rPr lang="en-US" smtClean="0"/>
-              <a:t>10/18/2021</a:t>
+              <a:t>10/26/2021</a:t>
             </a:fld>
             <a:endParaRPr lang="en-US"/>
           </a:p>
@@ -425,7 +426,7 @@
           <a:p>
             <a:fld id="{846CE7D5-CF57-46EF-B807-FDD0502418D4}" type="datetimeFigureOut">
               <a:rPr lang="en-US" smtClean="0"/>
-              <a:t>10/18/2021</a:t>
+              <a:t>10/26/2021</a:t>
             </a:fld>
             <a:endParaRPr lang="en-US"/>
           </a:p>
@@ -605,7 +606,7 @@
           <a:p>
             <a:fld id="{846CE7D5-CF57-46EF-B807-FDD0502418D4}" type="datetimeFigureOut">
               <a:rPr lang="en-US" smtClean="0"/>
-              <a:t>10/18/2021</a:t>
+              <a:t>10/26/2021</a:t>
             </a:fld>
             <a:endParaRPr lang="en-US"/>
           </a:p>
@@ -775,7 +776,7 @@
           <a:p>
             <a:fld id="{846CE7D5-CF57-46EF-B807-FDD0502418D4}" type="datetimeFigureOut">
               <a:rPr lang="en-US" smtClean="0"/>
-              <a:t>10/18/2021</a:t>
+              <a:t>10/26/2021</a:t>
             </a:fld>
             <a:endParaRPr lang="en-US"/>
           </a:p>
@@ -1021,7 +1022,7 @@
           <a:p>
             <a:fld id="{846CE7D5-CF57-46EF-B807-FDD0502418D4}" type="datetimeFigureOut">
               <a:rPr lang="en-US" smtClean="0"/>
-              <a:t>10/18/2021</a:t>
+              <a:t>10/26/2021</a:t>
             </a:fld>
             <a:endParaRPr lang="en-US"/>
           </a:p>
@@ -1253,7 +1254,7 @@
           <a:p>
             <a:fld id="{846CE7D5-CF57-46EF-B807-FDD0502418D4}" type="datetimeFigureOut">
               <a:rPr lang="en-US" smtClean="0"/>
-              <a:t>10/18/2021</a:t>
+              <a:t>10/26/2021</a:t>
             </a:fld>
             <a:endParaRPr lang="en-US"/>
           </a:p>
@@ -1620,7 +1621,7 @@
           <a:p>
             <a:fld id="{846CE7D5-CF57-46EF-B807-FDD0502418D4}" type="datetimeFigureOut">
               <a:rPr lang="en-US" smtClean="0"/>
-              <a:t>10/18/2021</a:t>
+              <a:t>10/26/2021</a:t>
             </a:fld>
             <a:endParaRPr lang="en-US"/>
           </a:p>
@@ -1738,7 +1739,7 @@
           <a:p>
             <a:fld id="{846CE7D5-CF57-46EF-B807-FDD0502418D4}" type="datetimeFigureOut">
               <a:rPr lang="en-US" smtClean="0"/>
-              <a:t>10/18/2021</a:t>
+              <a:t>10/26/2021</a:t>
             </a:fld>
             <a:endParaRPr lang="en-US"/>
           </a:p>
@@ -1833,7 +1834,7 @@
           <a:p>
             <a:fld id="{846CE7D5-CF57-46EF-B807-FDD0502418D4}" type="datetimeFigureOut">
               <a:rPr lang="en-US" smtClean="0"/>
-              <a:t>10/18/2021</a:t>
+              <a:t>10/26/2021</a:t>
             </a:fld>
             <a:endParaRPr lang="en-US"/>
           </a:p>
@@ -2110,7 +2111,7 @@
           <a:p>
             <a:fld id="{846CE7D5-CF57-46EF-B807-FDD0502418D4}" type="datetimeFigureOut">
               <a:rPr lang="en-US" smtClean="0"/>
-              <a:t>10/18/2021</a:t>
+              <a:t>10/26/2021</a:t>
             </a:fld>
             <a:endParaRPr lang="en-US"/>
           </a:p>
@@ -2367,7 +2368,7 @@
           <a:p>
             <a:fld id="{846CE7D5-CF57-46EF-B807-FDD0502418D4}" type="datetimeFigureOut">
               <a:rPr lang="en-US" smtClean="0"/>
-              <a:t>10/18/2021</a:t>
+              <a:t>10/26/2021</a:t>
             </a:fld>
             <a:endParaRPr lang="en-US"/>
           </a:p>
@@ -2580,7 +2581,7 @@
           <a:p>
             <a:fld id="{846CE7D5-CF57-46EF-B807-FDD0502418D4}" type="datetimeFigureOut">
               <a:rPr lang="en-US" smtClean="0"/>
-              <a:t>10/18/2021</a:t>
+              <a:t>10/26/2021</a:t>
             </a:fld>
             <a:endParaRPr lang="en-US"/>
           </a:p>
@@ -3075,14 +3076,14 @@
           <p:nvPr>
             <p:extLst>
               <p:ext uri="{D42A27DB-BD31-4B8C-83A1-F6EECF244321}">
-                <p14:modId xmlns:p14="http://schemas.microsoft.com/office/powerpoint/2010/main" val="1711372386"/>
+                <p14:modId xmlns:p14="http://schemas.microsoft.com/office/powerpoint/2010/main" val="115413059"/>
               </p:ext>
             </p:extLst>
           </p:nvPr>
         </p:nvGraphicFramePr>
         <p:xfrm>
-          <a:off x="499533" y="2683933"/>
-          <a:ext cx="11314078" cy="1326647"/>
+          <a:off x="228600" y="2692400"/>
+          <a:ext cx="11789060" cy="1326647"/>
         </p:xfrm>
         <a:graphic>
           <a:graphicData uri="http://schemas.openxmlformats.org/drawingml/2006/table">
@@ -3091,45 +3092,52 @@
                 <a:tableStyleId>{2D5ABB26-0587-4C30-8999-92F81FD0307C}</a:tableStyleId>
               </a:tblPr>
               <a:tblGrid>
-                <a:gridCol w="953667">
+                <a:gridCol w="851746">
                   <a:extLst>
                     <a:ext uri="{9D8B030D-6E8A-4147-A177-3AD203B41FA5}">
                       <a16:colId xmlns:a16="http://schemas.microsoft.com/office/drawing/2014/main" val="1786597057"/>
                     </a:ext>
                   </a:extLst>
                 </a:gridCol>
-                <a:gridCol w="2063228">
+                <a:gridCol w="2086186">
                   <a:extLst>
                     <a:ext uri="{9D8B030D-6E8A-4147-A177-3AD203B41FA5}">
                       <a16:colId xmlns:a16="http://schemas.microsoft.com/office/drawing/2014/main" val="1936470344"/>
                     </a:ext>
                   </a:extLst>
                 </a:gridCol>
-                <a:gridCol w="2044887">
+                <a:gridCol w="1582884">
                   <a:extLst>
                     <a:ext uri="{9D8B030D-6E8A-4147-A177-3AD203B41FA5}">
                       <a16:colId xmlns:a16="http://schemas.microsoft.com/office/drawing/2014/main" val="3147797879"/>
                     </a:ext>
                   </a:extLst>
                 </a:gridCol>
-                <a:gridCol w="2439194">
+                <a:gridCol w="2440092">
                   <a:extLst>
                     <a:ext uri="{9D8B030D-6E8A-4147-A177-3AD203B41FA5}">
                       <a16:colId xmlns:a16="http://schemas.microsoft.com/office/drawing/2014/main" val="78292725"/>
                     </a:ext>
                   </a:extLst>
                 </a:gridCol>
-                <a:gridCol w="1927421">
+                <a:gridCol w="1592580">
                   <a:extLst>
                     <a:ext uri="{9D8B030D-6E8A-4147-A177-3AD203B41FA5}">
                       <a16:colId xmlns:a16="http://schemas.microsoft.com/office/drawing/2014/main" val="2212457586"/>
                     </a:ext>
                   </a:extLst>
                 </a:gridCol>
-                <a:gridCol w="1885681">
+                <a:gridCol w="1748561">
                   <a:extLst>
                     <a:ext uri="{9D8B030D-6E8A-4147-A177-3AD203B41FA5}">
                       <a16:colId xmlns:a16="http://schemas.microsoft.com/office/drawing/2014/main" val="1181174887"/>
+                    </a:ext>
+                  </a:extLst>
+                </a:gridCol>
+                <a:gridCol w="1487011">
+                  <a:extLst>
+                    <a:ext uri="{9D8B030D-6E8A-4147-A177-3AD203B41FA5}">
+                      <a16:colId xmlns:a16="http://schemas.microsoft.com/office/drawing/2014/main" val="1756295647"/>
                     </a:ext>
                   </a:extLst>
                 </a:gridCol>
@@ -3320,13 +3328,48 @@
                         <a:schemeClr val="bg1"/>
                       </a:solidFill>
                     </a:lnL>
+                    <a:lnR w="3175">
+                      <a:solidFill>
+                        <a:schemeClr val="bg1"/>
+                      </a:solidFill>
+                    </a:lnR>
+                    <a:lnT w="0">
+                      <a:noFill/>
+                    </a:lnT>
+                    <a:lnB w="3175">
+                      <a:solidFill>
+                        <a:schemeClr val="bg1"/>
+                      </a:solidFill>
+                    </a:lnB>
+                  </a:tcPr>
+                </a:tc>
+                <a:tc>
+                  <a:txBody>
+                    <a:bodyPr/>
+                    <a:lstStyle/>
+                    <a:p>
+                      <a:pPr lvl="0" algn="ctr">
+                        <a:buNone/>
+                      </a:pPr>
+                      <a:r>
+                        <a:rPr lang="en-US" sz="1400" dirty="0"/>
+                        <a:t>CALL</a:t>
+                      </a:r>
+                    </a:p>
+                  </a:txBody>
+                  <a:tcPr>
+                    <a:lnL w="3174">
+                      <a:solidFill>
+                        <a:schemeClr val="bg1"/>
+                      </a:solidFill>
+                    </a:lnL>
                     <a:lnR w="0">
                       <a:noFill/>
                     </a:lnR>
                     <a:lnT w="0">
                       <a:noFill/>
                     </a:lnT>
-                    <a:lnB w="3175">
+                    <a:lnB w="3174">
                       <a:solidFill>
                         <a:schemeClr val="bg1"/>
                       </a:solidFill>
@@ -3570,15 +3613,52 @@
                         <a:schemeClr val="bg1"/>
                       </a:solidFill>
                     </a:lnL>
+                    <a:lnR w="3175">
+                      <a:solidFill>
+                        <a:schemeClr val="bg1"/>
+                      </a:solidFill>
+                    </a:lnR>
+                    <a:lnT w="3175">
+                      <a:solidFill>
+                        <a:schemeClr val="bg1"/>
+                      </a:solidFill>
+                    </a:lnT>
+                    <a:lnB w="3175">
+                      <a:solidFill>
+                        <a:schemeClr val="bg1"/>
+                      </a:solidFill>
+                    </a:lnB>
+                    <a:solidFill>
+                      <a:schemeClr val="accent6"/>
+                    </a:solidFill>
+                  </a:tcPr>
+                </a:tc>
+                <a:tc>
+                  <a:txBody>
+                    <a:bodyPr/>
+                    <a:lstStyle/>
+                    <a:p>
+                      <a:pPr lvl="0" algn="ctr">
+                        <a:buNone/>
+                      </a:pPr>
+                      <a:endParaRPr lang="en-US" sz="1400" dirty="0"/>
+                    </a:p>
+                  </a:txBody>
+                  <a:tcPr>
+                    <a:lnL w="3174">
+                      <a:solidFill>
+                        <a:schemeClr val="bg1"/>
+                      </a:solidFill>
+                    </a:lnL>
                     <a:lnR w="0">
                       <a:noFill/>
                     </a:lnR>
-                    <a:lnT w="3175">
+                    <a:lnT w="3174">
                       <a:solidFill>
                         <a:schemeClr val="bg1"/>
                       </a:solidFill>
                     </a:lnT>
-                    <a:lnB w="3175">
+                    <a:lnB w="3174">
                       <a:solidFill>
                         <a:schemeClr val="bg1"/>
                       </a:solidFill>
@@ -3816,15 +3896,52 @@
                         <a:schemeClr val="bg1"/>
                       </a:solidFill>
                     </a:lnL>
+                    <a:lnR w="3175">
+                      <a:solidFill>
+                        <a:schemeClr val="bg1"/>
+                      </a:solidFill>
+                    </a:lnR>
+                    <a:lnT w="3175">
+                      <a:solidFill>
+                        <a:schemeClr val="bg1"/>
+                      </a:solidFill>
+                    </a:lnT>
+                    <a:lnB w="3175">
+                      <a:solidFill>
+                        <a:schemeClr val="bg1"/>
+                      </a:solidFill>
+                    </a:lnB>
+                    <a:solidFill>
+                      <a:srgbClr val="F54747"/>
+                    </a:solidFill>
+                  </a:tcPr>
+                </a:tc>
+                <a:tc>
+                  <a:txBody>
+                    <a:bodyPr/>
+                    <a:lstStyle/>
+                    <a:p>
+                      <a:pPr lvl="0" algn="ctr">
+                        <a:buNone/>
+                      </a:pPr>
+                      <a:endParaRPr lang="en-US" sz="1400" b="1" dirty="0"/>
+                    </a:p>
+                  </a:txBody>
+                  <a:tcPr>
+                    <a:lnL w="3174">
+                      <a:solidFill>
+                        <a:schemeClr val="bg1"/>
+                      </a:solidFill>
+                    </a:lnL>
                     <a:lnR w="0">
                       <a:noFill/>
                     </a:lnR>
-                    <a:lnT w="3175">
+                    <a:lnT w="3174">
                       <a:solidFill>
                         <a:schemeClr val="bg1"/>
                       </a:solidFill>
                     </a:lnT>
-                    <a:lnB w="3175">
+                    <a:lnB w="3174">
                       <a:solidFill>
                         <a:schemeClr val="bg1"/>
                       </a:solidFill>
@@ -4064,10 +4181,47 @@
                         <a:schemeClr val="bg1"/>
                       </a:solidFill>
                     </a:lnL>
+                    <a:lnR w="3175">
+                      <a:solidFill>
+                        <a:schemeClr val="bg1"/>
+                      </a:solidFill>
+                    </a:lnR>
+                    <a:lnT w="3175">
+                      <a:solidFill>
+                        <a:schemeClr val="bg1"/>
+                      </a:solidFill>
+                    </a:lnT>
+                    <a:lnB w="0">
+                      <a:noFill/>
+                    </a:lnB>
+                    <a:solidFill>
+                      <a:srgbClr val="F54747"/>
+                    </a:solidFill>
+                  </a:tcPr>
+                </a:tc>
+                <a:tc>
+                  <a:txBody>
+                    <a:bodyPr/>
+                    <a:lstStyle/>
+                    <a:p>
+                      <a:pPr lvl="0" algn="ctr">
+                        <a:buNone/>
+                      </a:pPr>
+                      <a:endParaRPr lang="en-US" sz="1400" b="1" i="0" u="none" strike="noStrike" noProof="0" dirty="0">
+                        <a:latin typeface="Calibri"/>
+                      </a:endParaRPr>
+                    </a:p>
+                  </a:txBody>
+                  <a:tcPr>
+                    <a:lnL w="3174">
+                      <a:solidFill>
+                        <a:schemeClr val="bg1"/>
+                      </a:solidFill>
+                    </a:lnL>
                     <a:lnR w="0">
                       <a:noFill/>
                     </a:lnR>
-                    <a:lnT w="3175">
+                    <a:lnT w="3174">
                       <a:solidFill>
                         <a:schemeClr val="bg1"/>
                       </a:solidFill>
@@ -4118,7 +4272,7 @@
         </p:blipFill>
         <p:spPr>
           <a:xfrm>
-            <a:off x="4411133" y="3022600"/>
+            <a:off x="3843866" y="3056467"/>
             <a:ext cx="262467" cy="262467"/>
           </a:xfrm>
           <a:prstGeom prst="rect">
@@ -4154,7 +4308,7 @@
         </p:blipFill>
         <p:spPr>
           <a:xfrm>
-            <a:off x="8915399" y="3022599"/>
+            <a:off x="7857066" y="3022599"/>
             <a:ext cx="262467" cy="262467"/>
           </a:xfrm>
           <a:prstGeom prst="rect">
@@ -4190,7 +4344,7 @@
         </p:blipFill>
         <p:spPr>
           <a:xfrm>
-            <a:off x="8889998" y="3742266"/>
+            <a:off x="7831665" y="3742266"/>
             <a:ext cx="262467" cy="262467"/>
           </a:xfrm>
           <a:prstGeom prst="rect">
@@ -4226,7 +4380,7 @@
         </p:blipFill>
         <p:spPr>
           <a:xfrm>
-            <a:off x="8889998" y="3369732"/>
+            <a:off x="7831665" y="3369732"/>
             <a:ext cx="262467" cy="262467"/>
           </a:xfrm>
           <a:prstGeom prst="rect">
@@ -4262,7 +4416,43 @@
         </p:blipFill>
         <p:spPr>
           <a:xfrm>
-            <a:off x="10735733" y="3022600"/>
+            <a:off x="9541933" y="3022600"/>
+            <a:ext cx="262467" cy="262467"/>
+          </a:xfrm>
+          <a:prstGeom prst="rect">
+            <a:avLst/>
+          </a:prstGeom>
+        </p:spPr>
+      </p:pic>
+      <p:pic>
+        <p:nvPicPr>
+          <p:cNvPr id="9" name="Graphic 12" descr="Checkmark with solid fill">
+            <a:extLst>
+              <a:ext uri="{FF2B5EF4-FFF2-40B4-BE49-F238E27FC236}">
+                <a16:creationId xmlns:a16="http://schemas.microsoft.com/office/drawing/2014/main" id="{5E0EB6CD-85CA-4448-A854-EA6CF16EBEA4}"/>
+              </a:ext>
+            </a:extLst>
+          </p:cNvPr>
+          <p:cNvPicPr>
+            <a:picLocks noChangeAspect="1"/>
+          </p:cNvPicPr>
+          <p:nvPr/>
+        </p:nvPicPr>
+        <p:blipFill>
+          <a:blip r:embed="rId2">
+            <a:extLst>
+              <a:ext uri="{96DAC541-7B7A-43D3-8B79-37D633B846F1}">
+                <asvg:svgBlip xmlns:asvg="http://schemas.microsoft.com/office/drawing/2016/SVG/main" r:embed="rId3"/>
+              </a:ext>
+            </a:extLst>
+          </a:blip>
+          <a:stretch>
+            <a:fillRect/>
+          </a:stretch>
+        </p:blipFill>
+        <p:spPr>
+          <a:xfrm>
+            <a:off x="11226799" y="3056467"/>
             <a:ext cx="262467" cy="262467"/>
           </a:xfrm>
           <a:prstGeom prst="rect">

</xml_diff>

<commit_message>
update placeholder image for CALL project after changing from cmip6 to cmip5
</commit_message>
<xml_diff>
--- a/static/placeholder.pptx
+++ b/static/placeholder.pptx
@@ -256,7 +256,7 @@
           <a:p>
             <a:fld id="{846CE7D5-CF57-46EF-B807-FDD0502418D4}" type="datetimeFigureOut">
               <a:rPr lang="en-US" smtClean="0"/>
-              <a:t>10/26/2021</a:t>
+              <a:t>10/27/2021</a:t>
             </a:fld>
             <a:endParaRPr lang="en-US"/>
           </a:p>
@@ -426,7 +426,7 @@
           <a:p>
             <a:fld id="{846CE7D5-CF57-46EF-B807-FDD0502418D4}" type="datetimeFigureOut">
               <a:rPr lang="en-US" smtClean="0"/>
-              <a:t>10/26/2021</a:t>
+              <a:t>10/27/2021</a:t>
             </a:fld>
             <a:endParaRPr lang="en-US"/>
           </a:p>
@@ -606,7 +606,7 @@
           <a:p>
             <a:fld id="{846CE7D5-CF57-46EF-B807-FDD0502418D4}" type="datetimeFigureOut">
               <a:rPr lang="en-US" smtClean="0"/>
-              <a:t>10/26/2021</a:t>
+              <a:t>10/27/2021</a:t>
             </a:fld>
             <a:endParaRPr lang="en-US"/>
           </a:p>
@@ -776,7 +776,7 @@
           <a:p>
             <a:fld id="{846CE7D5-CF57-46EF-B807-FDD0502418D4}" type="datetimeFigureOut">
               <a:rPr lang="en-US" smtClean="0"/>
-              <a:t>10/26/2021</a:t>
+              <a:t>10/27/2021</a:t>
             </a:fld>
             <a:endParaRPr lang="en-US"/>
           </a:p>
@@ -1022,7 +1022,7 @@
           <a:p>
             <a:fld id="{846CE7D5-CF57-46EF-B807-FDD0502418D4}" type="datetimeFigureOut">
               <a:rPr lang="en-US" smtClean="0"/>
-              <a:t>10/26/2021</a:t>
+              <a:t>10/27/2021</a:t>
             </a:fld>
             <a:endParaRPr lang="en-US"/>
           </a:p>
@@ -1254,7 +1254,7 @@
           <a:p>
             <a:fld id="{846CE7D5-CF57-46EF-B807-FDD0502418D4}" type="datetimeFigureOut">
               <a:rPr lang="en-US" smtClean="0"/>
-              <a:t>10/26/2021</a:t>
+              <a:t>10/27/2021</a:t>
             </a:fld>
             <a:endParaRPr lang="en-US"/>
           </a:p>
@@ -1621,7 +1621,7 @@
           <a:p>
             <a:fld id="{846CE7D5-CF57-46EF-B807-FDD0502418D4}" type="datetimeFigureOut">
               <a:rPr lang="en-US" smtClean="0"/>
-              <a:t>10/26/2021</a:t>
+              <a:t>10/27/2021</a:t>
             </a:fld>
             <a:endParaRPr lang="en-US"/>
           </a:p>
@@ -1739,7 +1739,7 @@
           <a:p>
             <a:fld id="{846CE7D5-CF57-46EF-B807-FDD0502418D4}" type="datetimeFigureOut">
               <a:rPr lang="en-US" smtClean="0"/>
-              <a:t>10/26/2021</a:t>
+              <a:t>10/27/2021</a:t>
             </a:fld>
             <a:endParaRPr lang="en-US"/>
           </a:p>
@@ -1834,7 +1834,7 @@
           <a:p>
             <a:fld id="{846CE7D5-CF57-46EF-B807-FDD0502418D4}" type="datetimeFigureOut">
               <a:rPr lang="en-US" smtClean="0"/>
-              <a:t>10/26/2021</a:t>
+              <a:t>10/27/2021</a:t>
             </a:fld>
             <a:endParaRPr lang="en-US"/>
           </a:p>
@@ -2111,7 +2111,7 @@
           <a:p>
             <a:fld id="{846CE7D5-CF57-46EF-B807-FDD0502418D4}" type="datetimeFigureOut">
               <a:rPr lang="en-US" smtClean="0"/>
-              <a:t>10/26/2021</a:t>
+              <a:t>10/27/2021</a:t>
             </a:fld>
             <a:endParaRPr lang="en-US"/>
           </a:p>
@@ -2368,7 +2368,7 @@
           <a:p>
             <a:fld id="{846CE7D5-CF57-46EF-B807-FDD0502418D4}" type="datetimeFigureOut">
               <a:rPr lang="en-US" smtClean="0"/>
-              <a:t>10/26/2021</a:t>
+              <a:t>10/27/2021</a:t>
             </a:fld>
             <a:endParaRPr lang="en-US"/>
           </a:p>
@@ -2581,7 +2581,7 @@
           <a:p>
             <a:fld id="{846CE7D5-CF57-46EF-B807-FDD0502418D4}" type="datetimeFigureOut">
               <a:rPr lang="en-US" smtClean="0"/>
-              <a:t>10/26/2021</a:t>
+              <a:t>10/27/2021</a:t>
             </a:fld>
             <a:endParaRPr lang="en-US"/>
           </a:p>
@@ -3076,7 +3076,7 @@
           <p:nvPr>
             <p:extLst>
               <p:ext uri="{D42A27DB-BD31-4B8C-83A1-F6EECF244321}">
-                <p14:modId xmlns:p14="http://schemas.microsoft.com/office/powerpoint/2010/main" val="115413059"/>
+                <p14:modId xmlns:p14="http://schemas.microsoft.com/office/powerpoint/2010/main" val="1430207669"/>
               </p:ext>
             </p:extLst>
           </p:nvPr>
@@ -3358,10 +3358,14 @@
                     </a:p>
                   </a:txBody>
                   <a:tcPr>
-                    <a:lnL w="3174">
-                      <a:solidFill>
-                        <a:schemeClr val="bg1"/>
-                      </a:solidFill>
+                    <a:lnL w="3175" cap="flat" cmpd="sng" algn="ctr">
+                      <a:solidFill>
+                        <a:schemeClr val="bg1"/>
+                      </a:solidFill>
+                      <a:prstDash val="solid"/>
+                      <a:round/>
+                      <a:headEnd type="none" w="med" len="med"/>
+                      <a:tailEnd type="none" w="med" len="med"/>
                     </a:lnL>
                     <a:lnR w="0">
                       <a:noFill/>
@@ -3645,10 +3649,14 @@
                     </a:p>
                   </a:txBody>
                   <a:tcPr>
-                    <a:lnL w="3174">
-                      <a:solidFill>
-                        <a:schemeClr val="bg1"/>
-                      </a:solidFill>
+                    <a:lnL w="3175" cap="flat" cmpd="sng" algn="ctr">
+                      <a:solidFill>
+                        <a:schemeClr val="bg1"/>
+                      </a:solidFill>
+                      <a:prstDash val="solid"/>
+                      <a:round/>
+                      <a:headEnd type="none" w="med" len="med"/>
+                      <a:tailEnd type="none" w="med" len="med"/>
                     </a:lnL>
                     <a:lnR w="0">
                       <a:noFill/>
@@ -3664,7 +3672,7 @@
                       </a:solidFill>
                     </a:lnB>
                     <a:solidFill>
-                      <a:schemeClr val="accent6"/>
+                      <a:srgbClr val="F54747"/>
                     </a:solidFill>
                   </a:tcPr>
                 </a:tc>
@@ -3924,14 +3932,25 @@
                       <a:pPr lvl="0" algn="ctr">
                         <a:buNone/>
                       </a:pPr>
-                      <a:endParaRPr lang="en-US" sz="1400" b="1" dirty="0"/>
+                      <a:endParaRPr lang="en-US" sz="1400" kern="1200" dirty="0">
+                        <a:solidFill>
+                          <a:schemeClr val="tx1"/>
+                        </a:solidFill>
+                        <a:latin typeface="+mn-lt"/>
+                        <a:ea typeface="+mn-ea"/>
+                        <a:cs typeface="+mn-cs"/>
+                      </a:endParaRPr>
                     </a:p>
                   </a:txBody>
                   <a:tcPr>
-                    <a:lnL w="3174">
-                      <a:solidFill>
-                        <a:schemeClr val="bg1"/>
-                      </a:solidFill>
+                    <a:lnL w="3175" cap="flat" cmpd="sng" algn="ctr">
+                      <a:solidFill>
+                        <a:schemeClr val="bg1"/>
+                      </a:solidFill>
+                      <a:prstDash val="solid"/>
+                      <a:round/>
+                      <a:headEnd type="none" w="med" len="med"/>
+                      <a:tailEnd type="none" w="med" len="med"/>
                     </a:lnL>
                     <a:lnR w="0">
                       <a:noFill/>
@@ -3947,7 +3966,7 @@
                       </a:solidFill>
                     </a:lnB>
                     <a:solidFill>
-                      <a:srgbClr val="F54747"/>
+                      <a:schemeClr val="accent6"/>
                     </a:solidFill>
                   </a:tcPr>
                 </a:tc>
@@ -4213,10 +4232,14 @@
                     </a:p>
                   </a:txBody>
                   <a:tcPr>
-                    <a:lnL w="3174">
-                      <a:solidFill>
-                        <a:schemeClr val="bg1"/>
-                      </a:solidFill>
+                    <a:lnL w="3175" cap="flat" cmpd="sng" algn="ctr">
+                      <a:solidFill>
+                        <a:schemeClr val="bg1"/>
+                      </a:solidFill>
+                      <a:prstDash val="solid"/>
+                      <a:round/>
+                      <a:headEnd type="none" w="med" len="med"/>
+                      <a:tailEnd type="none" w="med" len="med"/>
                     </a:lnL>
                     <a:lnR w="0">
                       <a:noFill/>
@@ -4452,7 +4475,7 @@
         </p:blipFill>
         <p:spPr>
           <a:xfrm>
-            <a:off x="11226799" y="3056467"/>
+            <a:off x="11201399" y="3369733"/>
             <a:ext cx="262467" cy="262467"/>
           </a:xfrm>
           <a:prstGeom prst="rect">

</xml_diff>

<commit_message>
update placeholder image for KCC
</commit_message>
<xml_diff>
--- a/static/placeholder.pptx
+++ b/static/placeholder.pptx
@@ -256,7 +256,7 @@
           <a:p>
             <a:fld id="{846CE7D5-CF57-46EF-B807-FDD0502418D4}" type="datetimeFigureOut">
               <a:rPr lang="en-US" smtClean="0"/>
-              <a:t>10/27/2021</a:t>
+              <a:t>11/1/2021</a:t>
             </a:fld>
             <a:endParaRPr lang="en-US"/>
           </a:p>
@@ -426,7 +426,7 @@
           <a:p>
             <a:fld id="{846CE7D5-CF57-46EF-B807-FDD0502418D4}" type="datetimeFigureOut">
               <a:rPr lang="en-US" smtClean="0"/>
-              <a:t>10/27/2021</a:t>
+              <a:t>11/1/2021</a:t>
             </a:fld>
             <a:endParaRPr lang="en-US"/>
           </a:p>
@@ -606,7 +606,7 @@
           <a:p>
             <a:fld id="{846CE7D5-CF57-46EF-B807-FDD0502418D4}" type="datetimeFigureOut">
               <a:rPr lang="en-US" smtClean="0"/>
-              <a:t>10/27/2021</a:t>
+              <a:t>11/1/2021</a:t>
             </a:fld>
             <a:endParaRPr lang="en-US"/>
           </a:p>
@@ -776,7 +776,7 @@
           <a:p>
             <a:fld id="{846CE7D5-CF57-46EF-B807-FDD0502418D4}" type="datetimeFigureOut">
               <a:rPr lang="en-US" smtClean="0"/>
-              <a:t>10/27/2021</a:t>
+              <a:t>11/1/2021</a:t>
             </a:fld>
             <a:endParaRPr lang="en-US"/>
           </a:p>
@@ -1022,7 +1022,7 @@
           <a:p>
             <a:fld id="{846CE7D5-CF57-46EF-B807-FDD0502418D4}" type="datetimeFigureOut">
               <a:rPr lang="en-US" smtClean="0"/>
-              <a:t>10/27/2021</a:t>
+              <a:t>11/1/2021</a:t>
             </a:fld>
             <a:endParaRPr lang="en-US"/>
           </a:p>
@@ -1254,7 +1254,7 @@
           <a:p>
             <a:fld id="{846CE7D5-CF57-46EF-B807-FDD0502418D4}" type="datetimeFigureOut">
               <a:rPr lang="en-US" smtClean="0"/>
-              <a:t>10/27/2021</a:t>
+              <a:t>11/1/2021</a:t>
             </a:fld>
             <a:endParaRPr lang="en-US"/>
           </a:p>
@@ -1621,7 +1621,7 @@
           <a:p>
             <a:fld id="{846CE7D5-CF57-46EF-B807-FDD0502418D4}" type="datetimeFigureOut">
               <a:rPr lang="en-US" smtClean="0"/>
-              <a:t>10/27/2021</a:t>
+              <a:t>11/1/2021</a:t>
             </a:fld>
             <a:endParaRPr lang="en-US"/>
           </a:p>
@@ -1739,7 +1739,7 @@
           <a:p>
             <a:fld id="{846CE7D5-CF57-46EF-B807-FDD0502418D4}" type="datetimeFigureOut">
               <a:rPr lang="en-US" smtClean="0"/>
-              <a:t>10/27/2021</a:t>
+              <a:t>11/1/2021</a:t>
             </a:fld>
             <a:endParaRPr lang="en-US"/>
           </a:p>
@@ -1834,7 +1834,7 @@
           <a:p>
             <a:fld id="{846CE7D5-CF57-46EF-B807-FDD0502418D4}" type="datetimeFigureOut">
               <a:rPr lang="en-US" smtClean="0"/>
-              <a:t>10/27/2021</a:t>
+              <a:t>11/1/2021</a:t>
             </a:fld>
             <a:endParaRPr lang="en-US"/>
           </a:p>
@@ -2111,7 +2111,7 @@
           <a:p>
             <a:fld id="{846CE7D5-CF57-46EF-B807-FDD0502418D4}" type="datetimeFigureOut">
               <a:rPr lang="en-US" smtClean="0"/>
-              <a:t>10/27/2021</a:t>
+              <a:t>11/1/2021</a:t>
             </a:fld>
             <a:endParaRPr lang="en-US"/>
           </a:p>
@@ -2368,7 +2368,7 @@
           <a:p>
             <a:fld id="{846CE7D5-CF57-46EF-B807-FDD0502418D4}" type="datetimeFigureOut">
               <a:rPr lang="en-US" smtClean="0"/>
-              <a:t>10/27/2021</a:t>
+              <a:t>11/1/2021</a:t>
             </a:fld>
             <a:endParaRPr lang="en-US"/>
           </a:p>
@@ -2581,7 +2581,7 @@
           <a:p>
             <a:fld id="{846CE7D5-CF57-46EF-B807-FDD0502418D4}" type="datetimeFigureOut">
               <a:rPr lang="en-US" smtClean="0"/>
-              <a:t>10/27/2021</a:t>
+              <a:t>11/1/2021</a:t>
             </a:fld>
             <a:endParaRPr lang="en-US"/>
           </a:p>
@@ -3076,7 +3076,7 @@
           <p:nvPr>
             <p:extLst>
               <p:ext uri="{D42A27DB-BD31-4B8C-83A1-F6EECF244321}">
-                <p14:modId xmlns:p14="http://schemas.microsoft.com/office/powerpoint/2010/main" val="1430207669"/>
+                <p14:modId xmlns:p14="http://schemas.microsoft.com/office/powerpoint/2010/main" val="3487016138"/>
               </p:ext>
             </p:extLst>
           </p:nvPr>
@@ -3251,8 +3251,8 @@
                     <a:p>
                       <a:pPr algn="ctr"/>
                       <a:r>
-                        <a:rPr lang="en-US" sz="1400" dirty="0" err="1"/>
-                        <a:t>HistC</a:t>
+                        <a:rPr lang="en-US" sz="1400" dirty="0"/>
+                        <a:t>KCC</a:t>
                       </a:r>
                     </a:p>
                   </a:txBody>
@@ -3532,10 +3532,7 @@
                         <a:rPr lang="en-US" sz="1400" u="none" strike="noStrike" noProof="0" dirty="0"/>
                         <a:t>Temperature</a:t>
                       </a:r>
-                      <a:r>
-                        <a:rPr lang="en-US" sz="1400" dirty="0"/>
-                        <a:t>, no 50-percentile</a:t>
-                      </a:r>
+                      <a:endParaRPr lang="en-US" sz="1400" dirty="0"/>
                     </a:p>
                   </a:txBody>
                   <a:tcPr anchor="ctr">

</xml_diff>